<commit_message>
kinetic energy section added
basically done, needs review
chapter missing power
</commit_message>
<xml_diff>
--- a/tex/figures/WorkEnergy/Figures.pptx
+++ b/tex/figures/WorkEnergy/Figures.pptx
@@ -247,7 +247,7 @@
           <a:p>
             <a:fld id="{F7249F8D-641B-4CAF-BAE5-10524742F6F1}" type="datetimeFigureOut">
               <a:rPr lang="en-CA" smtClean="0"/>
-              <a:t>2018-06-05</a:t>
+              <a:t>2018-06-06</a:t>
             </a:fld>
             <a:endParaRPr lang="en-CA"/>
           </a:p>
@@ -417,7 +417,7 @@
           <a:p>
             <a:fld id="{F7249F8D-641B-4CAF-BAE5-10524742F6F1}" type="datetimeFigureOut">
               <a:rPr lang="en-CA" smtClean="0"/>
-              <a:t>2018-06-05</a:t>
+              <a:t>2018-06-06</a:t>
             </a:fld>
             <a:endParaRPr lang="en-CA"/>
           </a:p>
@@ -597,7 +597,7 @@
           <a:p>
             <a:fld id="{F7249F8D-641B-4CAF-BAE5-10524742F6F1}" type="datetimeFigureOut">
               <a:rPr lang="en-CA" smtClean="0"/>
-              <a:t>2018-06-05</a:t>
+              <a:t>2018-06-06</a:t>
             </a:fld>
             <a:endParaRPr lang="en-CA"/>
           </a:p>
@@ -767,7 +767,7 @@
           <a:p>
             <a:fld id="{F7249F8D-641B-4CAF-BAE5-10524742F6F1}" type="datetimeFigureOut">
               <a:rPr lang="en-CA" smtClean="0"/>
-              <a:t>2018-06-05</a:t>
+              <a:t>2018-06-06</a:t>
             </a:fld>
             <a:endParaRPr lang="en-CA"/>
           </a:p>
@@ -1013,7 +1013,7 @@
           <a:p>
             <a:fld id="{F7249F8D-641B-4CAF-BAE5-10524742F6F1}" type="datetimeFigureOut">
               <a:rPr lang="en-CA" smtClean="0"/>
-              <a:t>2018-06-05</a:t>
+              <a:t>2018-06-06</a:t>
             </a:fld>
             <a:endParaRPr lang="en-CA"/>
           </a:p>
@@ -1245,7 +1245,7 @@
           <a:p>
             <a:fld id="{F7249F8D-641B-4CAF-BAE5-10524742F6F1}" type="datetimeFigureOut">
               <a:rPr lang="en-CA" smtClean="0"/>
-              <a:t>2018-06-05</a:t>
+              <a:t>2018-06-06</a:t>
             </a:fld>
             <a:endParaRPr lang="en-CA"/>
           </a:p>
@@ -1612,7 +1612,7 @@
           <a:p>
             <a:fld id="{F7249F8D-641B-4CAF-BAE5-10524742F6F1}" type="datetimeFigureOut">
               <a:rPr lang="en-CA" smtClean="0"/>
-              <a:t>2018-06-05</a:t>
+              <a:t>2018-06-06</a:t>
             </a:fld>
             <a:endParaRPr lang="en-CA"/>
           </a:p>
@@ -1730,7 +1730,7 @@
           <a:p>
             <a:fld id="{F7249F8D-641B-4CAF-BAE5-10524742F6F1}" type="datetimeFigureOut">
               <a:rPr lang="en-CA" smtClean="0"/>
-              <a:t>2018-06-05</a:t>
+              <a:t>2018-06-06</a:t>
             </a:fld>
             <a:endParaRPr lang="en-CA"/>
           </a:p>
@@ -1825,7 +1825,7 @@
           <a:p>
             <a:fld id="{F7249F8D-641B-4CAF-BAE5-10524742F6F1}" type="datetimeFigureOut">
               <a:rPr lang="en-CA" smtClean="0"/>
-              <a:t>2018-06-05</a:t>
+              <a:t>2018-06-06</a:t>
             </a:fld>
             <a:endParaRPr lang="en-CA"/>
           </a:p>
@@ -2102,7 +2102,7 @@
           <a:p>
             <a:fld id="{F7249F8D-641B-4CAF-BAE5-10524742F6F1}" type="datetimeFigureOut">
               <a:rPr lang="en-CA" smtClean="0"/>
-              <a:t>2018-06-05</a:t>
+              <a:t>2018-06-06</a:t>
             </a:fld>
             <a:endParaRPr lang="en-CA"/>
           </a:p>
@@ -2355,7 +2355,7 @@
           <a:p>
             <a:fld id="{F7249F8D-641B-4CAF-BAE5-10524742F6F1}" type="datetimeFigureOut">
               <a:rPr lang="en-CA" smtClean="0"/>
-              <a:t>2018-06-05</a:t>
+              <a:t>2018-06-06</a:t>
             </a:fld>
             <a:endParaRPr lang="en-CA"/>
           </a:p>
@@ -2568,7 +2568,7 @@
           <a:p>
             <a:fld id="{F7249F8D-641B-4CAF-BAE5-10524742F6F1}" type="datetimeFigureOut">
               <a:rPr lang="en-CA" smtClean="0"/>
-              <a:t>2018-06-05</a:t>
+              <a:t>2018-06-06</a:t>
             </a:fld>
             <a:endParaRPr lang="en-CA"/>
           </a:p>
@@ -13573,8 +13573,8 @@
             </a:fontRef>
           </p:style>
         </p:cxnSp>
-        <mc:AlternateContent xmlns:mc="http://schemas.openxmlformats.org/markup-compatibility/2006">
-          <mc:Choice xmlns:a14="http://schemas.microsoft.com/office/drawing/2010/main" Requires="a14">
+        <mc:AlternateContent xmlns:mc="http://schemas.openxmlformats.org/markup-compatibility/2006" xmlns:a14="http://schemas.microsoft.com/office/drawing/2010/main">
+          <mc:Choice Requires="a14">
             <p:sp>
               <p:nvSpPr>
                 <p:cNvPr id="39" name="TextBox 38"/>
@@ -13597,6 +13597,7 @@
                 </a:bodyPr>
                 <a:lstStyle/>
                 <a:p>
+                  <a:pPr/>
                   <a14:m>
                     <m:oMathPara xmlns:m="http://schemas.openxmlformats.org/officeDocument/2006/math">
                       <m:oMathParaPr>
@@ -13628,7 +13629,7 @@
               </p:txBody>
             </p:sp>
           </mc:Choice>
-          <mc:Fallback>
+          <mc:Fallback xmlns="">
             <p:sp>
               <p:nvSpPr>
                 <p:cNvPr id="39" name="TextBox 38"/>
@@ -13667,8 +13668,8 @@
             </p:sp>
           </mc:Fallback>
         </mc:AlternateContent>
-        <mc:AlternateContent xmlns:mc="http://schemas.openxmlformats.org/markup-compatibility/2006">
-          <mc:Choice xmlns:a14="http://schemas.microsoft.com/office/drawing/2010/main" Requires="a14">
+        <mc:AlternateContent xmlns:mc="http://schemas.openxmlformats.org/markup-compatibility/2006" xmlns:a14="http://schemas.microsoft.com/office/drawing/2010/main">
+          <mc:Choice Requires="a14">
             <p:sp>
               <p:nvSpPr>
                 <p:cNvPr id="40" name="TextBox 39"/>
@@ -13691,6 +13692,7 @@
                 </a:bodyPr>
                 <a:lstStyle/>
                 <a:p>
+                  <a:pPr/>
                   <a14:m>
                     <m:oMathPara xmlns:m="http://schemas.openxmlformats.org/officeDocument/2006/math">
                       <m:oMathParaPr>
@@ -13722,7 +13724,7 @@
               </p:txBody>
             </p:sp>
           </mc:Choice>
-          <mc:Fallback>
+          <mc:Fallback xmlns="">
             <p:sp>
               <p:nvSpPr>
                 <p:cNvPr id="40" name="TextBox 39"/>
@@ -13835,8 +13837,8 @@
             </a:fontRef>
           </p:style>
         </p:cxnSp>
-        <mc:AlternateContent xmlns:mc="http://schemas.openxmlformats.org/markup-compatibility/2006">
-          <mc:Choice xmlns:a14="http://schemas.microsoft.com/office/drawing/2010/main" Requires="a14">
+        <mc:AlternateContent xmlns:mc="http://schemas.openxmlformats.org/markup-compatibility/2006" xmlns:a14="http://schemas.microsoft.com/office/drawing/2010/main">
+          <mc:Choice Requires="a14">
             <p:sp>
               <p:nvSpPr>
                 <p:cNvPr id="46" name="TextBox 45"/>
@@ -13859,6 +13861,7 @@
                 </a:bodyPr>
                 <a:lstStyle/>
                 <a:p>
+                  <a:pPr/>
                   <a14:m>
                     <m:oMathPara xmlns:m="http://schemas.openxmlformats.org/officeDocument/2006/math">
                       <m:oMathParaPr>
@@ -13883,7 +13886,7 @@
               </p:txBody>
             </p:sp>
           </mc:Choice>
-          <mc:Fallback>
+          <mc:Fallback xmlns="">
             <p:sp>
               <p:nvSpPr>
                 <p:cNvPr id="46" name="TextBox 45"/>
@@ -13922,8 +13925,8 @@
             </p:sp>
           </mc:Fallback>
         </mc:AlternateContent>
-        <mc:AlternateContent xmlns:mc="http://schemas.openxmlformats.org/markup-compatibility/2006">
-          <mc:Choice xmlns:a14="http://schemas.microsoft.com/office/drawing/2010/main" Requires="a14">
+        <mc:AlternateContent xmlns:mc="http://schemas.openxmlformats.org/markup-compatibility/2006" xmlns:a14="http://schemas.microsoft.com/office/drawing/2010/main">
+          <mc:Choice Requires="a14">
             <p:sp>
               <p:nvSpPr>
                 <p:cNvPr id="47" name="TextBox 46"/>
@@ -13946,6 +13949,7 @@
                 </a:bodyPr>
                 <a:lstStyle/>
                 <a:p>
+                  <a:pPr/>
                   <a14:m>
                     <m:oMathPara xmlns:m="http://schemas.openxmlformats.org/officeDocument/2006/math">
                       <m:oMathParaPr>
@@ -13970,7 +13974,7 @@
               </p:txBody>
             </p:sp>
           </mc:Choice>
-          <mc:Fallback>
+          <mc:Fallback xmlns="">
             <p:sp>
               <p:nvSpPr>
                 <p:cNvPr id="47" name="TextBox 46"/>
@@ -14960,8 +14964,8 @@
             </a:p>
           </p:txBody>
         </p:sp>
-        <mc:AlternateContent xmlns:mc="http://schemas.openxmlformats.org/markup-compatibility/2006">
-          <mc:Choice xmlns:a14="http://schemas.microsoft.com/office/drawing/2010/main" Requires="a14">
+        <mc:AlternateContent xmlns:mc="http://schemas.openxmlformats.org/markup-compatibility/2006" xmlns:a14="http://schemas.microsoft.com/office/drawing/2010/main">
+          <mc:Choice Requires="a14">
             <p:sp>
               <p:nvSpPr>
                 <p:cNvPr id="79" name="TextBox 78"/>
@@ -15086,7 +15090,7 @@
               </p:txBody>
             </p:sp>
           </mc:Choice>
-          <mc:Fallback>
+          <mc:Fallback xmlns="">
             <p:sp>
               <p:nvSpPr>
                 <p:cNvPr id="79" name="TextBox 78"/>
@@ -15125,8 +15129,8 @@
             </p:sp>
           </mc:Fallback>
         </mc:AlternateContent>
-        <mc:AlternateContent xmlns:mc="http://schemas.openxmlformats.org/markup-compatibility/2006">
-          <mc:Choice xmlns:a14="http://schemas.microsoft.com/office/drawing/2010/main" Requires="a14">
+        <mc:AlternateContent xmlns:mc="http://schemas.openxmlformats.org/markup-compatibility/2006" xmlns:a14="http://schemas.microsoft.com/office/drawing/2010/main">
+          <mc:Choice Requires="a14">
             <p:sp>
               <p:nvSpPr>
                 <p:cNvPr id="80" name="TextBox 79"/>
@@ -15251,7 +15255,7 @@
               </p:txBody>
             </p:sp>
           </mc:Choice>
-          <mc:Fallback>
+          <mc:Fallback xmlns="">
             <p:sp>
               <p:nvSpPr>
                 <p:cNvPr id="80" name="TextBox 79"/>
@@ -15434,8 +15438,8 @@
             </a:fontRef>
           </p:style>
         </p:cxnSp>
-        <mc:AlternateContent xmlns:mc="http://schemas.openxmlformats.org/markup-compatibility/2006">
-          <mc:Choice xmlns:a14="http://schemas.microsoft.com/office/drawing/2010/main" Requires="a14">
+        <mc:AlternateContent xmlns:mc="http://schemas.openxmlformats.org/markup-compatibility/2006" xmlns:a14="http://schemas.microsoft.com/office/drawing/2010/main">
+          <mc:Choice Requires="a14">
             <p:sp>
               <p:nvSpPr>
                 <p:cNvPr id="97" name="TextBox 96"/>
@@ -15458,6 +15462,7 @@
                 </a:bodyPr>
                 <a:lstStyle/>
                 <a:p>
+                  <a:pPr/>
                   <a14:m>
                     <m:oMathPara xmlns:m="http://schemas.openxmlformats.org/officeDocument/2006/math">
                       <m:oMathParaPr>
@@ -15529,7 +15534,7 @@
               </p:txBody>
             </p:sp>
           </mc:Choice>
-          <mc:Fallback>
+          <mc:Fallback xmlns="">
             <p:sp>
               <p:nvSpPr>
                 <p:cNvPr id="97" name="TextBox 96"/>
@@ -15578,9 +15583,9 @@
         <p:grpSpPr>
           <a:xfrm>
             <a:off x="6886111" y="601520"/>
-            <a:ext cx="3881592" cy="2694066"/>
+            <a:ext cx="3892172" cy="2694066"/>
             <a:chOff x="6610407" y="3529626"/>
-            <a:chExt cx="3881592" cy="2694066"/>
+            <a:chExt cx="3892172" cy="2694066"/>
           </a:xfrm>
         </p:grpSpPr>
         <p:grpSp>
@@ -15592,9 +15597,9 @@
           <p:grpSpPr>
             <a:xfrm>
               <a:off x="6610407" y="3529626"/>
-              <a:ext cx="3881592" cy="2682889"/>
+              <a:ext cx="3892172" cy="2682889"/>
               <a:chOff x="6610407" y="3529626"/>
-              <a:chExt cx="3881592" cy="2682889"/>
+              <a:chExt cx="3892172" cy="2682889"/>
             </a:xfrm>
           </p:grpSpPr>
           <p:grpSp>
@@ -16174,7 +16179,7 @@
                 <p:spPr>
                   <a:xfrm>
                     <a:off x="8833404" y="4233683"/>
-                    <a:ext cx="1658595" cy="307777"/>
+                    <a:ext cx="1669175" cy="311367"/>
                   </a:xfrm>
                   <a:prstGeom prst="rect">
                     <a:avLst/>
@@ -16264,15 +16269,15 @@
                             </a:rPr>
                             <m:t>𝑏</m:t>
                           </m:r>
-                          <m:sSub>
-                            <m:sSubPr>
+                          <m:sSubSup>
+                            <m:sSubSupPr>
                               <m:ctrlPr>
                                 <a:rPr lang="en-US" sz="2000" b="0" i="1" smtClean="0">
                                   <a:latin typeface="Cambria Math" panose="02040503050406030204" pitchFamily="18" charset="0"/>
                                   <a:cs typeface="Arial" panose="020B0604020202020204" pitchFamily="34" charset="0"/>
                                 </a:rPr>
                               </m:ctrlPr>
-                            </m:sSubPr>
+                            </m:sSubSupPr>
                             <m:e>
                               <m:r>
                                 <a:rPr lang="en-US" sz="2000" b="0" i="1" smtClean="0">
@@ -16291,7 +16296,16 @@
                                 <m:t>1</m:t>
                               </m:r>
                             </m:sub>
-                          </m:sSub>
+                            <m:sup>
+                              <m:r>
+                                <a:rPr lang="en-US" sz="2000" b="0" i="1" smtClean="0">
+                                  <a:latin typeface="Cambria Math" panose="02040503050406030204" pitchFamily="18" charset="0"/>
+                                  <a:cs typeface="Arial" panose="020B0604020202020204" pitchFamily="34" charset="0"/>
+                                </a:rPr>
+                                <m:t>2</m:t>
+                              </m:r>
+                            </m:sup>
+                          </m:sSubSup>
                           <m:r>
                             <a:rPr lang="en-US" sz="2000" b="0" i="1" smtClean="0">
                               <a:latin typeface="Cambria Math" panose="02040503050406030204" pitchFamily="18" charset="0"/>
@@ -16322,7 +16336,7 @@
                 <p:spPr>
                   <a:xfrm>
                     <a:off x="8833404" y="4233683"/>
-                    <a:ext cx="1658595" cy="307777"/>
+                    <a:ext cx="1669175" cy="311367"/>
                   </a:xfrm>
                   <a:prstGeom prst="rect">
                     <a:avLst/>
@@ -16330,7 +16344,7 @@
                   <a:blipFill>
                     <a:blip r:embed="rId36"/>
                     <a:stretch>
-                      <a:fillRect l="-2206" r="-4779" b="-37255"/>
+                      <a:fillRect l="-2555" r="-4745" b="-37255"/>
                     </a:stretch>
                   </a:blipFill>
                 </p:spPr>
@@ -16349,8 +16363,8 @@
               </p:sp>
             </mc:Fallback>
           </mc:AlternateContent>
-          <mc:AlternateContent xmlns:mc="http://schemas.openxmlformats.org/markup-compatibility/2006">
-            <mc:Choice xmlns:a14="http://schemas.microsoft.com/office/drawing/2010/main" Requires="a14">
+          <mc:AlternateContent xmlns:mc="http://schemas.openxmlformats.org/markup-compatibility/2006" xmlns:a14="http://schemas.microsoft.com/office/drawing/2010/main">
+            <mc:Choice Requires="a14">
               <p:sp>
                 <p:nvSpPr>
                   <p:cNvPr id="112" name="TextBox 111"/>
@@ -16419,7 +16433,7 @@
                 </p:txBody>
               </p:sp>
             </mc:Choice>
-            <mc:Fallback>
+            <mc:Fallback xmlns="">
               <p:sp>
                 <p:nvSpPr>
                   <p:cNvPr id="112" name="TextBox 111"/>
@@ -16458,8 +16472,8 @@
               </p:sp>
             </mc:Fallback>
           </mc:AlternateContent>
-          <mc:AlternateContent xmlns:mc="http://schemas.openxmlformats.org/markup-compatibility/2006">
-            <mc:Choice xmlns:a14="http://schemas.microsoft.com/office/drawing/2010/main" Requires="a14">
+          <mc:AlternateContent xmlns:mc="http://schemas.openxmlformats.org/markup-compatibility/2006" xmlns:a14="http://schemas.microsoft.com/office/drawing/2010/main">
+            <mc:Choice Requires="a14">
               <p:sp>
                 <p:nvSpPr>
                   <p:cNvPr id="113" name="TextBox 112"/>
@@ -16482,6 +16496,7 @@
                   </a:bodyPr>
                   <a:lstStyle/>
                   <a:p>
+                    <a:pPr/>
                     <a14:m>
                       <m:oMathPara xmlns:m="http://schemas.openxmlformats.org/officeDocument/2006/math">
                         <m:oMathParaPr>
@@ -16581,7 +16596,7 @@
                 </p:txBody>
               </p:sp>
             </mc:Choice>
-            <mc:Fallback>
+            <mc:Fallback xmlns="">
               <p:sp>
                 <p:nvSpPr>
                   <p:cNvPr id="113" name="TextBox 112"/>
@@ -16657,8 +16672,8 @@
             </a:fontRef>
           </p:style>
         </p:cxnSp>
-        <mc:AlternateContent xmlns:mc="http://schemas.openxmlformats.org/markup-compatibility/2006">
-          <mc:Choice xmlns:a14="http://schemas.microsoft.com/office/drawing/2010/main" Requires="a14">
+        <mc:AlternateContent xmlns:mc="http://schemas.openxmlformats.org/markup-compatibility/2006" xmlns:a14="http://schemas.microsoft.com/office/drawing/2010/main">
+          <mc:Choice Requires="a14">
             <p:sp>
               <p:nvSpPr>
                 <p:cNvPr id="117" name="TextBox 116"/>
@@ -16681,6 +16696,7 @@
                 </a:bodyPr>
                 <a:lstStyle/>
                 <a:p>
+                  <a:pPr/>
                   <a14:m>
                     <m:oMathPara xmlns:m="http://schemas.openxmlformats.org/officeDocument/2006/math">
                       <m:oMathParaPr>
@@ -16726,7 +16742,7 @@
               </p:txBody>
             </p:sp>
           </mc:Choice>
-          <mc:Fallback>
+          <mc:Fallback xmlns="">
             <p:sp>
               <p:nvSpPr>
                 <p:cNvPr id="117" name="TextBox 116"/>
@@ -16911,8 +16927,8 @@
             </a:fontRef>
           </p:style>
         </p:cxnSp>
-        <mc:AlternateContent xmlns:mc="http://schemas.openxmlformats.org/markup-compatibility/2006">
-          <mc:Choice xmlns:a14="http://schemas.microsoft.com/office/drawing/2010/main" Requires="a14">
+        <mc:AlternateContent xmlns:mc="http://schemas.openxmlformats.org/markup-compatibility/2006" xmlns:a14="http://schemas.microsoft.com/office/drawing/2010/main">
+          <mc:Choice Requires="a14">
             <p:sp>
               <p:nvSpPr>
                 <p:cNvPr id="126" name="TextBox 125"/>
@@ -16935,6 +16951,7 @@
                 </a:bodyPr>
                 <a:lstStyle/>
                 <a:p>
+                  <a:pPr/>
                   <a14:m>
                     <m:oMathPara xmlns:m="http://schemas.openxmlformats.org/officeDocument/2006/math">
                       <m:oMathParaPr>
@@ -16979,7 +16996,7 @@
               </p:txBody>
             </p:sp>
           </mc:Choice>
-          <mc:Fallback>
+          <mc:Fallback xmlns="">
             <p:sp>
               <p:nvSpPr>
                 <p:cNvPr id="126" name="TextBox 125"/>
@@ -17090,8 +17107,8 @@
             </a:fontRef>
           </p:style>
         </p:cxnSp>
-        <mc:AlternateContent xmlns:mc="http://schemas.openxmlformats.org/markup-compatibility/2006">
-          <mc:Choice xmlns:a14="http://schemas.microsoft.com/office/drawing/2010/main" Requires="a14">
+        <mc:AlternateContent xmlns:mc="http://schemas.openxmlformats.org/markup-compatibility/2006" xmlns:a14="http://schemas.microsoft.com/office/drawing/2010/main">
+          <mc:Choice Requires="a14">
             <p:sp>
               <p:nvSpPr>
                 <p:cNvPr id="137" name="TextBox 136"/>
@@ -17114,6 +17131,7 @@
                 </a:bodyPr>
                 <a:lstStyle/>
                 <a:p>
+                  <a:pPr/>
                   <a14:m>
                     <m:oMathPara xmlns:m="http://schemas.openxmlformats.org/officeDocument/2006/math">
                       <m:oMathParaPr>
@@ -17138,7 +17156,7 @@
               </p:txBody>
             </p:sp>
           </mc:Choice>
-          <mc:Fallback>
+          <mc:Fallback xmlns="">
             <p:sp>
               <p:nvSpPr>
                 <p:cNvPr id="137" name="TextBox 136"/>
@@ -17177,8 +17195,8 @@
             </p:sp>
           </mc:Fallback>
         </mc:AlternateContent>
-        <mc:AlternateContent xmlns:mc="http://schemas.openxmlformats.org/markup-compatibility/2006">
-          <mc:Choice xmlns:a14="http://schemas.microsoft.com/office/drawing/2010/main" Requires="a14">
+        <mc:AlternateContent xmlns:mc="http://schemas.openxmlformats.org/markup-compatibility/2006" xmlns:a14="http://schemas.microsoft.com/office/drawing/2010/main">
+          <mc:Choice Requires="a14">
             <p:sp>
               <p:nvSpPr>
                 <p:cNvPr id="138" name="TextBox 137"/>
@@ -17201,6 +17219,7 @@
                 </a:bodyPr>
                 <a:lstStyle/>
                 <a:p>
+                  <a:pPr/>
                   <a14:m>
                     <m:oMathPara xmlns:m="http://schemas.openxmlformats.org/officeDocument/2006/math">
                       <m:oMathParaPr>
@@ -17225,7 +17244,7 @@
               </p:txBody>
             </p:sp>
           </mc:Choice>
-          <mc:Fallback>
+          <mc:Fallback xmlns="">
             <p:sp>
               <p:nvSpPr>
                 <p:cNvPr id="138" name="TextBox 137"/>
@@ -17399,8 +17418,8 @@
                   </a:p>
                 </p:txBody>
               </p:sp>
-              <mc:AlternateContent xmlns:mc="http://schemas.openxmlformats.org/markup-compatibility/2006">
-                <mc:Choice xmlns:a14="http://schemas.microsoft.com/office/drawing/2010/main" Requires="a14">
+              <mc:AlternateContent xmlns:mc="http://schemas.openxmlformats.org/markup-compatibility/2006" xmlns:a14="http://schemas.microsoft.com/office/drawing/2010/main">
+                <mc:Choice Requires="a14">
                   <p:sp>
                     <p:nvSpPr>
                       <p:cNvPr id="18" name="TextBox 17"/>
@@ -17461,7 +17480,7 @@
                     </p:txBody>
                   </p:sp>
                 </mc:Choice>
-                <mc:Fallback>
+                <mc:Fallback xmlns="">
                   <p:sp>
                     <p:nvSpPr>
                       <p:cNvPr id="18" name="TextBox 17"/>
@@ -17537,8 +17556,8 @@
                 </a:fontRef>
               </p:style>
             </p:cxnSp>
-            <mc:AlternateContent xmlns:mc="http://schemas.openxmlformats.org/markup-compatibility/2006">
-              <mc:Choice xmlns:a14="http://schemas.microsoft.com/office/drawing/2010/main" Requires="a14">
+            <mc:AlternateContent xmlns:mc="http://schemas.openxmlformats.org/markup-compatibility/2006" xmlns:a14="http://schemas.microsoft.com/office/drawing/2010/main">
+              <mc:Choice Requires="a14">
                 <p:sp>
                   <p:nvSpPr>
                     <p:cNvPr id="7" name="TextBox 6"/>
@@ -17599,7 +17618,7 @@
                   </p:txBody>
                 </p:sp>
               </mc:Choice>
-              <mc:Fallback>
+              <mc:Fallback xmlns="">
                 <p:sp>
                   <p:nvSpPr>
                     <p:cNvPr id="7" name="TextBox 6"/>
@@ -17685,8 +17704,8 @@
               </a:p>
             </p:txBody>
           </p:sp>
-          <mc:AlternateContent xmlns:mc="http://schemas.openxmlformats.org/markup-compatibility/2006">
-            <mc:Choice xmlns:a14="http://schemas.microsoft.com/office/drawing/2010/main" Requires="a14">
+          <mc:AlternateContent xmlns:mc="http://schemas.openxmlformats.org/markup-compatibility/2006" xmlns:a14="http://schemas.microsoft.com/office/drawing/2010/main">
+            <mc:Choice Requires="a14">
               <p:sp>
                 <p:nvSpPr>
                   <p:cNvPr id="25" name="TextBox 24"/>
@@ -17709,6 +17728,7 @@
                   </a:bodyPr>
                   <a:lstStyle/>
                   <a:p>
+                    <a:pPr/>
                     <a14:m>
                       <m:oMathPara xmlns:m="http://schemas.openxmlformats.org/officeDocument/2006/math">
                         <m:oMathParaPr>
@@ -17733,7 +17753,7 @@
                 </p:txBody>
               </p:sp>
             </mc:Choice>
-            <mc:Fallback>
+            <mc:Fallback xmlns="">
               <p:sp>
                 <p:nvSpPr>
                   <p:cNvPr id="25" name="TextBox 24"/>
@@ -18300,8 +18320,8 @@
               </a:fontRef>
             </p:style>
           </p:cxnSp>
-          <mc:AlternateContent xmlns:mc="http://schemas.openxmlformats.org/markup-compatibility/2006">
-            <mc:Choice xmlns:a14="http://schemas.microsoft.com/office/drawing/2010/main" Requires="a14">
+          <mc:AlternateContent xmlns:mc="http://schemas.openxmlformats.org/markup-compatibility/2006" xmlns:a14="http://schemas.microsoft.com/office/drawing/2010/main">
+            <mc:Choice Requires="a14">
               <p:sp>
                 <p:nvSpPr>
                   <p:cNvPr id="37" name="TextBox 36"/>
@@ -18362,7 +18382,7 @@
                 </p:txBody>
               </p:sp>
             </mc:Choice>
-            <mc:Fallback>
+            <mc:Fallback xmlns="">
               <p:sp>
                 <p:nvSpPr>
                   <p:cNvPr id="37" name="TextBox 36"/>
@@ -18509,8 +18529,8 @@
               </a:fontRef>
             </p:style>
           </p:cxnSp>
-          <mc:AlternateContent xmlns:mc="http://schemas.openxmlformats.org/markup-compatibility/2006">
-            <mc:Choice xmlns:a14="http://schemas.microsoft.com/office/drawing/2010/main" Requires="a14">
+          <mc:AlternateContent xmlns:mc="http://schemas.openxmlformats.org/markup-compatibility/2006" xmlns:a14="http://schemas.microsoft.com/office/drawing/2010/main">
+            <mc:Choice Requires="a14">
               <p:sp>
                 <p:nvSpPr>
                   <p:cNvPr id="59" name="TextBox 58"/>
@@ -18533,6 +18553,7 @@
                   </a:bodyPr>
                   <a:lstStyle/>
                   <a:p>
+                    <a:pPr/>
                     <a14:m>
                       <m:oMathPara xmlns:m="http://schemas.openxmlformats.org/officeDocument/2006/math">
                         <m:oMathParaPr>
@@ -18591,7 +18612,7 @@
                 </p:txBody>
               </p:sp>
             </mc:Choice>
-            <mc:Fallback>
+            <mc:Fallback xmlns="">
               <p:sp>
                 <p:nvSpPr>
                   <p:cNvPr id="59" name="TextBox 58"/>
@@ -18630,8 +18651,8 @@
               </p:sp>
             </mc:Fallback>
           </mc:AlternateContent>
-          <mc:AlternateContent xmlns:mc="http://schemas.openxmlformats.org/markup-compatibility/2006">
-            <mc:Choice xmlns:a14="http://schemas.microsoft.com/office/drawing/2010/main" Requires="a14">
+          <mc:AlternateContent xmlns:mc="http://schemas.openxmlformats.org/markup-compatibility/2006" xmlns:a14="http://schemas.microsoft.com/office/drawing/2010/main">
+            <mc:Choice Requires="a14">
               <p:sp>
                 <p:nvSpPr>
                   <p:cNvPr id="60" name="TextBox 59"/>
@@ -18654,6 +18675,7 @@
                   </a:bodyPr>
                   <a:lstStyle/>
                   <a:p>
+                    <a:pPr/>
                     <a14:m>
                       <m:oMathPara xmlns:m="http://schemas.openxmlformats.org/officeDocument/2006/math">
                         <m:oMathParaPr>
@@ -18712,7 +18734,7 @@
                 </p:txBody>
               </p:sp>
             </mc:Choice>
-            <mc:Fallback>
+            <mc:Fallback xmlns="">
               <p:sp>
                 <p:nvSpPr>
                   <p:cNvPr id="60" name="TextBox 59"/>
@@ -18751,8 +18773,8 @@
               </p:sp>
             </mc:Fallback>
           </mc:AlternateContent>
-          <mc:AlternateContent xmlns:mc="http://schemas.openxmlformats.org/markup-compatibility/2006">
-            <mc:Choice xmlns:a14="http://schemas.microsoft.com/office/drawing/2010/main" Requires="a14">
+          <mc:AlternateContent xmlns:mc="http://schemas.openxmlformats.org/markup-compatibility/2006" xmlns:a14="http://schemas.microsoft.com/office/drawing/2010/main">
+            <mc:Choice Requires="a14">
               <p:sp>
                 <p:nvSpPr>
                   <p:cNvPr id="61" name="TextBox 60"/>
@@ -18775,6 +18797,7 @@
                   </a:bodyPr>
                   <a:lstStyle/>
                   <a:p>
+                    <a:pPr/>
                     <a14:m>
                       <m:oMathPara xmlns:m="http://schemas.openxmlformats.org/officeDocument/2006/math">
                         <m:oMathParaPr>
@@ -18812,7 +18835,7 @@
                 </p:txBody>
               </p:sp>
             </mc:Choice>
-            <mc:Fallback>
+            <mc:Fallback xmlns="">
               <p:sp>
                 <p:nvSpPr>
                   <p:cNvPr id="61" name="TextBox 60"/>
@@ -18887,8 +18910,8 @@
               </a:fontRef>
             </p:style>
           </p:cxnSp>
-          <mc:AlternateContent xmlns:mc="http://schemas.openxmlformats.org/markup-compatibility/2006">
-            <mc:Choice xmlns:a14="http://schemas.microsoft.com/office/drawing/2010/main" Requires="a14">
+          <mc:AlternateContent xmlns:mc="http://schemas.openxmlformats.org/markup-compatibility/2006" xmlns:a14="http://schemas.microsoft.com/office/drawing/2010/main">
+            <mc:Choice Requires="a14">
               <p:sp>
                 <p:nvSpPr>
                   <p:cNvPr id="63" name="TextBox 62"/>
@@ -18911,6 +18934,7 @@
                   </a:bodyPr>
                   <a:lstStyle/>
                   <a:p>
+                    <a:pPr/>
                     <a14:m>
                       <m:oMathPara xmlns:m="http://schemas.openxmlformats.org/officeDocument/2006/math">
                         <m:oMathParaPr>
@@ -18935,7 +18959,7 @@
                 </p:txBody>
               </p:sp>
             </mc:Choice>
-            <mc:Fallback>
+            <mc:Fallback xmlns="">
               <p:sp>
                 <p:nvSpPr>
                   <p:cNvPr id="63" name="TextBox 62"/>
@@ -19011,8 +19035,8 @@
             </a:fontRef>
           </p:style>
         </p:cxnSp>
-        <mc:AlternateContent xmlns:mc="http://schemas.openxmlformats.org/markup-compatibility/2006">
-          <mc:Choice xmlns:a14="http://schemas.microsoft.com/office/drawing/2010/main" Requires="a14">
+        <mc:AlternateContent xmlns:mc="http://schemas.openxmlformats.org/markup-compatibility/2006" xmlns:a14="http://schemas.microsoft.com/office/drawing/2010/main">
+          <mc:Choice Requires="a14">
             <p:sp>
               <p:nvSpPr>
                 <p:cNvPr id="66" name="TextBox 65"/>
@@ -19073,7 +19097,7 @@
               </p:txBody>
             </p:sp>
           </mc:Choice>
-          <mc:Fallback>
+          <mc:Fallback xmlns="">
             <p:sp>
               <p:nvSpPr>
                 <p:cNvPr id="66" name="TextBox 65"/>
@@ -19094,6 +19118,1268 @@
                   <a:blip r:embed="rId35"/>
                   <a:stretch>
                     <a:fillRect l="-23684" t="-34483" r="-92105" b="-8621"/>
+                  </a:stretch>
+                </a:blipFill>
+              </p:spPr>
+              <p:txBody>
+                <a:bodyPr/>
+                <a:lstStyle/>
+                <a:p>
+                  <a:r>
+                    <a:rPr lang="en-US">
+                      <a:noFill/>
+                    </a:rPr>
+                    <a:t> </a:t>
+                  </a:r>
+                </a:p>
+              </p:txBody>
+            </p:sp>
+          </mc:Fallback>
+        </mc:AlternateContent>
+      </p:grpSp>
+      <p:grpSp>
+        <p:nvGrpSpPr>
+          <p:cNvPr id="24" name="Group 23"/>
+          <p:cNvGrpSpPr/>
+          <p:nvPr/>
+        </p:nvGrpSpPr>
+        <p:grpSpPr>
+          <a:xfrm>
+            <a:off x="603160" y="3935497"/>
+            <a:ext cx="3085370" cy="2488590"/>
+            <a:chOff x="603160" y="3935497"/>
+            <a:chExt cx="3085370" cy="2488590"/>
+          </a:xfrm>
+        </p:grpSpPr>
+        <p:grpSp>
+          <p:nvGrpSpPr>
+            <p:cNvPr id="40" name="Group 39"/>
+            <p:cNvGrpSpPr/>
+            <p:nvPr/>
+          </p:nvGrpSpPr>
+          <p:grpSpPr>
+            <a:xfrm>
+              <a:off x="603160" y="4277771"/>
+              <a:ext cx="2224718" cy="2146316"/>
+              <a:chOff x="1129904" y="708040"/>
+              <a:chExt cx="2224718" cy="2146316"/>
+            </a:xfrm>
+          </p:grpSpPr>
+          <p:grpSp>
+            <p:nvGrpSpPr>
+              <p:cNvPr id="53" name="Group 52"/>
+              <p:cNvGrpSpPr/>
+              <p:nvPr/>
+            </p:nvGrpSpPr>
+            <p:grpSpPr>
+              <a:xfrm>
+                <a:off x="1163211" y="708040"/>
+                <a:ext cx="2191411" cy="2146316"/>
+                <a:chOff x="1190506" y="680744"/>
+                <a:chExt cx="2191411" cy="2146316"/>
+              </a:xfrm>
+            </p:grpSpPr>
+            <p:cxnSp>
+              <p:nvCxnSpPr>
+                <p:cNvPr id="55" name="Straight Arrow Connector 54"/>
+                <p:cNvCxnSpPr/>
+                <p:nvPr/>
+              </p:nvCxnSpPr>
+              <p:spPr>
+                <a:xfrm flipV="1">
+                  <a:off x="1516583" y="680744"/>
+                  <a:ext cx="7684" cy="1859536"/>
+                </a:xfrm>
+                <a:prstGeom prst="straightConnector1">
+                  <a:avLst/>
+                </a:prstGeom>
+                <a:ln w="38100">
+                  <a:solidFill>
+                    <a:schemeClr val="tx1"/>
+                  </a:solidFill>
+                  <a:tailEnd type="triangle"/>
+                </a:ln>
+              </p:spPr>
+              <p:style>
+                <a:lnRef idx="1">
+                  <a:schemeClr val="accent1"/>
+                </a:lnRef>
+                <a:fillRef idx="0">
+                  <a:schemeClr val="accent1"/>
+                </a:fillRef>
+                <a:effectRef idx="0">
+                  <a:schemeClr val="accent1"/>
+                </a:effectRef>
+                <a:fontRef idx="minor">
+                  <a:schemeClr val="tx1"/>
+                </a:fontRef>
+              </p:style>
+            </p:cxnSp>
+            <p:cxnSp>
+              <p:nvCxnSpPr>
+                <p:cNvPr id="56" name="Straight Arrow Connector 55"/>
+                <p:cNvCxnSpPr/>
+                <p:nvPr/>
+              </p:nvCxnSpPr>
+              <p:spPr>
+                <a:xfrm flipV="1">
+                  <a:off x="1507013" y="2535259"/>
+                  <a:ext cx="1874904" cy="1"/>
+                </a:xfrm>
+                <a:prstGeom prst="straightConnector1">
+                  <a:avLst/>
+                </a:prstGeom>
+                <a:ln w="38100">
+                  <a:solidFill>
+                    <a:schemeClr val="tx1"/>
+                  </a:solidFill>
+                  <a:tailEnd type="triangle"/>
+                </a:ln>
+              </p:spPr>
+              <p:style>
+                <a:lnRef idx="1">
+                  <a:schemeClr val="accent1"/>
+                </a:lnRef>
+                <a:fillRef idx="0">
+                  <a:schemeClr val="accent1"/>
+                </a:fillRef>
+                <a:effectRef idx="0">
+                  <a:schemeClr val="accent1"/>
+                </a:effectRef>
+                <a:fontRef idx="minor">
+                  <a:schemeClr val="tx1"/>
+                </a:fontRef>
+              </p:style>
+            </p:cxnSp>
+            <mc:AlternateContent xmlns:mc="http://schemas.openxmlformats.org/markup-compatibility/2006" xmlns:a14="http://schemas.microsoft.com/office/drawing/2010/main">
+              <mc:Choice Requires="a14">
+                <p:sp>
+                  <p:nvSpPr>
+                    <p:cNvPr id="68" name="Rectangle 67"/>
+                    <p:cNvSpPr/>
+                    <p:nvPr/>
+                  </p:nvSpPr>
+                  <p:spPr>
+                    <a:xfrm>
+                      <a:off x="2897675" y="2457728"/>
+                      <a:ext cx="367985" cy="369332"/>
+                    </a:xfrm>
+                    <a:prstGeom prst="rect">
+                      <a:avLst/>
+                    </a:prstGeom>
+                  </p:spPr>
+                  <p:txBody>
+                    <a:bodyPr wrap="none">
+                      <a:spAutoFit/>
+                    </a:bodyPr>
+                    <a:lstStyle/>
+                    <a:p>
+                      <a:pPr/>
+                      <a14:m>
+                        <m:oMathPara xmlns:m="http://schemas.openxmlformats.org/officeDocument/2006/math">
+                          <m:oMathParaPr>
+                            <m:jc m:val="centerGroup"/>
+                          </m:oMathParaPr>
+                          <m:oMath xmlns:m="http://schemas.openxmlformats.org/officeDocument/2006/math">
+                            <m:r>
+                              <a:rPr lang="en-US" i="1">
+                                <a:latin typeface="Cambria Math" panose="02040503050406030204" pitchFamily="18" charset="0"/>
+                                <a:cs typeface="Arial" panose="020B0604020202020204" pitchFamily="34" charset="0"/>
+                              </a:rPr>
+                              <m:t>𝑥</m:t>
+                            </m:r>
+                          </m:oMath>
+                        </m:oMathPara>
+                      </a14:m>
+                      <a:endParaRPr lang="en-CA" dirty="0"/>
+                    </a:p>
+                  </p:txBody>
+                </p:sp>
+              </mc:Choice>
+              <mc:Fallback xmlns="">
+                <p:sp>
+                  <p:nvSpPr>
+                    <p:cNvPr id="12" name="Rectangle 11"/>
+                    <p:cNvSpPr>
+                      <a:spLocks noRot="1" noChangeAspect="1" noMove="1" noResize="1" noEditPoints="1" noAdjustHandles="1" noChangeArrowheads="1" noChangeShapeType="1" noTextEdit="1"/>
+                    </p:cNvSpPr>
+                    <p:nvPr/>
+                  </p:nvSpPr>
+                  <p:spPr>
+                    <a:xfrm>
+                      <a:off x="2897675" y="2457728"/>
+                      <a:ext cx="367985" cy="369332"/>
+                    </a:xfrm>
+                    <a:prstGeom prst="rect">
+                      <a:avLst/>
+                    </a:prstGeom>
+                    <a:blipFill rotWithShape="0">
+                      <a:blip r:embed="rId36"/>
+                      <a:stretch>
+                        <a:fillRect/>
+                      </a:stretch>
+                    </a:blipFill>
+                  </p:spPr>
+                  <p:txBody>
+                    <a:bodyPr/>
+                    <a:lstStyle/>
+                    <a:p>
+                      <a:r>
+                        <a:rPr lang="en-CA">
+                          <a:noFill/>
+                        </a:rPr>
+                        <a:t> </a:t>
+                      </a:r>
+                    </a:p>
+                  </p:txBody>
+                </p:sp>
+              </mc:Fallback>
+            </mc:AlternateContent>
+            <mc:AlternateContent xmlns:mc="http://schemas.openxmlformats.org/markup-compatibility/2006" xmlns:a14="http://schemas.microsoft.com/office/drawing/2010/main">
+              <mc:Choice Requires="a14">
+                <p:sp>
+                  <p:nvSpPr>
+                    <p:cNvPr id="69" name="Rectangle 68"/>
+                    <p:cNvSpPr/>
+                    <p:nvPr/>
+                  </p:nvSpPr>
+                  <p:spPr>
+                    <a:xfrm>
+                      <a:off x="1190506" y="790545"/>
+                      <a:ext cx="371384" cy="369332"/>
+                    </a:xfrm>
+                    <a:prstGeom prst="rect">
+                      <a:avLst/>
+                    </a:prstGeom>
+                  </p:spPr>
+                  <p:txBody>
+                    <a:bodyPr wrap="none">
+                      <a:spAutoFit/>
+                    </a:bodyPr>
+                    <a:lstStyle/>
+                    <a:p>
+                      <a:pPr/>
+                      <a14:m>
+                        <m:oMathPara xmlns:m="http://schemas.openxmlformats.org/officeDocument/2006/math">
+                          <m:oMathParaPr>
+                            <m:jc m:val="centerGroup"/>
+                          </m:oMathParaPr>
+                          <m:oMath xmlns:m="http://schemas.openxmlformats.org/officeDocument/2006/math">
+                            <m:r>
+                              <a:rPr lang="en-US" b="0" i="1" smtClean="0">
+                                <a:latin typeface="Cambria Math" panose="02040503050406030204" pitchFamily="18" charset="0"/>
+                              </a:rPr>
+                              <m:t>𝑦</m:t>
+                            </m:r>
+                          </m:oMath>
+                        </m:oMathPara>
+                      </a14:m>
+                      <a:endParaRPr lang="en-CA" dirty="0"/>
+                    </a:p>
+                  </p:txBody>
+                </p:sp>
+              </mc:Choice>
+              <mc:Fallback xmlns="">
+                <p:sp>
+                  <p:nvSpPr>
+                    <p:cNvPr id="13" name="Rectangle 12"/>
+                    <p:cNvSpPr>
+                      <a:spLocks noRot="1" noChangeAspect="1" noMove="1" noResize="1" noEditPoints="1" noAdjustHandles="1" noChangeArrowheads="1" noChangeShapeType="1" noTextEdit="1"/>
+                    </p:cNvSpPr>
+                    <p:nvPr/>
+                  </p:nvSpPr>
+                  <p:spPr>
+                    <a:xfrm>
+                      <a:off x="1190506" y="790545"/>
+                      <a:ext cx="371384" cy="369332"/>
+                    </a:xfrm>
+                    <a:prstGeom prst="rect">
+                      <a:avLst/>
+                    </a:prstGeom>
+                    <a:blipFill rotWithShape="0">
+                      <a:blip r:embed="rId37"/>
+                      <a:stretch>
+                        <a:fillRect b="-6557"/>
+                      </a:stretch>
+                    </a:blipFill>
+                  </p:spPr>
+                  <p:txBody>
+                    <a:bodyPr/>
+                    <a:lstStyle/>
+                    <a:p>
+                      <a:r>
+                        <a:rPr lang="en-CA">
+                          <a:noFill/>
+                        </a:rPr>
+                        <a:t> </a:t>
+                      </a:r>
+                    </a:p>
+                  </p:txBody>
+                </p:sp>
+              </mc:Fallback>
+            </mc:AlternateContent>
+            <mc:AlternateContent xmlns:mc="http://schemas.openxmlformats.org/markup-compatibility/2006" xmlns:a14="http://schemas.microsoft.com/office/drawing/2010/main">
+              <mc:Choice Requires="a14">
+                <p:sp>
+                  <p:nvSpPr>
+                    <p:cNvPr id="70" name="Rectangle 69"/>
+                    <p:cNvSpPr/>
+                    <p:nvPr/>
+                  </p:nvSpPr>
+                  <p:spPr>
+                    <a:xfrm>
+                      <a:off x="1205483" y="2447020"/>
+                      <a:ext cx="367985" cy="369332"/>
+                    </a:xfrm>
+                    <a:prstGeom prst="rect">
+                      <a:avLst/>
+                    </a:prstGeom>
+                  </p:spPr>
+                  <p:txBody>
+                    <a:bodyPr wrap="none">
+                      <a:spAutoFit/>
+                    </a:bodyPr>
+                    <a:lstStyle/>
+                    <a:p>
+                      <a:pPr/>
+                      <a14:m>
+                        <m:oMathPara xmlns:m="http://schemas.openxmlformats.org/officeDocument/2006/math">
+                          <m:oMathParaPr>
+                            <m:jc m:val="centerGroup"/>
+                          </m:oMathParaPr>
+                          <m:oMath xmlns:m="http://schemas.openxmlformats.org/officeDocument/2006/math">
+                            <m:r>
+                              <a:rPr lang="en-US" b="0" i="1" smtClean="0">
+                                <a:latin typeface="Cambria Math" panose="02040503050406030204" pitchFamily="18" charset="0"/>
+                                <a:cs typeface="Arial" panose="020B0604020202020204" pitchFamily="34" charset="0"/>
+                              </a:rPr>
+                              <m:t>0</m:t>
+                            </m:r>
+                          </m:oMath>
+                        </m:oMathPara>
+                      </a14:m>
+                      <a:endParaRPr lang="en-CA" dirty="0"/>
+                    </a:p>
+                  </p:txBody>
+                </p:sp>
+              </mc:Choice>
+              <mc:Fallback xmlns="">
+                <p:sp>
+                  <p:nvSpPr>
+                    <p:cNvPr id="14" name="Rectangle 13"/>
+                    <p:cNvSpPr>
+                      <a:spLocks noRot="1" noChangeAspect="1" noMove="1" noResize="1" noEditPoints="1" noAdjustHandles="1" noChangeArrowheads="1" noChangeShapeType="1" noTextEdit="1"/>
+                    </p:cNvSpPr>
+                    <p:nvPr/>
+                  </p:nvSpPr>
+                  <p:spPr>
+                    <a:xfrm>
+                      <a:off x="1205483" y="2447020"/>
+                      <a:ext cx="367985" cy="369332"/>
+                    </a:xfrm>
+                    <a:prstGeom prst="rect">
+                      <a:avLst/>
+                    </a:prstGeom>
+                    <a:blipFill rotWithShape="0">
+                      <a:blip r:embed="rId38"/>
+                      <a:stretch>
+                        <a:fillRect/>
+                      </a:stretch>
+                    </a:blipFill>
+                  </p:spPr>
+                  <p:txBody>
+                    <a:bodyPr/>
+                    <a:lstStyle/>
+                    <a:p>
+                      <a:r>
+                        <a:rPr lang="en-CA">
+                          <a:noFill/>
+                        </a:rPr>
+                        <a:t> </a:t>
+                      </a:r>
+                    </a:p>
+                  </p:txBody>
+                </p:sp>
+              </mc:Fallback>
+            </mc:AlternateContent>
+          </p:grpSp>
+          <p:sp>
+            <p:nvSpPr>
+              <p:cNvPr id="54" name="Rectangle 53"/>
+              <p:cNvSpPr/>
+              <p:nvPr/>
+            </p:nvSpPr>
+            <p:spPr>
+              <a:xfrm>
+                <a:off x="1129904" y="1614682"/>
+                <a:ext cx="184731" cy="369332"/>
+              </a:xfrm>
+              <a:prstGeom prst="rect">
+                <a:avLst/>
+              </a:prstGeom>
+            </p:spPr>
+            <p:txBody>
+              <a:bodyPr wrap="none">
+                <a:spAutoFit/>
+              </a:bodyPr>
+              <a:lstStyle/>
+              <a:p>
+                <a:endParaRPr lang="en-CA" dirty="0"/>
+              </a:p>
+            </p:txBody>
+          </p:sp>
+        </p:grpSp>
+        <p:sp>
+          <p:nvSpPr>
+            <p:cNvPr id="42" name="Oval 41"/>
+            <p:cNvSpPr/>
+            <p:nvPr/>
+          </p:nvSpPr>
+          <p:spPr>
+            <a:xfrm>
+              <a:off x="1224682" y="5655603"/>
+              <a:ext cx="120943" cy="119766"/>
+            </a:xfrm>
+            <a:prstGeom prst="ellipse">
+              <a:avLst/>
+            </a:prstGeom>
+            <a:solidFill>
+              <a:schemeClr val="tx1"/>
+            </a:solidFill>
+            <a:ln w="38100">
+              <a:solidFill>
+                <a:schemeClr val="tx1"/>
+              </a:solidFill>
+            </a:ln>
+          </p:spPr>
+          <p:style>
+            <a:lnRef idx="2">
+              <a:schemeClr val="accent1">
+                <a:shade val="50000"/>
+              </a:schemeClr>
+            </a:lnRef>
+            <a:fillRef idx="1">
+              <a:schemeClr val="accent1"/>
+            </a:fillRef>
+            <a:effectRef idx="0">
+              <a:schemeClr val="accent1"/>
+            </a:effectRef>
+            <a:fontRef idx="minor">
+              <a:schemeClr val="lt1"/>
+            </a:fontRef>
+          </p:style>
+          <p:txBody>
+            <a:bodyPr rtlCol="0" anchor="ctr"/>
+            <a:lstStyle/>
+            <a:p>
+              <a:pPr algn="ctr"/>
+              <a:endParaRPr lang="en-US"/>
+            </a:p>
+          </p:txBody>
+        </p:sp>
+        <p:sp>
+          <p:nvSpPr>
+            <p:cNvPr id="44" name="Oval 43"/>
+            <p:cNvSpPr/>
+            <p:nvPr/>
+          </p:nvSpPr>
+          <p:spPr>
+            <a:xfrm>
+              <a:off x="3105847" y="4278957"/>
+              <a:ext cx="120943" cy="119766"/>
+            </a:xfrm>
+            <a:prstGeom prst="ellipse">
+              <a:avLst/>
+            </a:prstGeom>
+            <a:solidFill>
+              <a:schemeClr val="tx1"/>
+            </a:solidFill>
+            <a:ln w="38100">
+              <a:solidFill>
+                <a:schemeClr val="tx1"/>
+              </a:solidFill>
+            </a:ln>
+          </p:spPr>
+          <p:style>
+            <a:lnRef idx="2">
+              <a:schemeClr val="accent1">
+                <a:shade val="50000"/>
+              </a:schemeClr>
+            </a:lnRef>
+            <a:fillRef idx="1">
+              <a:schemeClr val="accent1"/>
+            </a:fillRef>
+            <a:effectRef idx="0">
+              <a:schemeClr val="accent1"/>
+            </a:effectRef>
+            <a:fontRef idx="minor">
+              <a:schemeClr val="lt1"/>
+            </a:fontRef>
+          </p:style>
+          <p:txBody>
+            <a:bodyPr rtlCol="0" anchor="ctr"/>
+            <a:lstStyle/>
+            <a:p>
+              <a:pPr algn="ctr"/>
+              <a:endParaRPr lang="en-US"/>
+            </a:p>
+          </p:txBody>
+        </p:sp>
+        <mc:AlternateContent xmlns:mc="http://schemas.openxmlformats.org/markup-compatibility/2006">
+          <mc:Choice xmlns:a14="http://schemas.microsoft.com/office/drawing/2010/main" Requires="a14">
+            <p:sp>
+              <p:nvSpPr>
+                <p:cNvPr id="46" name="TextBox 45"/>
+                <p:cNvSpPr txBox="1"/>
+                <p:nvPr/>
+              </p:nvSpPr>
+              <p:spPr>
+                <a:xfrm>
+                  <a:off x="1345506" y="5762027"/>
+                  <a:ext cx="234936" cy="307777"/>
+                </a:xfrm>
+                <a:prstGeom prst="rect">
+                  <a:avLst/>
+                </a:prstGeom>
+                <a:noFill/>
+              </p:spPr>
+              <p:txBody>
+                <a:bodyPr wrap="none" lIns="0" tIns="0" rIns="0" bIns="0" rtlCol="0">
+                  <a:spAutoFit/>
+                </a:bodyPr>
+                <a:lstStyle/>
+                <a:p>
+                  <a:pPr/>
+                  <a14:m>
+                    <m:oMathPara xmlns:m="http://schemas.openxmlformats.org/officeDocument/2006/math">
+                      <m:oMathParaPr>
+                        <m:jc m:val="centerGroup"/>
+                      </m:oMathParaPr>
+                      <m:oMath xmlns:m="http://schemas.openxmlformats.org/officeDocument/2006/math">
+                        <m:r>
+                          <a:rPr lang="en-US" sz="2000" b="0" i="1" smtClean="0">
+                            <a:latin typeface="Cambria Math" panose="02040503050406030204" pitchFamily="18" charset="0"/>
+                            <a:cs typeface="Arial" panose="020B0604020202020204" pitchFamily="34" charset="0"/>
+                          </a:rPr>
+                          <m:t>𝐴</m:t>
+                        </m:r>
+                      </m:oMath>
+                    </m:oMathPara>
+                  </a14:m>
+                  <a:endParaRPr lang="en-US" sz="2000" dirty="0" smtClean="0">
+                    <a:latin typeface="Arial" panose="020B0604020202020204" pitchFamily="34" charset="0"/>
+                    <a:cs typeface="Arial" panose="020B0604020202020204" pitchFamily="34" charset="0"/>
+                  </a:endParaRPr>
+                </a:p>
+              </p:txBody>
+            </p:sp>
+          </mc:Choice>
+          <mc:Fallback>
+            <p:sp>
+              <p:nvSpPr>
+                <p:cNvPr id="46" name="TextBox 45"/>
+                <p:cNvSpPr txBox="1">
+                  <a:spLocks noRot="1" noChangeAspect="1" noMove="1" noResize="1" noEditPoints="1" noAdjustHandles="1" noChangeArrowheads="1" noChangeShapeType="1" noTextEdit="1"/>
+                </p:cNvSpPr>
+                <p:nvPr/>
+              </p:nvSpPr>
+              <p:spPr>
+                <a:xfrm>
+                  <a:off x="1345506" y="5762027"/>
+                  <a:ext cx="234936" cy="307777"/>
+                </a:xfrm>
+                <a:prstGeom prst="rect">
+                  <a:avLst/>
+                </a:prstGeom>
+                <a:blipFill>
+                  <a:blip r:embed="rId39"/>
+                  <a:stretch>
+                    <a:fillRect l="-23684" r="-23684" b="-9804"/>
+                  </a:stretch>
+                </a:blipFill>
+              </p:spPr>
+              <p:txBody>
+                <a:bodyPr/>
+                <a:lstStyle/>
+                <a:p>
+                  <a:r>
+                    <a:rPr lang="en-US">
+                      <a:noFill/>
+                    </a:rPr>
+                    <a:t> </a:t>
+                  </a:r>
+                </a:p>
+              </p:txBody>
+            </p:sp>
+          </mc:Fallback>
+        </mc:AlternateContent>
+        <mc:AlternateContent xmlns:mc="http://schemas.openxmlformats.org/markup-compatibility/2006">
+          <mc:Choice xmlns:a14="http://schemas.microsoft.com/office/drawing/2010/main" Requires="a14">
+            <p:sp>
+              <p:nvSpPr>
+                <p:cNvPr id="47" name="TextBox 46"/>
+                <p:cNvSpPr txBox="1"/>
+                <p:nvPr/>
+              </p:nvSpPr>
+              <p:spPr>
+                <a:xfrm>
+                  <a:off x="3226790" y="3935497"/>
+                  <a:ext cx="245708" cy="307777"/>
+                </a:xfrm>
+                <a:prstGeom prst="rect">
+                  <a:avLst/>
+                </a:prstGeom>
+                <a:noFill/>
+              </p:spPr>
+              <p:txBody>
+                <a:bodyPr wrap="none" lIns="0" tIns="0" rIns="0" bIns="0" rtlCol="0">
+                  <a:spAutoFit/>
+                </a:bodyPr>
+                <a:lstStyle/>
+                <a:p>
+                  <a:pPr/>
+                  <a14:m>
+                    <m:oMathPara xmlns:m="http://schemas.openxmlformats.org/officeDocument/2006/math">
+                      <m:oMathParaPr>
+                        <m:jc m:val="centerGroup"/>
+                      </m:oMathParaPr>
+                      <m:oMath xmlns:m="http://schemas.openxmlformats.org/officeDocument/2006/math">
+                        <m:r>
+                          <a:rPr lang="en-US" sz="2000" b="0" i="1" smtClean="0">
+                            <a:latin typeface="Cambria Math" panose="02040503050406030204" pitchFamily="18" charset="0"/>
+                            <a:cs typeface="Arial" panose="020B0604020202020204" pitchFamily="34" charset="0"/>
+                          </a:rPr>
+                          <m:t>𝐵</m:t>
+                        </m:r>
+                      </m:oMath>
+                    </m:oMathPara>
+                  </a14:m>
+                  <a:endParaRPr lang="en-US" sz="2000" dirty="0" smtClean="0">
+                    <a:latin typeface="Arial" panose="020B0604020202020204" pitchFamily="34" charset="0"/>
+                    <a:cs typeface="Arial" panose="020B0604020202020204" pitchFamily="34" charset="0"/>
+                  </a:endParaRPr>
+                </a:p>
+              </p:txBody>
+            </p:sp>
+          </mc:Choice>
+          <mc:Fallback>
+            <p:sp>
+              <p:nvSpPr>
+                <p:cNvPr id="47" name="TextBox 46"/>
+                <p:cNvSpPr txBox="1">
+                  <a:spLocks noRot="1" noChangeAspect="1" noMove="1" noResize="1" noEditPoints="1" noAdjustHandles="1" noChangeArrowheads="1" noChangeShapeType="1" noTextEdit="1"/>
+                </p:cNvSpPr>
+                <p:nvPr/>
+              </p:nvSpPr>
+              <p:spPr>
+                <a:xfrm>
+                  <a:off x="3226790" y="3935497"/>
+                  <a:ext cx="245708" cy="307777"/>
+                </a:xfrm>
+                <a:prstGeom prst="rect">
+                  <a:avLst/>
+                </a:prstGeom>
+                <a:blipFill>
+                  <a:blip r:embed="rId40"/>
+                  <a:stretch>
+                    <a:fillRect l="-19512" r="-19512" b="-10000"/>
+                  </a:stretch>
+                </a:blipFill>
+              </p:spPr>
+              <p:txBody>
+                <a:bodyPr/>
+                <a:lstStyle/>
+                <a:p>
+                  <a:r>
+                    <a:rPr lang="en-US">
+                      <a:noFill/>
+                    </a:rPr>
+                    <a:t> </a:t>
+                  </a:r>
+                </a:p>
+              </p:txBody>
+            </p:sp>
+          </mc:Fallback>
+        </mc:AlternateContent>
+        <mc:AlternateContent xmlns:mc="http://schemas.openxmlformats.org/markup-compatibility/2006">
+          <mc:Choice xmlns:a14="http://schemas.microsoft.com/office/drawing/2010/main" Requires="a14">
+            <p:sp>
+              <p:nvSpPr>
+                <p:cNvPr id="52" name="TextBox 51"/>
+                <p:cNvSpPr txBox="1"/>
+                <p:nvPr/>
+              </p:nvSpPr>
+              <p:spPr>
+                <a:xfrm>
+                  <a:off x="2189829" y="4157475"/>
+                  <a:ext cx="896912" cy="345159"/>
+                </a:xfrm>
+                <a:prstGeom prst="rect">
+                  <a:avLst/>
+                </a:prstGeom>
+                <a:noFill/>
+              </p:spPr>
+              <p:txBody>
+                <a:bodyPr wrap="none" lIns="0" tIns="0" rIns="0" bIns="0" rtlCol="0">
+                  <a:spAutoFit/>
+                </a:bodyPr>
+                <a:lstStyle/>
+                <a:p>
+                  <a:pPr/>
+                  <a14:m>
+                    <m:oMathPara xmlns:m="http://schemas.openxmlformats.org/officeDocument/2006/math">
+                      <m:oMathParaPr>
+                        <m:jc m:val="centerGroup"/>
+                      </m:oMathParaPr>
+                      <m:oMath xmlns:m="http://schemas.openxmlformats.org/officeDocument/2006/math">
+                        <m:sSup>
+                          <m:sSupPr>
+                            <m:ctrlPr>
+                              <a:rPr lang="en-US" sz="2000" b="0" i="1" smtClean="0">
+                                <a:latin typeface="Cambria Math" panose="02040503050406030204" pitchFamily="18" charset="0"/>
+                                <a:cs typeface="Arial" panose="020B0604020202020204" pitchFamily="34" charset="0"/>
+                              </a:rPr>
+                            </m:ctrlPr>
+                          </m:sSupPr>
+                          <m:e>
+                            <m:acc>
+                              <m:accPr>
+                                <m:chr m:val="⃗"/>
+                                <m:ctrlPr>
+                                  <a:rPr lang="en-US" sz="2000" b="0" i="1" smtClean="0">
+                                    <a:latin typeface="Cambria Math" panose="02040503050406030204" pitchFamily="18" charset="0"/>
+                                    <a:cs typeface="Arial" panose="020B0604020202020204" pitchFamily="34" charset="0"/>
+                                  </a:rPr>
+                                </m:ctrlPr>
+                              </m:accPr>
+                              <m:e>
+                                <m:r>
+                                  <a:rPr lang="en-US" sz="2000" b="0" i="1" smtClean="0">
+                                    <a:latin typeface="Cambria Math" panose="02040503050406030204" pitchFamily="18" charset="0"/>
+                                    <a:cs typeface="Arial" panose="020B0604020202020204" pitchFamily="34" charset="0"/>
+                                  </a:rPr>
+                                  <m:t>𝐹</m:t>
+                                </m:r>
+                              </m:e>
+                            </m:acc>
+                          </m:e>
+                          <m:sup>
+                            <m:r>
+                              <a:rPr lang="en-US" sz="2000" b="0" i="1" smtClean="0">
+                                <a:latin typeface="Cambria Math" panose="02040503050406030204" pitchFamily="18" charset="0"/>
+                                <a:cs typeface="Arial" panose="020B0604020202020204" pitchFamily="34" charset="0"/>
+                              </a:rPr>
+                              <m:t>𝑛𝑒𝑡</m:t>
+                            </m:r>
+                          </m:sup>
+                        </m:sSup>
+                        <m:r>
+                          <a:rPr lang="en-US" sz="2000" b="0" i="1" smtClean="0">
+                            <a:latin typeface="Cambria Math" panose="02040503050406030204" pitchFamily="18" charset="0"/>
+                            <a:cs typeface="Arial" panose="020B0604020202020204" pitchFamily="34" charset="0"/>
+                          </a:rPr>
+                          <m:t>(</m:t>
+                        </m:r>
+                        <m:acc>
+                          <m:accPr>
+                            <m:chr m:val="⃗"/>
+                            <m:ctrlPr>
+                              <a:rPr lang="en-US" sz="2000" b="0" i="1" smtClean="0">
+                                <a:latin typeface="Cambria Math" panose="02040503050406030204" pitchFamily="18" charset="0"/>
+                                <a:cs typeface="Arial" panose="020B0604020202020204" pitchFamily="34" charset="0"/>
+                              </a:rPr>
+                            </m:ctrlPr>
+                          </m:accPr>
+                          <m:e>
+                            <m:r>
+                              <a:rPr lang="en-US" sz="2000" b="0" i="1" smtClean="0">
+                                <a:latin typeface="Cambria Math" panose="02040503050406030204" pitchFamily="18" charset="0"/>
+                                <a:cs typeface="Arial" panose="020B0604020202020204" pitchFamily="34" charset="0"/>
+                              </a:rPr>
+                              <m:t>𝑟</m:t>
+                            </m:r>
+                          </m:e>
+                        </m:acc>
+                        <m:r>
+                          <a:rPr lang="en-US" sz="2000" b="0" i="1" smtClean="0">
+                            <a:latin typeface="Cambria Math" panose="02040503050406030204" pitchFamily="18" charset="0"/>
+                            <a:cs typeface="Arial" panose="020B0604020202020204" pitchFamily="34" charset="0"/>
+                          </a:rPr>
+                          <m:t>)</m:t>
+                        </m:r>
+                      </m:oMath>
+                    </m:oMathPara>
+                  </a14:m>
+                  <a:endParaRPr lang="en-US" sz="2000" dirty="0" smtClean="0">
+                    <a:latin typeface="Arial" panose="020B0604020202020204" pitchFamily="34" charset="0"/>
+                    <a:cs typeface="Arial" panose="020B0604020202020204" pitchFamily="34" charset="0"/>
+                  </a:endParaRPr>
+                </a:p>
+              </p:txBody>
+            </p:sp>
+          </mc:Choice>
+          <mc:Fallback>
+            <p:sp>
+              <p:nvSpPr>
+                <p:cNvPr id="52" name="TextBox 51"/>
+                <p:cNvSpPr txBox="1">
+                  <a:spLocks noRot="1" noChangeAspect="1" noMove="1" noResize="1" noEditPoints="1" noAdjustHandles="1" noChangeArrowheads="1" noChangeShapeType="1" noTextEdit="1"/>
+                </p:cNvSpPr>
+                <p:nvPr/>
+              </p:nvSpPr>
+              <p:spPr>
+                <a:xfrm>
+                  <a:off x="2189829" y="4157475"/>
+                  <a:ext cx="896912" cy="345159"/>
+                </a:xfrm>
+                <a:prstGeom prst="rect">
+                  <a:avLst/>
+                </a:prstGeom>
+                <a:blipFill>
+                  <a:blip r:embed="rId41"/>
+                  <a:stretch>
+                    <a:fillRect l="-5442" t="-33333" r="-31293" b="-33333"/>
+                  </a:stretch>
+                </a:blipFill>
+              </p:spPr>
+              <p:txBody>
+                <a:bodyPr/>
+                <a:lstStyle/>
+                <a:p>
+                  <a:r>
+                    <a:rPr lang="en-US">
+                      <a:noFill/>
+                    </a:rPr>
+                    <a:t> </a:t>
+                  </a:r>
+                </a:p>
+              </p:txBody>
+            </p:sp>
+          </mc:Fallback>
+        </mc:AlternateContent>
+        <p:sp>
+          <p:nvSpPr>
+            <p:cNvPr id="10" name="Freeform 9"/>
+            <p:cNvSpPr/>
+            <p:nvPr/>
+          </p:nvSpPr>
+          <p:spPr>
+            <a:xfrm>
+              <a:off x="1326995" y="4363194"/>
+              <a:ext cx="1847372" cy="1301626"/>
+            </a:xfrm>
+            <a:custGeom>
+              <a:avLst/>
+              <a:gdLst>
+                <a:gd name="connsiteX0" fmla="*/ 0 w 1862254"/>
+                <a:gd name="connsiteY0" fmla="*/ 1293542 h 1293542"/>
+                <a:gd name="connsiteX1" fmla="*/ 412595 w 1862254"/>
+                <a:gd name="connsiteY1" fmla="*/ 680224 h 1293542"/>
+                <a:gd name="connsiteX2" fmla="*/ 1237785 w 1862254"/>
+                <a:gd name="connsiteY2" fmla="*/ 802888 h 1293542"/>
+                <a:gd name="connsiteX3" fmla="*/ 1862254 w 1862254"/>
+                <a:gd name="connsiteY3" fmla="*/ 0 h 1293542"/>
+                <a:gd name="connsiteX4" fmla="*/ 1862254 w 1862254"/>
+                <a:gd name="connsiteY4" fmla="*/ 0 h 1293542"/>
+              </a:gdLst>
+              <a:ahLst/>
+              <a:cxnLst>
+                <a:cxn ang="0">
+                  <a:pos x="connsiteX0" y="connsiteY0"/>
+                </a:cxn>
+                <a:cxn ang="0">
+                  <a:pos x="connsiteX1" y="connsiteY1"/>
+                </a:cxn>
+                <a:cxn ang="0">
+                  <a:pos x="connsiteX2" y="connsiteY2"/>
+                </a:cxn>
+                <a:cxn ang="0">
+                  <a:pos x="connsiteX3" y="connsiteY3"/>
+                </a:cxn>
+                <a:cxn ang="0">
+                  <a:pos x="connsiteX4" y="connsiteY4"/>
+                </a:cxn>
+              </a:cxnLst>
+              <a:rect l="l" t="t" r="r" b="b"/>
+              <a:pathLst>
+                <a:path w="1862254" h="1293542">
+                  <a:moveTo>
+                    <a:pt x="0" y="1293542"/>
+                  </a:moveTo>
+                  <a:cubicBezTo>
+                    <a:pt x="103149" y="1027771"/>
+                    <a:pt x="206298" y="762000"/>
+                    <a:pt x="412595" y="680224"/>
+                  </a:cubicBezTo>
+                  <a:cubicBezTo>
+                    <a:pt x="618892" y="598448"/>
+                    <a:pt x="996175" y="916259"/>
+                    <a:pt x="1237785" y="802888"/>
+                  </a:cubicBezTo>
+                  <a:cubicBezTo>
+                    <a:pt x="1479395" y="689517"/>
+                    <a:pt x="1862254" y="0"/>
+                    <a:pt x="1862254" y="0"/>
+                  </a:cubicBezTo>
+                  <a:lnTo>
+                    <a:pt x="1862254" y="0"/>
+                  </a:lnTo>
+                </a:path>
+              </a:pathLst>
+            </a:custGeom>
+            <a:noFill/>
+            <a:ln w="38100">
+              <a:solidFill>
+                <a:schemeClr val="tx1"/>
+              </a:solidFill>
+            </a:ln>
+          </p:spPr>
+          <p:style>
+            <a:lnRef idx="2">
+              <a:schemeClr val="accent1">
+                <a:shade val="50000"/>
+              </a:schemeClr>
+            </a:lnRef>
+            <a:fillRef idx="1">
+              <a:schemeClr val="accent1"/>
+            </a:fillRef>
+            <a:effectRef idx="0">
+              <a:schemeClr val="accent1"/>
+            </a:effectRef>
+            <a:fontRef idx="minor">
+              <a:schemeClr val="lt1"/>
+            </a:fontRef>
+          </p:style>
+          <p:txBody>
+            <a:bodyPr rtlCol="0" anchor="ctr"/>
+            <a:lstStyle/>
+            <a:p>
+              <a:pPr algn="ctr"/>
+              <a:endParaRPr lang="en-US"/>
+            </a:p>
+          </p:txBody>
+        </p:sp>
+        <p:cxnSp>
+          <p:nvCxnSpPr>
+            <p:cNvPr id="12" name="Straight Arrow Connector 11"/>
+            <p:cNvCxnSpPr/>
+            <p:nvPr/>
+          </p:nvCxnSpPr>
+          <p:spPr>
+            <a:xfrm flipV="1">
+              <a:off x="2446801" y="4572238"/>
+              <a:ext cx="264820" cy="623696"/>
+            </a:xfrm>
+            <a:prstGeom prst="straightConnector1">
+              <a:avLst/>
+            </a:prstGeom>
+            <a:ln w="38100">
+              <a:solidFill>
+                <a:schemeClr val="tx1"/>
+              </a:solidFill>
+              <a:tailEnd type="triangle"/>
+            </a:ln>
+          </p:spPr>
+          <p:style>
+            <a:lnRef idx="1">
+              <a:schemeClr val="accent1"/>
+            </a:lnRef>
+            <a:fillRef idx="0">
+              <a:schemeClr val="accent1"/>
+            </a:fillRef>
+            <a:effectRef idx="0">
+              <a:schemeClr val="accent1"/>
+            </a:effectRef>
+            <a:fontRef idx="minor">
+              <a:schemeClr val="tx1"/>
+            </a:fontRef>
+          </p:style>
+        </p:cxnSp>
+        <p:cxnSp>
+          <p:nvCxnSpPr>
+            <p:cNvPr id="14" name="Straight Arrow Connector 13"/>
+            <p:cNvCxnSpPr/>
+            <p:nvPr/>
+          </p:nvCxnSpPr>
+          <p:spPr>
+            <a:xfrm flipV="1">
+              <a:off x="2446801" y="5190073"/>
+              <a:ext cx="440121" cy="20450"/>
+            </a:xfrm>
+            <a:prstGeom prst="straightConnector1">
+              <a:avLst/>
+            </a:prstGeom>
+            <a:ln w="57150">
+              <a:solidFill>
+                <a:srgbClr val="FF0000"/>
+              </a:solidFill>
+              <a:tailEnd type="triangle"/>
+            </a:ln>
+          </p:spPr>
+          <p:style>
+            <a:lnRef idx="1">
+              <a:schemeClr val="accent1"/>
+            </a:lnRef>
+            <a:fillRef idx="0">
+              <a:schemeClr val="accent1"/>
+            </a:fillRef>
+            <a:effectRef idx="0">
+              <a:schemeClr val="accent1"/>
+            </a:effectRef>
+            <a:fontRef idx="minor">
+              <a:schemeClr val="tx1"/>
+            </a:fontRef>
+          </p:style>
+        </p:cxnSp>
+        <p:sp>
+          <p:nvSpPr>
+            <p:cNvPr id="20" name="Right Arrow 19"/>
+            <p:cNvSpPr/>
+            <p:nvPr/>
+          </p:nvSpPr>
+          <p:spPr>
+            <a:xfrm rot="17580640">
+              <a:off x="3145967" y="4795779"/>
+              <a:ext cx="951311" cy="133815"/>
+            </a:xfrm>
+            <a:prstGeom prst="rightArrow">
+              <a:avLst/>
+            </a:prstGeom>
+            <a:solidFill>
+              <a:schemeClr val="tx1"/>
+            </a:solidFill>
+            <a:ln w="38100">
+              <a:solidFill>
+                <a:schemeClr val="tx1"/>
+              </a:solidFill>
+            </a:ln>
+          </p:spPr>
+          <p:style>
+            <a:lnRef idx="2">
+              <a:schemeClr val="accent1">
+                <a:shade val="50000"/>
+              </a:schemeClr>
+            </a:lnRef>
+            <a:fillRef idx="1">
+              <a:schemeClr val="accent1"/>
+            </a:fillRef>
+            <a:effectRef idx="0">
+              <a:schemeClr val="accent1"/>
+            </a:effectRef>
+            <a:fontRef idx="minor">
+              <a:schemeClr val="lt1"/>
+            </a:fontRef>
+          </p:style>
+          <p:txBody>
+            <a:bodyPr rtlCol="0" anchor="ctr"/>
+            <a:lstStyle/>
+            <a:p>
+              <a:pPr algn="ctr"/>
+              <a:endParaRPr lang="en-US"/>
+            </a:p>
+          </p:txBody>
+        </p:sp>
+        <mc:AlternateContent xmlns:mc="http://schemas.openxmlformats.org/markup-compatibility/2006">
+          <mc:Choice xmlns:a14="http://schemas.microsoft.com/office/drawing/2010/main" Requires="a14">
+            <p:sp>
+              <p:nvSpPr>
+                <p:cNvPr id="21" name="TextBox 20"/>
+                <p:cNvSpPr txBox="1"/>
+                <p:nvPr/>
+              </p:nvSpPr>
+              <p:spPr>
+                <a:xfrm>
+                  <a:off x="3269731" y="4739207"/>
+                  <a:ext cx="219483" cy="307777"/>
+                </a:xfrm>
+                <a:prstGeom prst="rect">
+                  <a:avLst/>
+                </a:prstGeom>
+                <a:noFill/>
+              </p:spPr>
+              <p:txBody>
+                <a:bodyPr wrap="none" lIns="0" tIns="0" rIns="0" bIns="0" rtlCol="0">
+                  <a:spAutoFit/>
+                </a:bodyPr>
+                <a:lstStyle/>
+                <a:p>
+                  <a14:m>
+                    <m:oMathPara xmlns:m="http://schemas.openxmlformats.org/officeDocument/2006/math">
+                      <m:oMathParaPr>
+                        <m:jc m:val="centerGroup"/>
+                      </m:oMathParaPr>
+                      <m:oMath xmlns:m="http://schemas.openxmlformats.org/officeDocument/2006/math">
+                        <m:acc>
+                          <m:accPr>
+                            <m:chr m:val="⃗"/>
+                            <m:ctrlPr>
+                              <a:rPr lang="en-US" sz="2000" b="0" i="1" smtClean="0">
+                                <a:latin typeface="Cambria Math" panose="02040503050406030204" pitchFamily="18" charset="0"/>
+                                <a:cs typeface="Arial" panose="020B0604020202020204" pitchFamily="34" charset="0"/>
+                              </a:rPr>
+                            </m:ctrlPr>
+                          </m:accPr>
+                          <m:e>
+                            <m:r>
+                              <a:rPr lang="en-US" sz="2000" b="0" i="1" smtClean="0">
+                                <a:latin typeface="Cambria Math" panose="02040503050406030204" pitchFamily="18" charset="0"/>
+                                <a:cs typeface="Arial" panose="020B0604020202020204" pitchFamily="34" charset="0"/>
+                              </a:rPr>
+                              <m:t>𝑎</m:t>
+                            </m:r>
+                          </m:e>
+                        </m:acc>
+                      </m:oMath>
+                    </m:oMathPara>
+                  </a14:m>
+                  <a:endParaRPr lang="en-US" sz="2000" dirty="0" smtClean="0">
+                    <a:latin typeface="Arial" panose="020B0604020202020204" pitchFamily="34" charset="0"/>
+                    <a:cs typeface="Arial" panose="020B0604020202020204" pitchFamily="34" charset="0"/>
+                  </a:endParaRPr>
+                </a:p>
+              </p:txBody>
+            </p:sp>
+          </mc:Choice>
+          <mc:Fallback>
+            <p:sp>
+              <p:nvSpPr>
+                <p:cNvPr id="21" name="TextBox 20"/>
+                <p:cNvSpPr txBox="1">
+                  <a:spLocks noRot="1" noChangeAspect="1" noMove="1" noResize="1" noEditPoints="1" noAdjustHandles="1" noChangeArrowheads="1" noChangeShapeType="1" noTextEdit="1"/>
+                </p:cNvSpPr>
+                <p:nvPr/>
+              </p:nvSpPr>
+              <p:spPr>
+                <a:xfrm>
+                  <a:off x="3269731" y="4739207"/>
+                  <a:ext cx="219483" cy="307777"/>
+                </a:xfrm>
+                <a:prstGeom prst="rect">
+                  <a:avLst/>
+                </a:prstGeom>
+                <a:blipFill>
+                  <a:blip r:embed="rId42"/>
+                  <a:stretch>
+                    <a:fillRect l="-19444" t="-33333" r="-94444" b="-5882"/>
+                  </a:stretch>
+                </a:blipFill>
+              </p:spPr>
+              <p:txBody>
+                <a:bodyPr/>
+                <a:lstStyle/>
+                <a:p>
+                  <a:r>
+                    <a:rPr lang="en-US">
+                      <a:noFill/>
+                    </a:rPr>
+                    <a:t> </a:t>
+                  </a:r>
+                </a:p>
+              </p:txBody>
+            </p:sp>
+          </mc:Fallback>
+        </mc:AlternateContent>
+        <mc:AlternateContent xmlns:mc="http://schemas.openxmlformats.org/markup-compatibility/2006">
+          <mc:Choice xmlns:a14="http://schemas.microsoft.com/office/drawing/2010/main" Requires="a14">
+            <p:sp>
+              <p:nvSpPr>
+                <p:cNvPr id="22" name="TextBox 21"/>
+                <p:cNvSpPr txBox="1"/>
+                <p:nvPr/>
+              </p:nvSpPr>
+              <p:spPr>
+                <a:xfrm>
+                  <a:off x="2557536" y="5298762"/>
+                  <a:ext cx="355225" cy="307777"/>
+                </a:xfrm>
+                <a:prstGeom prst="rect">
+                  <a:avLst/>
+                </a:prstGeom>
+                <a:noFill/>
+              </p:spPr>
+              <p:txBody>
+                <a:bodyPr wrap="none" lIns="0" tIns="0" rIns="0" bIns="0" rtlCol="0">
+                  <a:spAutoFit/>
+                </a:bodyPr>
+                <a:lstStyle/>
+                <a:p>
+                  <a14:m>
+                    <m:oMathPara xmlns:m="http://schemas.openxmlformats.org/officeDocument/2006/math">
+                      <m:oMathParaPr>
+                        <m:jc m:val="centerGroup"/>
+                      </m:oMathParaPr>
+                      <m:oMath xmlns:m="http://schemas.openxmlformats.org/officeDocument/2006/math">
+                        <m:r>
+                          <a:rPr lang="en-US" sz="2000" b="0" i="1" smtClean="0">
+                            <a:solidFill>
+                              <a:srgbClr val="FF0000"/>
+                            </a:solidFill>
+                            <a:latin typeface="Cambria Math" panose="02040503050406030204" pitchFamily="18" charset="0"/>
+                            <a:cs typeface="Arial" panose="020B0604020202020204" pitchFamily="34" charset="0"/>
+                          </a:rPr>
+                          <m:t>𝑑</m:t>
+                        </m:r>
+                        <m:acc>
+                          <m:accPr>
+                            <m:chr m:val="⃗"/>
+                            <m:ctrlPr>
+                              <a:rPr lang="en-US" sz="2000" b="0" i="1" smtClean="0">
+                                <a:solidFill>
+                                  <a:srgbClr val="FF0000"/>
+                                </a:solidFill>
+                                <a:latin typeface="Cambria Math" panose="02040503050406030204" pitchFamily="18" charset="0"/>
+                                <a:cs typeface="Arial" panose="020B0604020202020204" pitchFamily="34" charset="0"/>
+                              </a:rPr>
+                            </m:ctrlPr>
+                          </m:accPr>
+                          <m:e>
+                            <m:r>
+                              <a:rPr lang="en-US" sz="2000" b="0" i="1" smtClean="0">
+                                <a:solidFill>
+                                  <a:srgbClr val="FF0000"/>
+                                </a:solidFill>
+                                <a:latin typeface="Cambria Math" panose="02040503050406030204" pitchFamily="18" charset="0"/>
+                                <a:cs typeface="Arial" panose="020B0604020202020204" pitchFamily="34" charset="0"/>
+                              </a:rPr>
+                              <m:t>𝑟</m:t>
+                            </m:r>
+                          </m:e>
+                        </m:acc>
+                      </m:oMath>
+                    </m:oMathPara>
+                  </a14:m>
+                  <a:endParaRPr lang="en-US" sz="2000" dirty="0" smtClean="0">
+                    <a:solidFill>
+                      <a:srgbClr val="FF0000"/>
+                    </a:solidFill>
+                    <a:latin typeface="Arial" panose="020B0604020202020204" pitchFamily="34" charset="0"/>
+                    <a:cs typeface="Arial" panose="020B0604020202020204" pitchFamily="34" charset="0"/>
+                  </a:endParaRPr>
+                </a:p>
+              </p:txBody>
+            </p:sp>
+          </mc:Choice>
+          <mc:Fallback>
+            <p:sp>
+              <p:nvSpPr>
+                <p:cNvPr id="22" name="TextBox 21"/>
+                <p:cNvSpPr txBox="1">
+                  <a:spLocks noRot="1" noChangeAspect="1" noMove="1" noResize="1" noEditPoints="1" noAdjustHandles="1" noChangeArrowheads="1" noChangeShapeType="1" noTextEdit="1"/>
+                </p:cNvSpPr>
+                <p:nvPr/>
+              </p:nvSpPr>
+              <p:spPr>
+                <a:xfrm>
+                  <a:off x="2557536" y="5298762"/>
+                  <a:ext cx="355225" cy="307777"/>
+                </a:xfrm>
+                <a:prstGeom prst="rect">
+                  <a:avLst/>
+                </a:prstGeom>
+                <a:blipFill>
+                  <a:blip r:embed="rId43"/>
+                  <a:stretch>
+                    <a:fillRect l="-15517" t="-33333" r="-96552" b="-9804"/>
                   </a:stretch>
                 </a:blipFill>
               </p:spPr>

</xml_diff>

<commit_message>
Updates and changes to work and energy etc
</commit_message>
<xml_diff>
--- a/tex/figures/WorkEnergy/Figures.pptx
+++ b/tex/figures/WorkEnergy/Figures.pptx
@@ -247,7 +247,7 @@
           <a:p>
             <a:fld id="{F7249F8D-641B-4CAF-BAE5-10524742F6F1}" type="datetimeFigureOut">
               <a:rPr lang="en-CA" smtClean="0"/>
-              <a:t>2018-06-07</a:t>
+              <a:t>2018-06-08</a:t>
             </a:fld>
             <a:endParaRPr lang="en-CA"/>
           </a:p>
@@ -417,7 +417,7 @@
           <a:p>
             <a:fld id="{F7249F8D-641B-4CAF-BAE5-10524742F6F1}" type="datetimeFigureOut">
               <a:rPr lang="en-CA" smtClean="0"/>
-              <a:t>2018-06-07</a:t>
+              <a:t>2018-06-08</a:t>
             </a:fld>
             <a:endParaRPr lang="en-CA"/>
           </a:p>
@@ -597,7 +597,7 @@
           <a:p>
             <a:fld id="{F7249F8D-641B-4CAF-BAE5-10524742F6F1}" type="datetimeFigureOut">
               <a:rPr lang="en-CA" smtClean="0"/>
-              <a:t>2018-06-07</a:t>
+              <a:t>2018-06-08</a:t>
             </a:fld>
             <a:endParaRPr lang="en-CA"/>
           </a:p>
@@ -767,7 +767,7 @@
           <a:p>
             <a:fld id="{F7249F8D-641B-4CAF-BAE5-10524742F6F1}" type="datetimeFigureOut">
               <a:rPr lang="en-CA" smtClean="0"/>
-              <a:t>2018-06-07</a:t>
+              <a:t>2018-06-08</a:t>
             </a:fld>
             <a:endParaRPr lang="en-CA"/>
           </a:p>
@@ -1013,7 +1013,7 @@
           <a:p>
             <a:fld id="{F7249F8D-641B-4CAF-BAE5-10524742F6F1}" type="datetimeFigureOut">
               <a:rPr lang="en-CA" smtClean="0"/>
-              <a:t>2018-06-07</a:t>
+              <a:t>2018-06-08</a:t>
             </a:fld>
             <a:endParaRPr lang="en-CA"/>
           </a:p>
@@ -1245,7 +1245,7 @@
           <a:p>
             <a:fld id="{F7249F8D-641B-4CAF-BAE5-10524742F6F1}" type="datetimeFigureOut">
               <a:rPr lang="en-CA" smtClean="0"/>
-              <a:t>2018-06-07</a:t>
+              <a:t>2018-06-08</a:t>
             </a:fld>
             <a:endParaRPr lang="en-CA"/>
           </a:p>
@@ -1612,7 +1612,7 @@
           <a:p>
             <a:fld id="{F7249F8D-641B-4CAF-BAE5-10524742F6F1}" type="datetimeFigureOut">
               <a:rPr lang="en-CA" smtClean="0"/>
-              <a:t>2018-06-07</a:t>
+              <a:t>2018-06-08</a:t>
             </a:fld>
             <a:endParaRPr lang="en-CA"/>
           </a:p>
@@ -1730,7 +1730,7 @@
           <a:p>
             <a:fld id="{F7249F8D-641B-4CAF-BAE5-10524742F6F1}" type="datetimeFigureOut">
               <a:rPr lang="en-CA" smtClean="0"/>
-              <a:t>2018-06-07</a:t>
+              <a:t>2018-06-08</a:t>
             </a:fld>
             <a:endParaRPr lang="en-CA"/>
           </a:p>
@@ -1825,7 +1825,7 @@
           <a:p>
             <a:fld id="{F7249F8D-641B-4CAF-BAE5-10524742F6F1}" type="datetimeFigureOut">
               <a:rPr lang="en-CA" smtClean="0"/>
-              <a:t>2018-06-07</a:t>
+              <a:t>2018-06-08</a:t>
             </a:fld>
             <a:endParaRPr lang="en-CA"/>
           </a:p>
@@ -2102,7 +2102,7 @@
           <a:p>
             <a:fld id="{F7249F8D-641B-4CAF-BAE5-10524742F6F1}" type="datetimeFigureOut">
               <a:rPr lang="en-CA" smtClean="0"/>
-              <a:t>2018-06-07</a:t>
+              <a:t>2018-06-08</a:t>
             </a:fld>
             <a:endParaRPr lang="en-CA"/>
           </a:p>
@@ -2355,7 +2355,7 @@
           <a:p>
             <a:fld id="{F7249F8D-641B-4CAF-BAE5-10524742F6F1}" type="datetimeFigureOut">
               <a:rPr lang="en-CA" smtClean="0"/>
-              <a:t>2018-06-07</a:t>
+              <a:t>2018-06-08</a:t>
             </a:fld>
             <a:endParaRPr lang="en-CA"/>
           </a:p>
@@ -2568,7 +2568,7 @@
           <a:p>
             <a:fld id="{F7249F8D-641B-4CAF-BAE5-10524742F6F1}" type="datetimeFigureOut">
               <a:rPr lang="en-CA" smtClean="0"/>
-              <a:t>2018-06-07</a:t>
+              <a:t>2018-06-08</a:t>
             </a:fld>
             <a:endParaRPr lang="en-CA"/>
           </a:p>
@@ -4950,7 +4950,7 @@
                             <m:sSubPr>
                               <m:ctrlPr>
                                 <a:rPr lang="en-US" sz="2000" b="0" i="1" smtClean="0">
-                                  <a:latin typeface="Cambria Math" panose="02040503050406030204" pitchFamily="18" charset="0"/>
+                                  <a:latin typeface="Cambria Math" charset="0"/>
                                   <a:cs typeface="Arial" panose="020B0604020202020204" pitchFamily="34" charset="0"/>
                                 </a:rPr>
                               </m:ctrlPr>
@@ -5059,7 +5059,7 @@
                             <m:sSubPr>
                               <m:ctrlPr>
                                 <a:rPr lang="en-US" sz="2000" b="0" i="1" smtClean="0">
-                                  <a:latin typeface="Cambria Math" panose="02040503050406030204" pitchFamily="18" charset="0"/>
+                                  <a:latin typeface="Cambria Math" charset="0"/>
                                   <a:cs typeface="Arial" panose="020B0604020202020204" pitchFamily="34" charset="0"/>
                                 </a:rPr>
                               </m:ctrlPr>
@@ -5304,7 +5304,7 @@
                               <m:chr m:val="⃗"/>
                               <m:ctrlPr>
                                 <a:rPr lang="en-US" sz="2000" b="0" i="1" smtClean="0">
-                                  <a:latin typeface="Cambria Math" panose="02040503050406030204" pitchFamily="18" charset="0"/>
+                                  <a:latin typeface="Cambria Math" charset="0"/>
                                   <a:cs typeface="Arial" panose="020B0604020202020204" pitchFamily="34" charset="0"/>
                                 </a:rPr>
                               </m:ctrlPr>
@@ -5442,7 +5442,7 @@
                             <m:chr m:val="⃗"/>
                             <m:ctrlPr>
                               <a:rPr lang="en-US" sz="2000" b="0" i="1" smtClean="0">
-                                <a:latin typeface="Cambria Math" panose="02040503050406030204" pitchFamily="18" charset="0"/>
+                                <a:latin typeface="Cambria Math" charset="0"/>
                                 <a:cs typeface="Arial" panose="020B0604020202020204" pitchFamily="34" charset="0"/>
                               </a:rPr>
                             </m:ctrlPr>
@@ -6023,7 +6023,7 @@
                           <m:sSubPr>
                             <m:ctrlPr>
                               <a:rPr lang="en-US" sz="2000" b="0" i="1" smtClean="0">
-                                <a:latin typeface="Cambria Math" panose="02040503050406030204" pitchFamily="18" charset="0"/>
+                                <a:latin typeface="Cambria Math" charset="0"/>
                                 <a:cs typeface="Arial" panose="020B0604020202020204" pitchFamily="34" charset="0"/>
                               </a:rPr>
                             </m:ctrlPr>
@@ -6132,7 +6132,7 @@
                           <m:sSubPr>
                             <m:ctrlPr>
                               <a:rPr lang="en-US" sz="2000" b="0" i="1" smtClean="0">
-                                <a:latin typeface="Cambria Math" panose="02040503050406030204" pitchFamily="18" charset="0"/>
+                                <a:latin typeface="Cambria Math" charset="0"/>
                                 <a:cs typeface="Arial" panose="020B0604020202020204" pitchFamily="34" charset="0"/>
                               </a:rPr>
                             </m:ctrlPr>
@@ -6376,7 +6376,7 @@
                           <m:sSubPr>
                             <m:ctrlPr>
                               <a:rPr lang="en-US" sz="2000" b="0" i="1" smtClean="0">
-                                <a:latin typeface="Cambria Math" panose="02040503050406030204" pitchFamily="18" charset="0"/>
+                                <a:latin typeface="Cambria Math" charset="0"/>
                                 <a:cs typeface="Arial" panose="020B0604020202020204" pitchFamily="34" charset="0"/>
                               </a:rPr>
                             </m:ctrlPr>
@@ -6387,7 +6387,7 @@
                                 <m:chr m:val="⃗"/>
                                 <m:ctrlPr>
                                   <a:rPr lang="en-US" sz="2000" b="0" i="1" smtClean="0">
-                                    <a:latin typeface="Cambria Math" panose="02040503050406030204" pitchFamily="18" charset="0"/>
+                                    <a:latin typeface="Cambria Math" charset="0"/>
                                     <a:cs typeface="Arial" panose="020B0604020202020204" pitchFamily="34" charset="0"/>
                                   </a:rPr>
                                 </m:ctrlPr>
@@ -6534,7 +6534,7 @@
                           <m:sSubPr>
                             <m:ctrlPr>
                               <a:rPr lang="en-US" sz="2000" b="0" i="1" smtClean="0">
-                                <a:latin typeface="Cambria Math" panose="02040503050406030204" pitchFamily="18" charset="0"/>
+                                <a:latin typeface="Cambria Math" charset="0"/>
                                 <a:cs typeface="Arial" panose="020B0604020202020204" pitchFamily="34" charset="0"/>
                               </a:rPr>
                             </m:ctrlPr>
@@ -6545,7 +6545,7 @@
                                 <m:chr m:val="⃗"/>
                                 <m:ctrlPr>
                                   <a:rPr lang="en-US" sz="2000" b="0" i="1" smtClean="0">
-                                    <a:latin typeface="Cambria Math" panose="02040503050406030204" pitchFamily="18" charset="0"/>
+                                    <a:latin typeface="Cambria Math" charset="0"/>
                                     <a:cs typeface="Arial" panose="020B0604020202020204" pitchFamily="34" charset="0"/>
                                   </a:rPr>
                                 </m:ctrlPr>
@@ -6998,7 +6998,7 @@
                           <m:sSubPr>
                             <m:ctrlPr>
                               <a:rPr lang="en-US" sz="2000" b="0" i="1" smtClean="0">
-                                <a:latin typeface="Cambria Math" panose="02040503050406030204" pitchFamily="18" charset="0"/>
+                                <a:latin typeface="Cambria Math" charset="0"/>
                                 <a:cs typeface="Arial" panose="020B0604020202020204" pitchFamily="34" charset="0"/>
                               </a:rPr>
                             </m:ctrlPr>
@@ -7107,7 +7107,7 @@
                           <m:sSubPr>
                             <m:ctrlPr>
                               <a:rPr lang="en-US" sz="2000" b="0" i="1" smtClean="0">
-                                <a:latin typeface="Cambria Math" panose="02040503050406030204" pitchFamily="18" charset="0"/>
+                                <a:latin typeface="Cambria Math" charset="0"/>
                                 <a:cs typeface="Arial" panose="020B0604020202020204" pitchFamily="34" charset="0"/>
                               </a:rPr>
                             </m:ctrlPr>
@@ -7301,7 +7301,7 @@
                           <m:sSubPr>
                             <m:ctrlPr>
                               <a:rPr lang="en-US" sz="2000" b="0" i="1" smtClean="0">
-                                <a:latin typeface="Cambria Math" panose="02040503050406030204" pitchFamily="18" charset="0"/>
+                                <a:latin typeface="Cambria Math" charset="0"/>
                                 <a:cs typeface="Arial" panose="020B0604020202020204" pitchFamily="34" charset="0"/>
                               </a:rPr>
                             </m:ctrlPr>
@@ -7312,7 +7312,7 @@
                                 <m:chr m:val="⃗"/>
                                 <m:ctrlPr>
                                   <a:rPr lang="en-US" sz="2000" b="0" i="1" smtClean="0">
-                                    <a:latin typeface="Cambria Math" panose="02040503050406030204" pitchFamily="18" charset="0"/>
+                                    <a:latin typeface="Cambria Math" charset="0"/>
                                     <a:cs typeface="Arial" panose="020B0604020202020204" pitchFamily="34" charset="0"/>
                                   </a:rPr>
                                 </m:ctrlPr>
@@ -7508,7 +7508,7 @@
                           <m:sSubPr>
                             <m:ctrlPr>
                               <a:rPr lang="en-US" sz="2000" b="0" i="1" smtClean="0">
-                                <a:latin typeface="Cambria Math" panose="02040503050406030204" pitchFamily="18" charset="0"/>
+                                <a:latin typeface="Cambria Math" charset="0"/>
                                 <a:cs typeface="Arial" panose="020B0604020202020204" pitchFamily="34" charset="0"/>
                               </a:rPr>
                             </m:ctrlPr>
@@ -7519,7 +7519,7 @@
                                 <m:chr m:val="⃗"/>
                                 <m:ctrlPr>
                                   <a:rPr lang="en-US" sz="2000" b="0" i="1" smtClean="0">
-                                    <a:latin typeface="Cambria Math" panose="02040503050406030204" pitchFamily="18" charset="0"/>
+                                    <a:latin typeface="Cambria Math" charset="0"/>
                                     <a:cs typeface="Arial" panose="020B0604020202020204" pitchFamily="34" charset="0"/>
                                   </a:rPr>
                                 </m:ctrlPr>
@@ -7666,7 +7666,7 @@
                           <m:sSubPr>
                             <m:ctrlPr>
                               <a:rPr lang="en-US" sz="2000" b="0" i="1" smtClean="0">
-                                <a:latin typeface="Cambria Math" panose="02040503050406030204" pitchFamily="18" charset="0"/>
+                                <a:latin typeface="Cambria Math" charset="0"/>
                                 <a:cs typeface="Arial" panose="020B0604020202020204" pitchFamily="34" charset="0"/>
                               </a:rPr>
                             </m:ctrlPr>
@@ -7677,7 +7677,7 @@
                                 <m:chr m:val="⃗"/>
                                 <m:ctrlPr>
                                   <a:rPr lang="en-US" sz="2000" b="0" i="1" smtClean="0">
-                                    <a:latin typeface="Cambria Math" panose="02040503050406030204" pitchFamily="18" charset="0"/>
+                                    <a:latin typeface="Cambria Math" charset="0"/>
                                     <a:cs typeface="Arial" panose="020B0604020202020204" pitchFamily="34" charset="0"/>
                                   </a:rPr>
                                 </m:ctrlPr>
@@ -7824,7 +7824,7 @@
                           <m:sSubPr>
                             <m:ctrlPr>
                               <a:rPr lang="en-US" sz="2000" b="0" i="1" smtClean="0">
-                                <a:latin typeface="Cambria Math" panose="02040503050406030204" pitchFamily="18" charset="0"/>
+                                <a:latin typeface="Cambria Math" charset="0"/>
                                 <a:cs typeface="Arial" panose="020B0604020202020204" pitchFamily="34" charset="0"/>
                               </a:rPr>
                             </m:ctrlPr>
@@ -7835,7 +7835,7 @@
                                 <m:chr m:val="⃗"/>
                                 <m:ctrlPr>
                                   <a:rPr lang="en-US" sz="2000" b="0" i="1" smtClean="0">
-                                    <a:latin typeface="Cambria Math" panose="02040503050406030204" pitchFamily="18" charset="0"/>
+                                    <a:latin typeface="Cambria Math" charset="0"/>
                                     <a:cs typeface="Arial" panose="020B0604020202020204" pitchFamily="34" charset="0"/>
                                   </a:rPr>
                                 </m:ctrlPr>
@@ -9621,7 +9621,7 @@
                                 <m:sSubPr>
                                   <m:ctrlPr>
                                     <a:rPr lang="en-US" sz="2000" b="0" i="1" smtClean="0">
-                                      <a:latin typeface="Cambria Math" panose="02040503050406030204" pitchFamily="18" charset="0"/>
+                                      <a:latin typeface="Cambria Math" charset="0"/>
                                       <a:cs typeface="Arial" panose="020B0604020202020204" pitchFamily="34" charset="0"/>
                                     </a:rPr>
                                   </m:ctrlPr>
@@ -9730,7 +9730,7 @@
                                 <m:sSubPr>
                                   <m:ctrlPr>
                                     <a:rPr lang="en-US" sz="2000" b="0" i="1" smtClean="0">
-                                      <a:latin typeface="Cambria Math" panose="02040503050406030204" pitchFamily="18" charset="0"/>
+                                      <a:latin typeface="Cambria Math" charset="0"/>
                                       <a:cs typeface="Arial" panose="020B0604020202020204" pitchFamily="34" charset="0"/>
                                     </a:rPr>
                                   </m:ctrlPr>
@@ -9975,7 +9975,7 @@
                                   <m:chr m:val="⃗"/>
                                   <m:ctrlPr>
                                     <a:rPr lang="en-US" sz="2000" b="0" i="1" smtClean="0">
-                                      <a:latin typeface="Cambria Math" panose="02040503050406030204" pitchFamily="18" charset="0"/>
+                                      <a:latin typeface="Cambria Math" charset="0"/>
                                       <a:cs typeface="Arial" panose="020B0604020202020204" pitchFamily="34" charset="0"/>
                                     </a:rPr>
                                   </m:ctrlPr>
@@ -10113,7 +10113,7 @@
                                 <m:chr m:val="⃗"/>
                                 <m:ctrlPr>
                                   <a:rPr lang="en-US" sz="2000" b="0" i="1" smtClean="0">
-                                    <a:latin typeface="Cambria Math" panose="02040503050406030204" pitchFamily="18" charset="0"/>
+                                    <a:latin typeface="Cambria Math" charset="0"/>
                                     <a:cs typeface="Arial" panose="020B0604020202020204" pitchFamily="34" charset="0"/>
                                   </a:rPr>
                                 </m:ctrlPr>
@@ -10382,7 +10382,7 @@
                           <m:sSubPr>
                             <m:ctrlPr>
                               <a:rPr lang="en-US" sz="2000" b="0" i="1" smtClean="0">
-                                <a:latin typeface="Cambria Math" panose="02040503050406030204" pitchFamily="18" charset="0"/>
+                                <a:latin typeface="Cambria Math" charset="0"/>
                                 <a:cs typeface="Arial" panose="020B0604020202020204" pitchFamily="34" charset="0"/>
                               </a:rPr>
                             </m:ctrlPr>
@@ -10569,7 +10569,7 @@
                           <m:sSubPr>
                             <m:ctrlPr>
                               <a:rPr lang="en-US" sz="2000" b="0" i="1" smtClean="0">
-                                <a:latin typeface="Cambria Math" panose="02040503050406030204" pitchFamily="18" charset="0"/>
+                                <a:latin typeface="Cambria Math" charset="0"/>
                                 <a:cs typeface="Arial" panose="020B0604020202020204" pitchFamily="34" charset="0"/>
                               </a:rPr>
                             </m:ctrlPr>
@@ -11279,7 +11279,7 @@
                           <m:sSubPr>
                             <m:ctrlPr>
                               <a:rPr lang="en-US" sz="2000" b="0" i="1" smtClean="0">
-                                <a:latin typeface="Cambria Math" panose="02040503050406030204" pitchFamily="18" charset="0"/>
+                                <a:latin typeface="Cambria Math" charset="0"/>
                                 <a:cs typeface="Arial" panose="020B0604020202020204" pitchFamily="34" charset="0"/>
                               </a:rPr>
                             </m:ctrlPr>
@@ -11290,7 +11290,7 @@
                                 <m:chr m:val="⃗"/>
                                 <m:ctrlPr>
                                   <a:rPr lang="en-US" sz="2000" b="0" i="1" smtClean="0">
-                                    <a:latin typeface="Cambria Math" panose="02040503050406030204" pitchFamily="18" charset="0"/>
+                                    <a:latin typeface="Cambria Math" charset="0"/>
                                     <a:cs typeface="Arial" panose="020B0604020202020204" pitchFamily="34" charset="0"/>
                                   </a:rPr>
                                 </m:ctrlPr>
@@ -11401,7 +11401,7 @@
                           <m:sSubPr>
                             <m:ctrlPr>
                               <a:rPr lang="en-US" sz="2000" b="0" i="1" smtClean="0">
-                                <a:latin typeface="Cambria Math" panose="02040503050406030204" pitchFamily="18" charset="0"/>
+                                <a:latin typeface="Cambria Math" charset="0"/>
                                 <a:cs typeface="Arial" panose="020B0604020202020204" pitchFamily="34" charset="0"/>
                               </a:rPr>
                             </m:ctrlPr>
@@ -11412,7 +11412,7 @@
                                 <m:chr m:val="⃗"/>
                                 <m:ctrlPr>
                                   <a:rPr lang="en-US" sz="2000" b="0" i="1" smtClean="0">
-                                    <a:latin typeface="Cambria Math" panose="02040503050406030204" pitchFamily="18" charset="0"/>
+                                    <a:latin typeface="Cambria Math" charset="0"/>
                                     <a:cs typeface="Arial" panose="020B0604020202020204" pitchFamily="34" charset="0"/>
                                   </a:rPr>
                                 </m:ctrlPr>
@@ -11523,7 +11523,7 @@
                           <m:sSubPr>
                             <m:ctrlPr>
                               <a:rPr lang="en-US" sz="2000" b="0" i="1" smtClean="0">
-                                <a:latin typeface="Cambria Math" panose="02040503050406030204" pitchFamily="18" charset="0"/>
+                                <a:latin typeface="Cambria Math" charset="0"/>
                                 <a:cs typeface="Arial" panose="020B0604020202020204" pitchFamily="34" charset="0"/>
                               </a:rPr>
                             </m:ctrlPr>
@@ -11534,7 +11534,7 @@
                                 <m:chr m:val="⃗"/>
                                 <m:ctrlPr>
                                   <a:rPr lang="en-US" sz="2000" b="0" i="1" smtClean="0">
-                                    <a:latin typeface="Cambria Math" panose="02040503050406030204" pitchFamily="18" charset="0"/>
+                                    <a:latin typeface="Cambria Math" charset="0"/>
                                     <a:cs typeface="Arial" panose="020B0604020202020204" pitchFamily="34" charset="0"/>
                                   </a:rPr>
                                 </m:ctrlPr>
@@ -11682,7 +11682,7 @@
                             <m:chr m:val="⃗"/>
                             <m:ctrlPr>
                               <a:rPr lang="en-US" sz="2000" b="0" i="1" smtClean="0">
-                                <a:latin typeface="Cambria Math" panose="02040503050406030204" pitchFamily="18" charset="0"/>
+                                <a:latin typeface="Cambria Math" charset="0"/>
                                 <a:cs typeface="Arial" panose="020B0604020202020204" pitchFamily="34" charset="0"/>
                               </a:rPr>
                             </m:ctrlPr>
@@ -12475,7 +12475,7 @@
                             <m:sSubPr>
                               <m:ctrlPr>
                                 <a:rPr lang="en-US" sz="2000" b="0" i="1" smtClean="0">
-                                  <a:latin typeface="Cambria Math" panose="02040503050406030204" pitchFamily="18" charset="0"/>
+                                  <a:latin typeface="Cambria Math" charset="0"/>
                                   <a:cs typeface="Arial" panose="020B0604020202020204" pitchFamily="34" charset="0"/>
                                 </a:rPr>
                               </m:ctrlPr>
@@ -12510,7 +12510,7 @@
                             <m:sSubPr>
                               <m:ctrlPr>
                                 <a:rPr lang="en-US" sz="2000" b="0" i="1" smtClean="0">
-                                  <a:latin typeface="Cambria Math" panose="02040503050406030204" pitchFamily="18" charset="0"/>
+                                  <a:latin typeface="Cambria Math" charset="0"/>
                                   <a:cs typeface="Arial" panose="020B0604020202020204" pitchFamily="34" charset="0"/>
                                 </a:rPr>
                               </m:ctrlPr>
@@ -12640,7 +12640,7 @@
                             <m:sSubPr>
                               <m:ctrlPr>
                                 <a:rPr lang="en-US" sz="2000" b="0" i="1" smtClean="0">
-                                  <a:latin typeface="Cambria Math" panose="02040503050406030204" pitchFamily="18" charset="0"/>
+                                  <a:latin typeface="Cambria Math" charset="0"/>
                                   <a:cs typeface="Arial" panose="020B0604020202020204" pitchFamily="34" charset="0"/>
                                 </a:rPr>
                               </m:ctrlPr>
@@ -12675,7 +12675,7 @@
                             <m:sSubPr>
                               <m:ctrlPr>
                                 <a:rPr lang="en-US" sz="2000" b="0" i="1" smtClean="0">
-                                  <a:latin typeface="Cambria Math" panose="02040503050406030204" pitchFamily="18" charset="0"/>
+                                  <a:latin typeface="Cambria Math" charset="0"/>
                                   <a:cs typeface="Arial" panose="020B0604020202020204" pitchFamily="34" charset="0"/>
                                 </a:rPr>
                               </m:ctrlPr>
@@ -15013,7 +15013,7 @@
                           <m:sSubPr>
                             <m:ctrlPr>
                               <a:rPr lang="en-US" sz="2000" b="0" i="1" smtClean="0">
-                                <a:latin typeface="Cambria Math" panose="02040503050406030204" pitchFamily="18" charset="0"/>
+                                <a:latin typeface="Cambria Math" charset="0"/>
                                 <a:cs typeface="Arial" panose="020B0604020202020204" pitchFamily="34" charset="0"/>
                               </a:rPr>
                             </m:ctrlPr>
@@ -15048,7 +15048,7 @@
                           <m:sSubPr>
                             <m:ctrlPr>
                               <a:rPr lang="en-US" sz="2000" b="0" i="1" smtClean="0">
-                                <a:latin typeface="Cambria Math" panose="02040503050406030204" pitchFamily="18" charset="0"/>
+                                <a:latin typeface="Cambria Math" charset="0"/>
                                 <a:cs typeface="Arial" panose="020B0604020202020204" pitchFamily="34" charset="0"/>
                               </a:rPr>
                             </m:ctrlPr>
@@ -15178,7 +15178,7 @@
                           <m:sSubPr>
                             <m:ctrlPr>
                               <a:rPr lang="en-US" sz="2000" b="0" i="1" smtClean="0">
-                                <a:latin typeface="Cambria Math" panose="02040503050406030204" pitchFamily="18" charset="0"/>
+                                <a:latin typeface="Cambria Math" charset="0"/>
                                 <a:cs typeface="Arial" panose="020B0604020202020204" pitchFamily="34" charset="0"/>
                               </a:rPr>
                             </m:ctrlPr>
@@ -15213,7 +15213,7 @@
                           <m:sSubPr>
                             <m:ctrlPr>
                               <a:rPr lang="en-US" sz="2000" b="0" i="1" smtClean="0">
-                                <a:latin typeface="Cambria Math" panose="02040503050406030204" pitchFamily="18" charset="0"/>
+                                <a:latin typeface="Cambria Math" charset="0"/>
                                 <a:cs typeface="Arial" panose="020B0604020202020204" pitchFamily="34" charset="0"/>
                               </a:rPr>
                             </m:ctrlPr>
@@ -15474,7 +15474,7 @@
                             <m:chr m:val="⃗"/>
                             <m:ctrlPr>
                               <a:rPr lang="en-US" sz="2000" b="0" i="1" smtClean="0">
-                                <a:latin typeface="Cambria Math" panose="02040503050406030204" pitchFamily="18" charset="0"/>
+                                <a:latin typeface="Cambria Math" charset="0"/>
                                 <a:cs typeface="Arial" panose="020B0604020202020204" pitchFamily="34" charset="0"/>
                               </a:rPr>
                             </m:ctrlPr>
@@ -15501,7 +15501,7 @@
                             <m:chr m:val="⃗"/>
                             <m:ctrlPr>
                               <a:rPr lang="en-US" sz="2000" b="0" i="1" smtClean="0">
-                                <a:latin typeface="Cambria Math" panose="02040503050406030204" pitchFamily="18" charset="0"/>
+                                <a:latin typeface="Cambria Math" charset="0"/>
                                 <a:cs typeface="Arial" panose="020B0604020202020204" pitchFamily="34" charset="0"/>
                               </a:rPr>
                             </m:ctrlPr>
@@ -16217,7 +16217,7 @@
                             <m:sSubPr>
                               <m:ctrlPr>
                                 <a:rPr lang="en-US" sz="2000" b="0" i="1" smtClean="0">
-                                  <a:latin typeface="Cambria Math" panose="02040503050406030204" pitchFamily="18" charset="0"/>
+                                  <a:latin typeface="Cambria Math" charset="0"/>
                                   <a:cs typeface="Arial" panose="020B0604020202020204" pitchFamily="34" charset="0"/>
                                 </a:rPr>
                               </m:ctrlPr>
@@ -16273,7 +16273,7 @@
                             <m:sSubSupPr>
                               <m:ctrlPr>
                                 <a:rPr lang="en-US" sz="2000" b="0" i="1" smtClean="0">
-                                  <a:latin typeface="Cambria Math" panose="02040503050406030204" pitchFamily="18" charset="0"/>
+                                  <a:latin typeface="Cambria Math" charset="0"/>
                                   <a:cs typeface="Arial" panose="020B0604020202020204" pitchFamily="34" charset="0"/>
                                 </a:rPr>
                               </m:ctrlPr>
@@ -16514,7 +16514,7 @@
                             <m:dPr>
                               <m:ctrlPr>
                                 <a:rPr lang="en-US" sz="2000" b="0" i="1" smtClean="0">
-                                  <a:latin typeface="Cambria Math" panose="02040503050406030204" pitchFamily="18" charset="0"/>
+                                  <a:latin typeface="Cambria Math" charset="0"/>
                                   <a:cs typeface="Arial" panose="020B0604020202020204" pitchFamily="34" charset="0"/>
                                 </a:rPr>
                               </m:ctrlPr>
@@ -16561,7 +16561,7 @@
                             <m:sSupPr>
                               <m:ctrlPr>
                                 <a:rPr lang="en-US" sz="2000" b="0" i="1" smtClean="0">
-                                  <a:latin typeface="Cambria Math" panose="02040503050406030204" pitchFamily="18" charset="0"/>
+                                  <a:latin typeface="Cambria Math" charset="0"/>
                                   <a:cs typeface="Arial" panose="020B0604020202020204" pitchFamily="34" charset="0"/>
                                 </a:rPr>
                               </m:ctrlPr>
@@ -16707,7 +16707,7 @@
                           <m:sSubPr>
                             <m:ctrlPr>
                               <a:rPr lang="en-US" sz="2000" b="0" i="1" smtClean="0">
-                                <a:latin typeface="Cambria Math" panose="02040503050406030204" pitchFamily="18" charset="0"/>
+                                <a:latin typeface="Cambria Math" charset="0"/>
                                 <a:cs typeface="Arial" panose="020B0604020202020204" pitchFamily="34" charset="0"/>
                               </a:rPr>
                             </m:ctrlPr>
@@ -16790,7 +16790,7 @@
         </p:nvGrpSpPr>
         <p:grpSpPr>
           <a:xfrm>
-            <a:off x="7264228" y="4572238"/>
+            <a:off x="9648613" y="4579709"/>
             <a:ext cx="1877300" cy="980789"/>
             <a:chOff x="7264228" y="4572238"/>
             <a:chExt cx="1877300" cy="980789"/>
@@ -16927,8 +16927,8 @@
             </a:fontRef>
           </p:style>
         </p:cxnSp>
-        <mc:AlternateContent xmlns:mc="http://schemas.openxmlformats.org/markup-compatibility/2006">
-          <mc:Choice xmlns:a14="http://schemas.microsoft.com/office/drawing/2010/main" Requires="a14">
+        <mc:AlternateContent xmlns:mc="http://schemas.openxmlformats.org/markup-compatibility/2006" xmlns:a14="http://schemas.microsoft.com/office/drawing/2010/main">
+          <mc:Choice Requires="a14">
             <p:sp>
               <p:nvSpPr>
                 <p:cNvPr id="126" name="TextBox 125"/>
@@ -16970,7 +16970,7 @@
                             <m:chr m:val="⃗"/>
                             <m:ctrlPr>
                               <a:rPr lang="en-US" sz="2000" b="0" i="1" smtClean="0">
-                                <a:latin typeface="Cambria Math" panose="02040503050406030204" pitchFamily="18" charset="0"/>
+                                <a:latin typeface="Cambria Math" charset="0"/>
                                 <a:cs typeface="Arial" panose="020B0604020202020204" pitchFamily="34" charset="0"/>
                               </a:rPr>
                             </m:ctrlPr>
@@ -16996,7 +16996,7 @@
               </p:txBody>
             </p:sp>
           </mc:Choice>
-          <mc:Fallback>
+          <mc:Fallback xmlns="">
             <p:sp>
               <p:nvSpPr>
                 <p:cNvPr id="126" name="TextBox 125"/>
@@ -17284,6 +17284,980 @@
           </mc:Fallback>
         </mc:AlternateContent>
       </p:grpSp>
+      <p:grpSp>
+        <p:nvGrpSpPr>
+          <p:cNvPr id="10" name="Group 9"/>
+          <p:cNvGrpSpPr/>
+          <p:nvPr/>
+        </p:nvGrpSpPr>
+        <p:grpSpPr>
+          <a:xfrm>
+            <a:off x="4925766" y="3898033"/>
+            <a:ext cx="2869338" cy="2488590"/>
+            <a:chOff x="4925766" y="3898033"/>
+            <a:chExt cx="2869338" cy="2488590"/>
+          </a:xfrm>
+        </p:grpSpPr>
+        <p:grpSp>
+          <p:nvGrpSpPr>
+            <p:cNvPr id="75" name="Group 74"/>
+            <p:cNvGrpSpPr/>
+            <p:nvPr/>
+          </p:nvGrpSpPr>
+          <p:grpSpPr>
+            <a:xfrm>
+              <a:off x="4925766" y="3898033"/>
+              <a:ext cx="2869338" cy="2488590"/>
+              <a:chOff x="603160" y="3935497"/>
+              <a:chExt cx="2869338" cy="2488590"/>
+            </a:xfrm>
+          </p:grpSpPr>
+          <p:grpSp>
+            <p:nvGrpSpPr>
+              <p:cNvPr id="76" name="Group 75"/>
+              <p:cNvGrpSpPr/>
+              <p:nvPr/>
+            </p:nvGrpSpPr>
+            <p:grpSpPr>
+              <a:xfrm>
+                <a:off x="603160" y="4277771"/>
+                <a:ext cx="2224718" cy="2146316"/>
+                <a:chOff x="1129904" y="708040"/>
+                <a:chExt cx="2224718" cy="2146316"/>
+              </a:xfrm>
+            </p:grpSpPr>
+            <p:grpSp>
+              <p:nvGrpSpPr>
+                <p:cNvPr id="94" name="Group 93"/>
+                <p:cNvGrpSpPr/>
+                <p:nvPr/>
+              </p:nvGrpSpPr>
+              <p:grpSpPr>
+                <a:xfrm>
+                  <a:off x="1163211" y="708040"/>
+                  <a:ext cx="2191411" cy="2146316"/>
+                  <a:chOff x="1190506" y="680744"/>
+                  <a:chExt cx="2191411" cy="2146316"/>
+                </a:xfrm>
+              </p:grpSpPr>
+              <p:cxnSp>
+                <p:nvCxnSpPr>
+                  <p:cNvPr id="96" name="Straight Arrow Connector 95"/>
+                  <p:cNvCxnSpPr/>
+                  <p:nvPr/>
+                </p:nvCxnSpPr>
+                <p:spPr>
+                  <a:xfrm flipV="1">
+                    <a:off x="1516583" y="680744"/>
+                    <a:ext cx="7684" cy="1859536"/>
+                  </a:xfrm>
+                  <a:prstGeom prst="straightConnector1">
+                    <a:avLst/>
+                  </a:prstGeom>
+                  <a:ln w="38100">
+                    <a:solidFill>
+                      <a:schemeClr val="tx1"/>
+                    </a:solidFill>
+                    <a:tailEnd type="triangle"/>
+                  </a:ln>
+                </p:spPr>
+                <p:style>
+                  <a:lnRef idx="1">
+                    <a:schemeClr val="accent1"/>
+                  </a:lnRef>
+                  <a:fillRef idx="0">
+                    <a:schemeClr val="accent1"/>
+                  </a:fillRef>
+                  <a:effectRef idx="0">
+                    <a:schemeClr val="accent1"/>
+                  </a:effectRef>
+                  <a:fontRef idx="minor">
+                    <a:schemeClr val="tx1"/>
+                  </a:fontRef>
+                </p:style>
+              </p:cxnSp>
+              <p:cxnSp>
+                <p:nvCxnSpPr>
+                  <p:cNvPr id="107" name="Straight Arrow Connector 106"/>
+                  <p:cNvCxnSpPr/>
+                  <p:nvPr/>
+                </p:nvCxnSpPr>
+                <p:spPr>
+                  <a:xfrm flipV="1">
+                    <a:off x="1507013" y="2535259"/>
+                    <a:ext cx="1874904" cy="1"/>
+                  </a:xfrm>
+                  <a:prstGeom prst="straightConnector1">
+                    <a:avLst/>
+                  </a:prstGeom>
+                  <a:ln w="38100">
+                    <a:solidFill>
+                      <a:schemeClr val="tx1"/>
+                    </a:solidFill>
+                    <a:tailEnd type="triangle"/>
+                  </a:ln>
+                </p:spPr>
+                <p:style>
+                  <a:lnRef idx="1">
+                    <a:schemeClr val="accent1"/>
+                  </a:lnRef>
+                  <a:fillRef idx="0">
+                    <a:schemeClr val="accent1"/>
+                  </a:fillRef>
+                  <a:effectRef idx="0">
+                    <a:schemeClr val="accent1"/>
+                  </a:effectRef>
+                  <a:fontRef idx="minor">
+                    <a:schemeClr val="tx1"/>
+                  </a:fontRef>
+                </p:style>
+              </p:cxnSp>
+              <mc:AlternateContent xmlns:mc="http://schemas.openxmlformats.org/markup-compatibility/2006" xmlns:a14="http://schemas.microsoft.com/office/drawing/2010/main">
+                <mc:Choice Requires="a14">
+                  <p:sp>
+                    <p:nvSpPr>
+                      <p:cNvPr id="116" name="Rectangle 115"/>
+                      <p:cNvSpPr/>
+                      <p:nvPr/>
+                    </p:nvSpPr>
+                    <p:spPr>
+                      <a:xfrm>
+                        <a:off x="2897675" y="2457728"/>
+                        <a:ext cx="367985" cy="369332"/>
+                      </a:xfrm>
+                      <a:prstGeom prst="rect">
+                        <a:avLst/>
+                      </a:prstGeom>
+                    </p:spPr>
+                    <p:txBody>
+                      <a:bodyPr wrap="none">
+                        <a:spAutoFit/>
+                      </a:bodyPr>
+                      <a:lstStyle/>
+                      <a:p>
+                        <a:pPr/>
+                        <a14:m>
+                          <m:oMathPara xmlns:m="http://schemas.openxmlformats.org/officeDocument/2006/math">
+                            <m:oMathParaPr>
+                              <m:jc m:val="centerGroup"/>
+                            </m:oMathParaPr>
+                            <m:oMath xmlns:m="http://schemas.openxmlformats.org/officeDocument/2006/math">
+                              <m:r>
+                                <a:rPr lang="en-US" i="1">
+                                  <a:latin typeface="Cambria Math" panose="02040503050406030204" pitchFamily="18" charset="0"/>
+                                  <a:cs typeface="Arial" panose="020B0604020202020204" pitchFamily="34" charset="0"/>
+                                </a:rPr>
+                                <m:t>𝑥</m:t>
+                              </m:r>
+                            </m:oMath>
+                          </m:oMathPara>
+                        </a14:m>
+                        <a:endParaRPr lang="en-CA" dirty="0"/>
+                      </a:p>
+                    </p:txBody>
+                  </p:sp>
+                </mc:Choice>
+                <mc:Fallback xmlns="">
+                  <p:sp>
+                    <p:nvSpPr>
+                      <p:cNvPr id="12" name="Rectangle 11"/>
+                      <p:cNvSpPr>
+                        <a:spLocks noRot="1" noChangeAspect="1" noMove="1" noResize="1" noEditPoints="1" noAdjustHandles="1" noChangeArrowheads="1" noChangeShapeType="1" noTextEdit="1"/>
+                      </p:cNvSpPr>
+                      <p:nvPr/>
+                    </p:nvSpPr>
+                    <p:spPr>
+                      <a:xfrm>
+                        <a:off x="2897675" y="2457728"/>
+                        <a:ext cx="367985" cy="369332"/>
+                      </a:xfrm>
+                      <a:prstGeom prst="rect">
+                        <a:avLst/>
+                      </a:prstGeom>
+                      <a:blipFill rotWithShape="0">
+                        <a:blip r:embed="rId30"/>
+                        <a:stretch>
+                          <a:fillRect/>
+                        </a:stretch>
+                      </a:blipFill>
+                    </p:spPr>
+                    <p:txBody>
+                      <a:bodyPr/>
+                      <a:lstStyle/>
+                      <a:p>
+                        <a:r>
+                          <a:rPr lang="en-CA">
+                            <a:noFill/>
+                          </a:rPr>
+                          <a:t> </a:t>
+                        </a:r>
+                      </a:p>
+                    </p:txBody>
+                  </p:sp>
+                </mc:Fallback>
+              </mc:AlternateContent>
+              <mc:AlternateContent xmlns:mc="http://schemas.openxmlformats.org/markup-compatibility/2006" xmlns:a14="http://schemas.microsoft.com/office/drawing/2010/main">
+                <mc:Choice Requires="a14">
+                  <p:sp>
+                    <p:nvSpPr>
+                      <p:cNvPr id="120" name="Rectangle 119"/>
+                      <p:cNvSpPr/>
+                      <p:nvPr/>
+                    </p:nvSpPr>
+                    <p:spPr>
+                      <a:xfrm>
+                        <a:off x="1190506" y="790545"/>
+                        <a:ext cx="371384" cy="369332"/>
+                      </a:xfrm>
+                      <a:prstGeom prst="rect">
+                        <a:avLst/>
+                      </a:prstGeom>
+                    </p:spPr>
+                    <p:txBody>
+                      <a:bodyPr wrap="none">
+                        <a:spAutoFit/>
+                      </a:bodyPr>
+                      <a:lstStyle/>
+                      <a:p>
+                        <a:pPr/>
+                        <a14:m>
+                          <m:oMathPara xmlns:m="http://schemas.openxmlformats.org/officeDocument/2006/math">
+                            <m:oMathParaPr>
+                              <m:jc m:val="centerGroup"/>
+                            </m:oMathParaPr>
+                            <m:oMath xmlns:m="http://schemas.openxmlformats.org/officeDocument/2006/math">
+                              <m:r>
+                                <a:rPr lang="en-US" b="0" i="1" smtClean="0">
+                                  <a:latin typeface="Cambria Math" panose="02040503050406030204" pitchFamily="18" charset="0"/>
+                                </a:rPr>
+                                <m:t>𝑦</m:t>
+                              </m:r>
+                            </m:oMath>
+                          </m:oMathPara>
+                        </a14:m>
+                        <a:endParaRPr lang="en-CA" dirty="0"/>
+                      </a:p>
+                    </p:txBody>
+                  </p:sp>
+                </mc:Choice>
+                <mc:Fallback xmlns="">
+                  <p:sp>
+                    <p:nvSpPr>
+                      <p:cNvPr id="13" name="Rectangle 12"/>
+                      <p:cNvSpPr>
+                        <a:spLocks noRot="1" noChangeAspect="1" noMove="1" noResize="1" noEditPoints="1" noAdjustHandles="1" noChangeArrowheads="1" noChangeShapeType="1" noTextEdit="1"/>
+                      </p:cNvSpPr>
+                      <p:nvPr/>
+                    </p:nvSpPr>
+                    <p:spPr>
+                      <a:xfrm>
+                        <a:off x="1190506" y="790545"/>
+                        <a:ext cx="371384" cy="369332"/>
+                      </a:xfrm>
+                      <a:prstGeom prst="rect">
+                        <a:avLst/>
+                      </a:prstGeom>
+                      <a:blipFill rotWithShape="0">
+                        <a:blip r:embed="rId31"/>
+                        <a:stretch>
+                          <a:fillRect b="-6557"/>
+                        </a:stretch>
+                      </a:blipFill>
+                    </p:spPr>
+                    <p:txBody>
+                      <a:bodyPr/>
+                      <a:lstStyle/>
+                      <a:p>
+                        <a:r>
+                          <a:rPr lang="en-CA">
+                            <a:noFill/>
+                          </a:rPr>
+                          <a:t> </a:t>
+                        </a:r>
+                      </a:p>
+                    </p:txBody>
+                  </p:sp>
+                </mc:Fallback>
+              </mc:AlternateContent>
+              <mc:AlternateContent xmlns:mc="http://schemas.openxmlformats.org/markup-compatibility/2006" xmlns:a14="http://schemas.microsoft.com/office/drawing/2010/main">
+                <mc:Choice Requires="a14">
+                  <p:sp>
+                    <p:nvSpPr>
+                      <p:cNvPr id="122" name="Rectangle 121"/>
+                      <p:cNvSpPr/>
+                      <p:nvPr/>
+                    </p:nvSpPr>
+                    <p:spPr>
+                      <a:xfrm>
+                        <a:off x="1205483" y="2447020"/>
+                        <a:ext cx="367985" cy="369332"/>
+                      </a:xfrm>
+                      <a:prstGeom prst="rect">
+                        <a:avLst/>
+                      </a:prstGeom>
+                    </p:spPr>
+                    <p:txBody>
+                      <a:bodyPr wrap="none">
+                        <a:spAutoFit/>
+                      </a:bodyPr>
+                      <a:lstStyle/>
+                      <a:p>
+                        <a:pPr/>
+                        <a14:m>
+                          <m:oMathPara xmlns:m="http://schemas.openxmlformats.org/officeDocument/2006/math">
+                            <m:oMathParaPr>
+                              <m:jc m:val="centerGroup"/>
+                            </m:oMathParaPr>
+                            <m:oMath xmlns:m="http://schemas.openxmlformats.org/officeDocument/2006/math">
+                              <m:r>
+                                <a:rPr lang="en-US" b="0" i="1" smtClean="0">
+                                  <a:latin typeface="Cambria Math" panose="02040503050406030204" pitchFamily="18" charset="0"/>
+                                  <a:cs typeface="Arial" panose="020B0604020202020204" pitchFamily="34" charset="0"/>
+                                </a:rPr>
+                                <m:t>0</m:t>
+                              </m:r>
+                            </m:oMath>
+                          </m:oMathPara>
+                        </a14:m>
+                        <a:endParaRPr lang="en-CA" dirty="0"/>
+                      </a:p>
+                    </p:txBody>
+                  </p:sp>
+                </mc:Choice>
+                <mc:Fallback xmlns="">
+                  <p:sp>
+                    <p:nvSpPr>
+                      <p:cNvPr id="14" name="Rectangle 13"/>
+                      <p:cNvSpPr>
+                        <a:spLocks noRot="1" noChangeAspect="1" noMove="1" noResize="1" noEditPoints="1" noAdjustHandles="1" noChangeArrowheads="1" noChangeShapeType="1" noTextEdit="1"/>
+                      </p:cNvSpPr>
+                      <p:nvPr/>
+                    </p:nvSpPr>
+                    <p:spPr>
+                      <a:xfrm>
+                        <a:off x="1205483" y="2447020"/>
+                        <a:ext cx="367985" cy="369332"/>
+                      </a:xfrm>
+                      <a:prstGeom prst="rect">
+                        <a:avLst/>
+                      </a:prstGeom>
+                      <a:blipFill rotWithShape="0">
+                        <a:blip r:embed="rId32"/>
+                        <a:stretch>
+                          <a:fillRect/>
+                        </a:stretch>
+                      </a:blipFill>
+                    </p:spPr>
+                    <p:txBody>
+                      <a:bodyPr/>
+                      <a:lstStyle/>
+                      <a:p>
+                        <a:r>
+                          <a:rPr lang="en-CA">
+                            <a:noFill/>
+                          </a:rPr>
+                          <a:t> </a:t>
+                        </a:r>
+                      </a:p>
+                    </p:txBody>
+                  </p:sp>
+                </mc:Fallback>
+              </mc:AlternateContent>
+            </p:grpSp>
+            <p:sp>
+              <p:nvSpPr>
+                <p:cNvPr id="95" name="Rectangle 94"/>
+                <p:cNvSpPr/>
+                <p:nvPr/>
+              </p:nvSpPr>
+              <p:spPr>
+                <a:xfrm>
+                  <a:off x="1129904" y="1614682"/>
+                  <a:ext cx="184731" cy="369332"/>
+                </a:xfrm>
+                <a:prstGeom prst="rect">
+                  <a:avLst/>
+                </a:prstGeom>
+              </p:spPr>
+              <p:txBody>
+                <a:bodyPr wrap="none">
+                  <a:spAutoFit/>
+                </a:bodyPr>
+                <a:lstStyle/>
+                <a:p>
+                  <a:endParaRPr lang="en-CA" dirty="0"/>
+                </a:p>
+              </p:txBody>
+            </p:sp>
+          </p:grpSp>
+          <p:sp>
+            <p:nvSpPr>
+              <p:cNvPr id="78" name="Oval 77"/>
+              <p:cNvSpPr/>
+              <p:nvPr/>
+            </p:nvSpPr>
+            <p:spPr>
+              <a:xfrm>
+                <a:off x="1224682" y="5655603"/>
+                <a:ext cx="120943" cy="119766"/>
+              </a:xfrm>
+              <a:prstGeom prst="ellipse">
+                <a:avLst/>
+              </a:prstGeom>
+              <a:solidFill>
+                <a:schemeClr val="tx1"/>
+              </a:solidFill>
+              <a:ln w="38100">
+                <a:solidFill>
+                  <a:schemeClr val="tx1"/>
+                </a:solidFill>
+              </a:ln>
+            </p:spPr>
+            <p:style>
+              <a:lnRef idx="2">
+                <a:schemeClr val="accent1">
+                  <a:shade val="50000"/>
+                </a:schemeClr>
+              </a:lnRef>
+              <a:fillRef idx="1">
+                <a:schemeClr val="accent1"/>
+              </a:fillRef>
+              <a:effectRef idx="0">
+                <a:schemeClr val="accent1"/>
+              </a:effectRef>
+              <a:fontRef idx="minor">
+                <a:schemeClr val="lt1"/>
+              </a:fontRef>
+            </p:style>
+            <p:txBody>
+              <a:bodyPr rtlCol="0" anchor="ctr"/>
+              <a:lstStyle/>
+              <a:p>
+                <a:pPr algn="ctr"/>
+                <a:endParaRPr lang="en-US"/>
+              </a:p>
+            </p:txBody>
+          </p:sp>
+          <p:sp>
+            <p:nvSpPr>
+              <p:cNvPr id="81" name="Oval 80"/>
+              <p:cNvSpPr/>
+              <p:nvPr/>
+            </p:nvSpPr>
+            <p:spPr>
+              <a:xfrm>
+                <a:off x="3105847" y="4278957"/>
+                <a:ext cx="120943" cy="119766"/>
+              </a:xfrm>
+              <a:prstGeom prst="ellipse">
+                <a:avLst/>
+              </a:prstGeom>
+              <a:solidFill>
+                <a:schemeClr val="tx1"/>
+              </a:solidFill>
+              <a:ln w="38100">
+                <a:solidFill>
+                  <a:schemeClr val="tx1"/>
+                </a:solidFill>
+              </a:ln>
+            </p:spPr>
+            <p:style>
+              <a:lnRef idx="2">
+                <a:schemeClr val="accent1">
+                  <a:shade val="50000"/>
+                </a:schemeClr>
+              </a:lnRef>
+              <a:fillRef idx="1">
+                <a:schemeClr val="accent1"/>
+              </a:fillRef>
+              <a:effectRef idx="0">
+                <a:schemeClr val="accent1"/>
+              </a:effectRef>
+              <a:fontRef idx="minor">
+                <a:schemeClr val="lt1"/>
+              </a:fontRef>
+            </p:style>
+            <p:txBody>
+              <a:bodyPr rtlCol="0" anchor="ctr"/>
+              <a:lstStyle/>
+              <a:p>
+                <a:pPr algn="ctr"/>
+                <a:endParaRPr lang="en-US"/>
+              </a:p>
+            </p:txBody>
+          </p:sp>
+          <p:sp>
+            <p:nvSpPr>
+              <p:cNvPr id="83" name="Freeform 82"/>
+              <p:cNvSpPr/>
+              <p:nvPr/>
+            </p:nvSpPr>
+            <p:spPr>
+              <a:xfrm>
+                <a:off x="1304693" y="4337824"/>
+                <a:ext cx="1828800" cy="1304693"/>
+              </a:xfrm>
+              <a:custGeom>
+                <a:avLst/>
+                <a:gdLst>
+                  <a:gd name="connsiteX0" fmla="*/ 0 w 1828800"/>
+                  <a:gd name="connsiteY0" fmla="*/ 1304693 h 1304693"/>
+                  <a:gd name="connsiteX1" fmla="*/ 457200 w 1828800"/>
+                  <a:gd name="connsiteY1" fmla="*/ 468352 h 1304693"/>
+                  <a:gd name="connsiteX2" fmla="*/ 1828800 w 1828800"/>
+                  <a:gd name="connsiteY2" fmla="*/ 0 h 1304693"/>
+                </a:gdLst>
+                <a:ahLst/>
+                <a:cxnLst>
+                  <a:cxn ang="0">
+                    <a:pos x="connsiteX0" y="connsiteY0"/>
+                  </a:cxn>
+                  <a:cxn ang="0">
+                    <a:pos x="connsiteX1" y="connsiteY1"/>
+                  </a:cxn>
+                  <a:cxn ang="0">
+                    <a:pos x="connsiteX2" y="connsiteY2"/>
+                  </a:cxn>
+                </a:cxnLst>
+                <a:rect l="l" t="t" r="r" b="b"/>
+                <a:pathLst>
+                  <a:path w="1828800" h="1304693">
+                    <a:moveTo>
+                      <a:pt x="0" y="1304693"/>
+                    </a:moveTo>
+                    <a:cubicBezTo>
+                      <a:pt x="76200" y="995247"/>
+                      <a:pt x="152400" y="685801"/>
+                      <a:pt x="457200" y="468352"/>
+                    </a:cubicBezTo>
+                    <a:cubicBezTo>
+                      <a:pt x="762000" y="250903"/>
+                      <a:pt x="1243361" y="31595"/>
+                      <a:pt x="1828800" y="0"/>
+                    </a:cubicBezTo>
+                  </a:path>
+                </a:pathLst>
+              </a:custGeom>
+              <a:noFill/>
+              <a:ln w="38100">
+                <a:solidFill>
+                  <a:schemeClr val="tx1"/>
+                </a:solidFill>
+              </a:ln>
+            </p:spPr>
+            <p:style>
+              <a:lnRef idx="2">
+                <a:schemeClr val="accent1">
+                  <a:shade val="50000"/>
+                </a:schemeClr>
+              </a:lnRef>
+              <a:fillRef idx="1">
+                <a:schemeClr val="accent1"/>
+              </a:fillRef>
+              <a:effectRef idx="0">
+                <a:schemeClr val="accent1"/>
+              </a:effectRef>
+              <a:fontRef idx="minor">
+                <a:schemeClr val="lt1"/>
+              </a:fontRef>
+            </p:style>
+            <p:txBody>
+              <a:bodyPr rtlCol="0" anchor="ctr"/>
+              <a:lstStyle/>
+              <a:p>
+                <a:pPr algn="ctr"/>
+                <a:endParaRPr lang="en-US"/>
+              </a:p>
+            </p:txBody>
+          </p:sp>
+          <mc:AlternateContent xmlns:mc="http://schemas.openxmlformats.org/markup-compatibility/2006">
+            <mc:Choice xmlns:a14="http://schemas.microsoft.com/office/drawing/2010/main" Requires="a14">
+              <p:sp>
+                <p:nvSpPr>
+                  <p:cNvPr id="85" name="TextBox 84"/>
+                  <p:cNvSpPr txBox="1"/>
+                  <p:nvPr/>
+                </p:nvSpPr>
+                <p:spPr>
+                  <a:xfrm>
+                    <a:off x="1345506" y="5762027"/>
+                    <a:ext cx="234936" cy="307777"/>
+                  </a:xfrm>
+                  <a:prstGeom prst="rect">
+                    <a:avLst/>
+                  </a:prstGeom>
+                  <a:noFill/>
+                </p:spPr>
+                <p:txBody>
+                  <a:bodyPr wrap="none" lIns="0" tIns="0" rIns="0" bIns="0" rtlCol="0">
+                    <a:spAutoFit/>
+                  </a:bodyPr>
+                  <a:lstStyle/>
+                  <a:p>
+                    <a:pPr/>
+                    <a14:m>
+                      <m:oMathPara xmlns:m="http://schemas.openxmlformats.org/officeDocument/2006/math">
+                        <m:oMathParaPr>
+                          <m:jc m:val="centerGroup"/>
+                        </m:oMathParaPr>
+                        <m:oMath xmlns:m="http://schemas.openxmlformats.org/officeDocument/2006/math">
+                          <m:r>
+                            <a:rPr lang="en-US" sz="2000" b="0" i="1" smtClean="0">
+                              <a:latin typeface="Cambria Math" panose="02040503050406030204" pitchFamily="18" charset="0"/>
+                              <a:cs typeface="Arial" panose="020B0604020202020204" pitchFamily="34" charset="0"/>
+                            </a:rPr>
+                            <m:t>𝐴</m:t>
+                          </m:r>
+                        </m:oMath>
+                      </m:oMathPara>
+                    </a14:m>
+                    <a:endParaRPr lang="en-US" sz="2000" dirty="0" smtClean="0">
+                      <a:latin typeface="Arial" panose="020B0604020202020204" pitchFamily="34" charset="0"/>
+                      <a:cs typeface="Arial" panose="020B0604020202020204" pitchFamily="34" charset="0"/>
+                    </a:endParaRPr>
+                  </a:p>
+                </p:txBody>
+              </p:sp>
+            </mc:Choice>
+            <mc:Fallback>
+              <p:sp>
+                <p:nvSpPr>
+                  <p:cNvPr id="85" name="TextBox 84"/>
+                  <p:cNvSpPr txBox="1">
+                    <a:spLocks noRot="1" noChangeAspect="1" noMove="1" noResize="1" noEditPoints="1" noAdjustHandles="1" noChangeArrowheads="1" noChangeShapeType="1" noTextEdit="1"/>
+                  </p:cNvSpPr>
+                  <p:nvPr/>
+                </p:nvSpPr>
+                <p:spPr>
+                  <a:xfrm>
+                    <a:off x="1345506" y="5762027"/>
+                    <a:ext cx="234936" cy="307777"/>
+                  </a:xfrm>
+                  <a:prstGeom prst="rect">
+                    <a:avLst/>
+                  </a:prstGeom>
+                  <a:blipFill rotWithShape="0">
+                    <a:blip r:embed="rId43"/>
+                    <a:stretch>
+                      <a:fillRect l="-23684" r="-23684" b="-9804"/>
+                    </a:stretch>
+                  </a:blipFill>
+                </p:spPr>
+                <p:txBody>
+                  <a:bodyPr/>
+                  <a:lstStyle/>
+                  <a:p>
+                    <a:r>
+                      <a:rPr lang="en-US">
+                        <a:noFill/>
+                      </a:rPr>
+                      <a:t> </a:t>
+                    </a:r>
+                  </a:p>
+                </p:txBody>
+              </p:sp>
+            </mc:Fallback>
+          </mc:AlternateContent>
+          <mc:AlternateContent xmlns:mc="http://schemas.openxmlformats.org/markup-compatibility/2006">
+            <mc:Choice xmlns:a14="http://schemas.microsoft.com/office/drawing/2010/main" Requires="a14">
+              <p:sp>
+                <p:nvSpPr>
+                  <p:cNvPr id="87" name="TextBox 86"/>
+                  <p:cNvSpPr txBox="1"/>
+                  <p:nvPr/>
+                </p:nvSpPr>
+                <p:spPr>
+                  <a:xfrm>
+                    <a:off x="3226790" y="3935497"/>
+                    <a:ext cx="245708" cy="307777"/>
+                  </a:xfrm>
+                  <a:prstGeom prst="rect">
+                    <a:avLst/>
+                  </a:prstGeom>
+                  <a:noFill/>
+                </p:spPr>
+                <p:txBody>
+                  <a:bodyPr wrap="none" lIns="0" tIns="0" rIns="0" bIns="0" rtlCol="0">
+                    <a:spAutoFit/>
+                  </a:bodyPr>
+                  <a:lstStyle/>
+                  <a:p>
+                    <a:pPr/>
+                    <a14:m>
+                      <m:oMathPara xmlns:m="http://schemas.openxmlformats.org/officeDocument/2006/math">
+                        <m:oMathParaPr>
+                          <m:jc m:val="centerGroup"/>
+                        </m:oMathParaPr>
+                        <m:oMath xmlns:m="http://schemas.openxmlformats.org/officeDocument/2006/math">
+                          <m:r>
+                            <a:rPr lang="en-US" sz="2000" b="0" i="1" smtClean="0">
+                              <a:latin typeface="Cambria Math" panose="02040503050406030204" pitchFamily="18" charset="0"/>
+                              <a:cs typeface="Arial" panose="020B0604020202020204" pitchFamily="34" charset="0"/>
+                            </a:rPr>
+                            <m:t>𝐵</m:t>
+                          </m:r>
+                        </m:oMath>
+                      </m:oMathPara>
+                    </a14:m>
+                    <a:endParaRPr lang="en-US" sz="2000" dirty="0" smtClean="0">
+                      <a:latin typeface="Arial" panose="020B0604020202020204" pitchFamily="34" charset="0"/>
+                      <a:cs typeface="Arial" panose="020B0604020202020204" pitchFamily="34" charset="0"/>
+                    </a:endParaRPr>
+                  </a:p>
+                </p:txBody>
+              </p:sp>
+            </mc:Choice>
+            <mc:Fallback>
+              <p:sp>
+                <p:nvSpPr>
+                  <p:cNvPr id="87" name="TextBox 86"/>
+                  <p:cNvSpPr txBox="1">
+                    <a:spLocks noRot="1" noChangeAspect="1" noMove="1" noResize="1" noEditPoints="1" noAdjustHandles="1" noChangeArrowheads="1" noChangeShapeType="1" noTextEdit="1"/>
+                  </p:cNvSpPr>
+                  <p:nvPr/>
+                </p:nvSpPr>
+                <p:spPr>
+                  <a:xfrm>
+                    <a:off x="3226790" y="3935497"/>
+                    <a:ext cx="245708" cy="307777"/>
+                  </a:xfrm>
+                  <a:prstGeom prst="rect">
+                    <a:avLst/>
+                  </a:prstGeom>
+                  <a:blipFill rotWithShape="0">
+                    <a:blip r:embed="rId44"/>
+                    <a:stretch>
+                      <a:fillRect l="-19512" r="-19512" b="-9804"/>
+                    </a:stretch>
+                  </a:blipFill>
+                </p:spPr>
+                <p:txBody>
+                  <a:bodyPr/>
+                  <a:lstStyle/>
+                  <a:p>
+                    <a:r>
+                      <a:rPr lang="en-US">
+                        <a:noFill/>
+                      </a:rPr>
+                      <a:t> </a:t>
+                    </a:r>
+                  </a:p>
+                </p:txBody>
+              </p:sp>
+            </mc:Fallback>
+          </mc:AlternateContent>
+        </p:grpSp>
+        <p:sp>
+          <p:nvSpPr>
+            <p:cNvPr id="123" name="Oval 122"/>
+            <p:cNvSpPr/>
+            <p:nvPr/>
+          </p:nvSpPr>
+          <p:spPr>
+            <a:xfrm flipH="1">
+              <a:off x="5955364" y="4807894"/>
+              <a:ext cx="72000" cy="72000"/>
+            </a:xfrm>
+            <a:prstGeom prst="ellipse">
+              <a:avLst/>
+            </a:prstGeom>
+            <a:solidFill>
+              <a:srgbClr val="0070C0"/>
+            </a:solidFill>
+            <a:ln w="38100">
+              <a:solidFill>
+                <a:srgbClr val="0070C0"/>
+              </a:solidFill>
+            </a:ln>
+          </p:spPr>
+          <p:style>
+            <a:lnRef idx="2">
+              <a:schemeClr val="accent1">
+                <a:shade val="50000"/>
+              </a:schemeClr>
+            </a:lnRef>
+            <a:fillRef idx="1">
+              <a:schemeClr val="accent1"/>
+            </a:fillRef>
+            <a:effectRef idx="0">
+              <a:schemeClr val="accent1"/>
+            </a:effectRef>
+            <a:fontRef idx="minor">
+              <a:schemeClr val="lt1"/>
+            </a:fontRef>
+          </p:style>
+          <p:txBody>
+            <a:bodyPr rtlCol="0" anchor="ctr"/>
+            <a:lstStyle/>
+            <a:p>
+              <a:pPr algn="ctr"/>
+              <a:endParaRPr lang="en-US"/>
+            </a:p>
+          </p:txBody>
+        </p:sp>
+        <p:cxnSp>
+          <p:nvCxnSpPr>
+            <p:cNvPr id="3" name="Straight Arrow Connector 2"/>
+            <p:cNvCxnSpPr/>
+            <p:nvPr/>
+          </p:nvCxnSpPr>
+          <p:spPr>
+            <a:xfrm rot="-420000" flipV="1">
+              <a:off x="5967757" y="4558625"/>
+              <a:ext cx="503999" cy="270000"/>
+            </a:xfrm>
+            <a:prstGeom prst="straightConnector1">
+              <a:avLst/>
+            </a:prstGeom>
+            <a:ln w="57150">
+              <a:solidFill>
+                <a:srgbClr val="0070C0"/>
+              </a:solidFill>
+              <a:tailEnd type="triangle"/>
+            </a:ln>
+          </p:spPr>
+          <p:style>
+            <a:lnRef idx="1">
+              <a:schemeClr val="accent1"/>
+            </a:lnRef>
+            <a:fillRef idx="0">
+              <a:schemeClr val="accent1"/>
+            </a:fillRef>
+            <a:effectRef idx="0">
+              <a:schemeClr val="accent1"/>
+            </a:effectRef>
+            <a:fontRef idx="minor">
+              <a:schemeClr val="tx1"/>
+            </a:fontRef>
+          </p:style>
+        </p:cxnSp>
+        <mc:AlternateContent xmlns:mc="http://schemas.openxmlformats.org/markup-compatibility/2006">
+          <mc:Choice xmlns:a14="http://schemas.microsoft.com/office/drawing/2010/main" Requires="a14">
+            <p:sp>
+              <p:nvSpPr>
+                <p:cNvPr id="124" name="TextBox 123"/>
+                <p:cNvSpPr txBox="1"/>
+                <p:nvPr/>
+              </p:nvSpPr>
+              <p:spPr>
+                <a:xfrm>
+                  <a:off x="5834132" y="4350108"/>
+                  <a:ext cx="471052" cy="353302"/>
+                </a:xfrm>
+                <a:prstGeom prst="rect">
+                  <a:avLst/>
+                </a:prstGeom>
+                <a:noFill/>
+                <a:ln>
+                  <a:noFill/>
+                </a:ln>
+              </p:spPr>
+              <p:txBody>
+                <a:bodyPr wrap="square" lIns="0" tIns="0" rIns="0" bIns="0" rtlCol="0">
+                  <a:spAutoFit/>
+                </a:bodyPr>
+                <a:lstStyle/>
+                <a:p>
+                  <a:pPr/>
+                  <a14:m>
+                    <m:oMathPara xmlns:m="http://schemas.openxmlformats.org/officeDocument/2006/math">
+                      <m:oMathParaPr>
+                        <m:jc m:val="centerGroup"/>
+                      </m:oMathParaPr>
+                      <m:oMath xmlns:m="http://schemas.openxmlformats.org/officeDocument/2006/math">
+                        <m:r>
+                          <a:rPr lang="en-US" sz="2000" b="0" i="1" smtClean="0">
+                            <a:solidFill>
+                              <a:srgbClr val="0070C0"/>
+                            </a:solidFill>
+                            <a:latin typeface="Cambria Math" panose="02040503050406030204" pitchFamily="18" charset="0"/>
+                            <a:cs typeface="Arial" panose="020B0604020202020204" pitchFamily="34" charset="0"/>
+                          </a:rPr>
+                          <m:t>𝑑</m:t>
+                        </m:r>
+                        <m:acc>
+                          <m:accPr>
+                            <m:chr m:val="⃗"/>
+                            <m:ctrlPr>
+                              <a:rPr lang="en-US" sz="2000" b="0" i="1" smtClean="0">
+                                <a:solidFill>
+                                  <a:srgbClr val="0070C0"/>
+                                </a:solidFill>
+                                <a:latin typeface="Cambria Math" charset="0"/>
+                                <a:cs typeface="Arial" panose="020B0604020202020204" pitchFamily="34" charset="0"/>
+                              </a:rPr>
+                            </m:ctrlPr>
+                          </m:accPr>
+                          <m:e>
+                            <m:r>
+                              <a:rPr lang="en-US" sz="2000" b="0" i="1" smtClean="0">
+                                <a:solidFill>
+                                  <a:srgbClr val="0070C0"/>
+                                </a:solidFill>
+                                <a:latin typeface="Cambria Math" panose="02040503050406030204" pitchFamily="18" charset="0"/>
+                                <a:cs typeface="Arial" panose="020B0604020202020204" pitchFamily="34" charset="0"/>
+                              </a:rPr>
+                              <m:t>𝑙</m:t>
+                            </m:r>
+                          </m:e>
+                        </m:acc>
+                      </m:oMath>
+                    </m:oMathPara>
+                  </a14:m>
+                  <a:endParaRPr lang="en-US" sz="2000" dirty="0" smtClean="0">
+                    <a:solidFill>
+                      <a:srgbClr val="0070C0"/>
+                    </a:solidFill>
+                    <a:latin typeface="Arial" panose="020B0604020202020204" pitchFamily="34" charset="0"/>
+                    <a:cs typeface="Arial" panose="020B0604020202020204" pitchFamily="34" charset="0"/>
+                  </a:endParaRPr>
+                </a:p>
+              </p:txBody>
+            </p:sp>
+          </mc:Choice>
+          <mc:Fallback>
+            <p:sp>
+              <p:nvSpPr>
+                <p:cNvPr id="124" name="TextBox 123"/>
+                <p:cNvSpPr txBox="1">
+                  <a:spLocks noRot="1" noChangeAspect="1" noMove="1" noResize="1" noEditPoints="1" noAdjustHandles="1" noChangeArrowheads="1" noChangeShapeType="1" noTextEdit="1"/>
+                </p:cNvSpPr>
+                <p:nvPr/>
+              </p:nvSpPr>
+              <p:spPr>
+                <a:xfrm>
+                  <a:off x="5834132" y="4350108"/>
+                  <a:ext cx="471052" cy="353302"/>
+                </a:xfrm>
+                <a:prstGeom prst="rect">
+                  <a:avLst/>
+                </a:prstGeom>
+                <a:blipFill rotWithShape="0">
+                  <a:blip r:embed="rId45"/>
+                  <a:stretch>
+                    <a:fillRect t="-34483" r="-64935" b="-10345"/>
+                  </a:stretch>
+                </a:blipFill>
+                <a:ln>
+                  <a:noFill/>
+                </a:ln>
+              </p:spPr>
+              <p:txBody>
+                <a:bodyPr/>
+                <a:lstStyle/>
+                <a:p>
+                  <a:r>
+                    <a:rPr lang="en-US">
+                      <a:noFill/>
+                    </a:rPr>
+                    <a:t> </a:t>
+                  </a:r>
+                </a:p>
+              </p:txBody>
+            </p:sp>
+          </mc:Fallback>
+        </mc:AlternateContent>
+      </p:grpSp>
     </p:spTree>
     <p:extLst>
       <p:ext uri="{BB962C8B-B14F-4D97-AF65-F5344CB8AC3E}">
@@ -17454,7 +18428,7 @@
                                   <m:chr m:val="⃗"/>
                                   <m:ctrlPr>
                                     <a:rPr lang="en-US" sz="2000" b="0" i="1" smtClean="0">
-                                      <a:latin typeface="Cambria Math" panose="02040503050406030204" pitchFamily="18" charset="0"/>
+                                      <a:latin typeface="Cambria Math" charset="0"/>
                                       <a:cs typeface="Arial" panose="020B0604020202020204" pitchFamily="34" charset="0"/>
                                     </a:rPr>
                                   </m:ctrlPr>
@@ -17592,7 +18566,7 @@
                                 <m:chr m:val="⃗"/>
                                 <m:ctrlPr>
                                   <a:rPr lang="en-US" sz="2000" b="0" i="1" smtClean="0">
-                                    <a:latin typeface="Cambria Math" panose="02040503050406030204" pitchFamily="18" charset="0"/>
+                                    <a:latin typeface="Cambria Math" charset="0"/>
                                     <a:cs typeface="Arial" panose="020B0604020202020204" pitchFamily="34" charset="0"/>
                                   </a:rPr>
                                 </m:ctrlPr>
@@ -18356,7 +19330,7 @@
                               <m:chr m:val="⃗"/>
                               <m:ctrlPr>
                                 <a:rPr lang="en-US" sz="2000" b="0" i="1" smtClean="0">
-                                  <a:latin typeface="Cambria Math" panose="02040503050406030204" pitchFamily="18" charset="0"/>
+                                  <a:latin typeface="Cambria Math" charset="0"/>
                                   <a:cs typeface="Arial" panose="020B0604020202020204" pitchFamily="34" charset="0"/>
                                 </a:rPr>
                               </m:ctrlPr>
@@ -18564,7 +19538,7 @@
                             <m:sSubPr>
                               <m:ctrlPr>
                                 <a:rPr lang="en-US" sz="2000" b="0" i="1" smtClean="0">
-                                  <a:latin typeface="Cambria Math" panose="02040503050406030204" pitchFamily="18" charset="0"/>
+                                  <a:latin typeface="Cambria Math" charset="0"/>
                                   <a:cs typeface="Arial" panose="020B0604020202020204" pitchFamily="34" charset="0"/>
                                 </a:rPr>
                               </m:ctrlPr>
@@ -18575,7 +19549,7 @@
                                   <m:chr m:val="⃗"/>
                                   <m:ctrlPr>
                                     <a:rPr lang="en-US" sz="2000" b="0" i="1" smtClean="0">
-                                      <a:latin typeface="Cambria Math" panose="02040503050406030204" pitchFamily="18" charset="0"/>
+                                      <a:latin typeface="Cambria Math" charset="0"/>
                                       <a:cs typeface="Arial" panose="020B0604020202020204" pitchFamily="34" charset="0"/>
                                     </a:rPr>
                                   </m:ctrlPr>
@@ -18686,7 +19660,7 @@
                             <m:sSubPr>
                               <m:ctrlPr>
                                 <a:rPr lang="en-US" sz="2000" b="0" i="1" smtClean="0">
-                                  <a:latin typeface="Cambria Math" panose="02040503050406030204" pitchFamily="18" charset="0"/>
+                                  <a:latin typeface="Cambria Math" charset="0"/>
                                   <a:cs typeface="Arial" panose="020B0604020202020204" pitchFamily="34" charset="0"/>
                                 </a:rPr>
                               </m:ctrlPr>
@@ -18697,7 +19671,7 @@
                                   <m:chr m:val="⃗"/>
                                   <m:ctrlPr>
                                     <a:rPr lang="en-US" sz="2000" b="0" i="1" smtClean="0">
-                                      <a:latin typeface="Cambria Math" panose="02040503050406030204" pitchFamily="18" charset="0"/>
+                                      <a:latin typeface="Cambria Math" charset="0"/>
                                       <a:cs typeface="Arial" panose="020B0604020202020204" pitchFamily="34" charset="0"/>
                                     </a:rPr>
                                   </m:ctrlPr>
@@ -18809,7 +19783,7 @@
                               <m:chr m:val="⃗"/>
                               <m:ctrlPr>
                                 <a:rPr lang="en-US" sz="2000" b="0" i="1" smtClean="0">
-                                  <a:latin typeface="Cambria Math" panose="02040503050406030204" pitchFamily="18" charset="0"/>
+                                  <a:latin typeface="Cambria Math" charset="0"/>
                                   <a:cs typeface="Arial" panose="020B0604020202020204" pitchFamily="34" charset="0"/>
                                 </a:rPr>
                               </m:ctrlPr>
@@ -19071,7 +20045,7 @@
                             <m:chr m:val="⃗"/>
                             <m:ctrlPr>
                               <a:rPr lang="en-US" sz="2000" b="0" i="1" smtClean="0">
-                                <a:latin typeface="Cambria Math" panose="02040503050406030204" pitchFamily="18" charset="0"/>
+                                <a:latin typeface="Cambria Math" charset="0"/>
                                 <a:cs typeface="Arial" panose="020B0604020202020204" pitchFamily="34" charset="0"/>
                               </a:rPr>
                             </m:ctrlPr>
@@ -19139,7 +20113,7 @@
       </p:grpSp>
       <p:grpSp>
         <p:nvGrpSpPr>
-          <p:cNvPr id="24" name="Group 23"/>
+          <p:cNvPr id="2" name="Group 1"/>
           <p:cNvGrpSpPr/>
           <p:nvPr/>
         </p:nvGrpSpPr>
@@ -19153,402 +20127,1288 @@
         </p:grpSpPr>
         <p:grpSp>
           <p:nvGrpSpPr>
-            <p:cNvPr id="40" name="Group 39"/>
+            <p:cNvPr id="24" name="Group 23"/>
             <p:cNvGrpSpPr/>
             <p:nvPr/>
           </p:nvGrpSpPr>
           <p:grpSpPr>
             <a:xfrm>
-              <a:off x="603160" y="4277771"/>
-              <a:ext cx="2224718" cy="2146316"/>
-              <a:chOff x="1129904" y="708040"/>
-              <a:chExt cx="2224718" cy="2146316"/>
+              <a:off x="603160" y="3935497"/>
+              <a:ext cx="3085370" cy="2488590"/>
+              <a:chOff x="603160" y="3935497"/>
+              <a:chExt cx="3085370" cy="2488590"/>
             </a:xfrm>
           </p:grpSpPr>
           <p:grpSp>
             <p:nvGrpSpPr>
-              <p:cNvPr id="53" name="Group 52"/>
+              <p:cNvPr id="40" name="Group 39"/>
               <p:cNvGrpSpPr/>
               <p:nvPr/>
             </p:nvGrpSpPr>
             <p:grpSpPr>
               <a:xfrm>
-                <a:off x="1163211" y="708040"/>
-                <a:ext cx="2191411" cy="2146316"/>
-                <a:chOff x="1190506" y="680744"/>
-                <a:chExt cx="2191411" cy="2146316"/>
+                <a:off x="603160" y="4277771"/>
+                <a:ext cx="2224718" cy="2146316"/>
+                <a:chOff x="1129904" y="708040"/>
+                <a:chExt cx="2224718" cy="2146316"/>
               </a:xfrm>
             </p:grpSpPr>
-            <p:cxnSp>
-              <p:nvCxnSpPr>
-                <p:cNvPr id="55" name="Straight Arrow Connector 54"/>
-                <p:cNvCxnSpPr/>
+            <p:grpSp>
+              <p:nvGrpSpPr>
+                <p:cNvPr id="53" name="Group 52"/>
+                <p:cNvGrpSpPr/>
                 <p:nvPr/>
-              </p:nvCxnSpPr>
+              </p:nvGrpSpPr>
+              <p:grpSpPr>
+                <a:xfrm>
+                  <a:off x="1163211" y="708040"/>
+                  <a:ext cx="2191411" cy="2146316"/>
+                  <a:chOff x="1190506" y="680744"/>
+                  <a:chExt cx="2191411" cy="2146316"/>
+                </a:xfrm>
+              </p:grpSpPr>
+              <p:cxnSp>
+                <p:nvCxnSpPr>
+                  <p:cNvPr id="55" name="Straight Arrow Connector 54"/>
+                  <p:cNvCxnSpPr/>
+                  <p:nvPr/>
+                </p:nvCxnSpPr>
+                <p:spPr>
+                  <a:xfrm flipV="1">
+                    <a:off x="1516583" y="680744"/>
+                    <a:ext cx="7684" cy="1859536"/>
+                  </a:xfrm>
+                  <a:prstGeom prst="straightConnector1">
+                    <a:avLst/>
+                  </a:prstGeom>
+                  <a:ln w="38100">
+                    <a:solidFill>
+                      <a:schemeClr val="tx1"/>
+                    </a:solidFill>
+                    <a:tailEnd type="triangle"/>
+                  </a:ln>
+                </p:spPr>
+                <p:style>
+                  <a:lnRef idx="1">
+                    <a:schemeClr val="accent1"/>
+                  </a:lnRef>
+                  <a:fillRef idx="0">
+                    <a:schemeClr val="accent1"/>
+                  </a:fillRef>
+                  <a:effectRef idx="0">
+                    <a:schemeClr val="accent1"/>
+                  </a:effectRef>
+                  <a:fontRef idx="minor">
+                    <a:schemeClr val="tx1"/>
+                  </a:fontRef>
+                </p:style>
+              </p:cxnSp>
+              <p:cxnSp>
+                <p:nvCxnSpPr>
+                  <p:cNvPr id="56" name="Straight Arrow Connector 55"/>
+                  <p:cNvCxnSpPr/>
+                  <p:nvPr/>
+                </p:nvCxnSpPr>
+                <p:spPr>
+                  <a:xfrm flipV="1">
+                    <a:off x="1507013" y="2535259"/>
+                    <a:ext cx="1874904" cy="1"/>
+                  </a:xfrm>
+                  <a:prstGeom prst="straightConnector1">
+                    <a:avLst/>
+                  </a:prstGeom>
+                  <a:ln w="38100">
+                    <a:solidFill>
+                      <a:schemeClr val="tx1"/>
+                    </a:solidFill>
+                    <a:tailEnd type="triangle"/>
+                  </a:ln>
+                </p:spPr>
+                <p:style>
+                  <a:lnRef idx="1">
+                    <a:schemeClr val="accent1"/>
+                  </a:lnRef>
+                  <a:fillRef idx="0">
+                    <a:schemeClr val="accent1"/>
+                  </a:fillRef>
+                  <a:effectRef idx="0">
+                    <a:schemeClr val="accent1"/>
+                  </a:effectRef>
+                  <a:fontRef idx="minor">
+                    <a:schemeClr val="tx1"/>
+                  </a:fontRef>
+                </p:style>
+              </p:cxnSp>
+              <mc:AlternateContent xmlns:mc="http://schemas.openxmlformats.org/markup-compatibility/2006" xmlns:a14="http://schemas.microsoft.com/office/drawing/2010/main">
+                <mc:Choice Requires="a14">
+                  <p:sp>
+                    <p:nvSpPr>
+                      <p:cNvPr id="68" name="Rectangle 67"/>
+                      <p:cNvSpPr/>
+                      <p:nvPr/>
+                    </p:nvSpPr>
+                    <p:spPr>
+                      <a:xfrm>
+                        <a:off x="2897675" y="2457728"/>
+                        <a:ext cx="367985" cy="369332"/>
+                      </a:xfrm>
+                      <a:prstGeom prst="rect">
+                        <a:avLst/>
+                      </a:prstGeom>
+                    </p:spPr>
+                    <p:txBody>
+                      <a:bodyPr wrap="none">
+                        <a:spAutoFit/>
+                      </a:bodyPr>
+                      <a:lstStyle/>
+                      <a:p>
+                        <a:pPr/>
+                        <a14:m>
+                          <m:oMathPara xmlns:m="http://schemas.openxmlformats.org/officeDocument/2006/math">
+                            <m:oMathParaPr>
+                              <m:jc m:val="centerGroup"/>
+                            </m:oMathParaPr>
+                            <m:oMath xmlns:m="http://schemas.openxmlformats.org/officeDocument/2006/math">
+                              <m:r>
+                                <a:rPr lang="en-US" i="1">
+                                  <a:latin typeface="Cambria Math" panose="02040503050406030204" pitchFamily="18" charset="0"/>
+                                  <a:cs typeface="Arial" panose="020B0604020202020204" pitchFamily="34" charset="0"/>
+                                </a:rPr>
+                                <m:t>𝑥</m:t>
+                              </m:r>
+                            </m:oMath>
+                          </m:oMathPara>
+                        </a14:m>
+                        <a:endParaRPr lang="en-CA" dirty="0"/>
+                      </a:p>
+                    </p:txBody>
+                  </p:sp>
+                </mc:Choice>
+                <mc:Fallback xmlns="">
+                  <p:sp>
+                    <p:nvSpPr>
+                      <p:cNvPr id="12" name="Rectangle 11"/>
+                      <p:cNvSpPr>
+                        <a:spLocks noRot="1" noChangeAspect="1" noMove="1" noResize="1" noEditPoints="1" noAdjustHandles="1" noChangeArrowheads="1" noChangeShapeType="1" noTextEdit="1"/>
+                      </p:cNvSpPr>
+                      <p:nvPr/>
+                    </p:nvSpPr>
+                    <p:spPr>
+                      <a:xfrm>
+                        <a:off x="2897675" y="2457728"/>
+                        <a:ext cx="367985" cy="369332"/>
+                      </a:xfrm>
+                      <a:prstGeom prst="rect">
+                        <a:avLst/>
+                      </a:prstGeom>
+                      <a:blipFill rotWithShape="0">
+                        <a:blip r:embed="rId36"/>
+                        <a:stretch>
+                          <a:fillRect/>
+                        </a:stretch>
+                      </a:blipFill>
+                    </p:spPr>
+                    <p:txBody>
+                      <a:bodyPr/>
+                      <a:lstStyle/>
+                      <a:p>
+                        <a:r>
+                          <a:rPr lang="en-CA">
+                            <a:noFill/>
+                          </a:rPr>
+                          <a:t> </a:t>
+                        </a:r>
+                      </a:p>
+                    </p:txBody>
+                  </p:sp>
+                </mc:Fallback>
+              </mc:AlternateContent>
+              <mc:AlternateContent xmlns:mc="http://schemas.openxmlformats.org/markup-compatibility/2006" xmlns:a14="http://schemas.microsoft.com/office/drawing/2010/main">
+                <mc:Choice Requires="a14">
+                  <p:sp>
+                    <p:nvSpPr>
+                      <p:cNvPr id="69" name="Rectangle 68"/>
+                      <p:cNvSpPr/>
+                      <p:nvPr/>
+                    </p:nvSpPr>
+                    <p:spPr>
+                      <a:xfrm>
+                        <a:off x="1190506" y="790545"/>
+                        <a:ext cx="371384" cy="369332"/>
+                      </a:xfrm>
+                      <a:prstGeom prst="rect">
+                        <a:avLst/>
+                      </a:prstGeom>
+                    </p:spPr>
+                    <p:txBody>
+                      <a:bodyPr wrap="none">
+                        <a:spAutoFit/>
+                      </a:bodyPr>
+                      <a:lstStyle/>
+                      <a:p>
+                        <a:pPr/>
+                        <a14:m>
+                          <m:oMathPara xmlns:m="http://schemas.openxmlformats.org/officeDocument/2006/math">
+                            <m:oMathParaPr>
+                              <m:jc m:val="centerGroup"/>
+                            </m:oMathParaPr>
+                            <m:oMath xmlns:m="http://schemas.openxmlformats.org/officeDocument/2006/math">
+                              <m:r>
+                                <a:rPr lang="en-US" b="0" i="1" smtClean="0">
+                                  <a:latin typeface="Cambria Math" panose="02040503050406030204" pitchFamily="18" charset="0"/>
+                                </a:rPr>
+                                <m:t>𝑦</m:t>
+                              </m:r>
+                            </m:oMath>
+                          </m:oMathPara>
+                        </a14:m>
+                        <a:endParaRPr lang="en-CA" dirty="0"/>
+                      </a:p>
+                    </p:txBody>
+                  </p:sp>
+                </mc:Choice>
+                <mc:Fallback xmlns="">
+                  <p:sp>
+                    <p:nvSpPr>
+                      <p:cNvPr id="13" name="Rectangle 12"/>
+                      <p:cNvSpPr>
+                        <a:spLocks noRot="1" noChangeAspect="1" noMove="1" noResize="1" noEditPoints="1" noAdjustHandles="1" noChangeArrowheads="1" noChangeShapeType="1" noTextEdit="1"/>
+                      </p:cNvSpPr>
+                      <p:nvPr/>
+                    </p:nvSpPr>
+                    <p:spPr>
+                      <a:xfrm>
+                        <a:off x="1190506" y="790545"/>
+                        <a:ext cx="371384" cy="369332"/>
+                      </a:xfrm>
+                      <a:prstGeom prst="rect">
+                        <a:avLst/>
+                      </a:prstGeom>
+                      <a:blipFill rotWithShape="0">
+                        <a:blip r:embed="rId37"/>
+                        <a:stretch>
+                          <a:fillRect b="-6557"/>
+                        </a:stretch>
+                      </a:blipFill>
+                    </p:spPr>
+                    <p:txBody>
+                      <a:bodyPr/>
+                      <a:lstStyle/>
+                      <a:p>
+                        <a:r>
+                          <a:rPr lang="en-CA">
+                            <a:noFill/>
+                          </a:rPr>
+                          <a:t> </a:t>
+                        </a:r>
+                      </a:p>
+                    </p:txBody>
+                  </p:sp>
+                </mc:Fallback>
+              </mc:AlternateContent>
+              <mc:AlternateContent xmlns:mc="http://schemas.openxmlformats.org/markup-compatibility/2006" xmlns:a14="http://schemas.microsoft.com/office/drawing/2010/main">
+                <mc:Choice Requires="a14">
+                  <p:sp>
+                    <p:nvSpPr>
+                      <p:cNvPr id="70" name="Rectangle 69"/>
+                      <p:cNvSpPr/>
+                      <p:nvPr/>
+                    </p:nvSpPr>
+                    <p:spPr>
+                      <a:xfrm>
+                        <a:off x="1205483" y="2447020"/>
+                        <a:ext cx="367985" cy="369332"/>
+                      </a:xfrm>
+                      <a:prstGeom prst="rect">
+                        <a:avLst/>
+                      </a:prstGeom>
+                    </p:spPr>
+                    <p:txBody>
+                      <a:bodyPr wrap="none">
+                        <a:spAutoFit/>
+                      </a:bodyPr>
+                      <a:lstStyle/>
+                      <a:p>
+                        <a:pPr/>
+                        <a14:m>
+                          <m:oMathPara xmlns:m="http://schemas.openxmlformats.org/officeDocument/2006/math">
+                            <m:oMathParaPr>
+                              <m:jc m:val="centerGroup"/>
+                            </m:oMathParaPr>
+                            <m:oMath xmlns:m="http://schemas.openxmlformats.org/officeDocument/2006/math">
+                              <m:r>
+                                <a:rPr lang="en-US" b="0" i="1" smtClean="0">
+                                  <a:latin typeface="Cambria Math" panose="02040503050406030204" pitchFamily="18" charset="0"/>
+                                  <a:cs typeface="Arial" panose="020B0604020202020204" pitchFamily="34" charset="0"/>
+                                </a:rPr>
+                                <m:t>0</m:t>
+                              </m:r>
+                            </m:oMath>
+                          </m:oMathPara>
+                        </a14:m>
+                        <a:endParaRPr lang="en-CA" dirty="0"/>
+                      </a:p>
+                    </p:txBody>
+                  </p:sp>
+                </mc:Choice>
+                <mc:Fallback xmlns="">
+                  <p:sp>
+                    <p:nvSpPr>
+                      <p:cNvPr id="14" name="Rectangle 13"/>
+                      <p:cNvSpPr>
+                        <a:spLocks noRot="1" noChangeAspect="1" noMove="1" noResize="1" noEditPoints="1" noAdjustHandles="1" noChangeArrowheads="1" noChangeShapeType="1" noTextEdit="1"/>
+                      </p:cNvSpPr>
+                      <p:nvPr/>
+                    </p:nvSpPr>
+                    <p:spPr>
+                      <a:xfrm>
+                        <a:off x="1205483" y="2447020"/>
+                        <a:ext cx="367985" cy="369332"/>
+                      </a:xfrm>
+                      <a:prstGeom prst="rect">
+                        <a:avLst/>
+                      </a:prstGeom>
+                      <a:blipFill rotWithShape="0">
+                        <a:blip r:embed="rId38"/>
+                        <a:stretch>
+                          <a:fillRect/>
+                        </a:stretch>
+                      </a:blipFill>
+                    </p:spPr>
+                    <p:txBody>
+                      <a:bodyPr/>
+                      <a:lstStyle/>
+                      <a:p>
+                        <a:r>
+                          <a:rPr lang="en-CA">
+                            <a:noFill/>
+                          </a:rPr>
+                          <a:t> </a:t>
+                        </a:r>
+                      </a:p>
+                    </p:txBody>
+                  </p:sp>
+                </mc:Fallback>
+              </mc:AlternateContent>
+            </p:grpSp>
+            <p:sp>
+              <p:nvSpPr>
+                <p:cNvPr id="54" name="Rectangle 53"/>
+                <p:cNvSpPr/>
+                <p:nvPr/>
+              </p:nvSpPr>
               <p:spPr>
-                <a:xfrm flipV="1">
-                  <a:off x="1516583" y="680744"/>
-                  <a:ext cx="7684" cy="1859536"/>
+                <a:xfrm>
+                  <a:off x="1129904" y="1614682"/>
+                  <a:ext cx="184731" cy="369332"/>
                 </a:xfrm>
-                <a:prstGeom prst="straightConnector1">
+                <a:prstGeom prst="rect">
                   <a:avLst/>
                 </a:prstGeom>
-                <a:ln w="38100">
-                  <a:solidFill>
-                    <a:schemeClr val="tx1"/>
-                  </a:solidFill>
-                  <a:tailEnd type="triangle"/>
-                </a:ln>
               </p:spPr>
-              <p:style>
-                <a:lnRef idx="1">
-                  <a:schemeClr val="accent1"/>
-                </a:lnRef>
-                <a:fillRef idx="0">
-                  <a:schemeClr val="accent1"/>
-                </a:fillRef>
-                <a:effectRef idx="0">
-                  <a:schemeClr val="accent1"/>
-                </a:effectRef>
-                <a:fontRef idx="minor">
-                  <a:schemeClr val="tx1"/>
-                </a:fontRef>
-              </p:style>
-            </p:cxnSp>
-            <p:cxnSp>
-              <p:nvCxnSpPr>
-                <p:cNvPr id="56" name="Straight Arrow Connector 55"/>
-                <p:cNvCxnSpPr/>
-                <p:nvPr/>
-              </p:nvCxnSpPr>
-              <p:spPr>
-                <a:xfrm flipV="1">
-                  <a:off x="1507013" y="2535259"/>
-                  <a:ext cx="1874904" cy="1"/>
-                </a:xfrm>
-                <a:prstGeom prst="straightConnector1">
-                  <a:avLst/>
-                </a:prstGeom>
-                <a:ln w="38100">
-                  <a:solidFill>
-                    <a:schemeClr val="tx1"/>
-                  </a:solidFill>
-                  <a:tailEnd type="triangle"/>
-                </a:ln>
-              </p:spPr>
-              <p:style>
-                <a:lnRef idx="1">
-                  <a:schemeClr val="accent1"/>
-                </a:lnRef>
-                <a:fillRef idx="0">
-                  <a:schemeClr val="accent1"/>
-                </a:fillRef>
-                <a:effectRef idx="0">
-                  <a:schemeClr val="accent1"/>
-                </a:effectRef>
-                <a:fontRef idx="minor">
-                  <a:schemeClr val="tx1"/>
-                </a:fontRef>
-              </p:style>
-            </p:cxnSp>
-            <mc:AlternateContent xmlns:mc="http://schemas.openxmlformats.org/markup-compatibility/2006" xmlns:a14="http://schemas.microsoft.com/office/drawing/2010/main">
-              <mc:Choice Requires="a14">
-                <p:sp>
-                  <p:nvSpPr>
-                    <p:cNvPr id="68" name="Rectangle 67"/>
-                    <p:cNvSpPr/>
-                    <p:nvPr/>
-                  </p:nvSpPr>
-                  <p:spPr>
-                    <a:xfrm>
-                      <a:off x="2897675" y="2457728"/>
-                      <a:ext cx="367985" cy="369332"/>
-                    </a:xfrm>
-                    <a:prstGeom prst="rect">
-                      <a:avLst/>
-                    </a:prstGeom>
-                  </p:spPr>
-                  <p:txBody>
-                    <a:bodyPr wrap="none">
-                      <a:spAutoFit/>
-                    </a:bodyPr>
-                    <a:lstStyle/>
-                    <a:p>
-                      <a:pPr/>
-                      <a14:m>
-                        <m:oMathPara xmlns:m="http://schemas.openxmlformats.org/officeDocument/2006/math">
-                          <m:oMathParaPr>
-                            <m:jc m:val="centerGroup"/>
-                          </m:oMathParaPr>
-                          <m:oMath xmlns:m="http://schemas.openxmlformats.org/officeDocument/2006/math">
-                            <m:r>
-                              <a:rPr lang="en-US" i="1">
-                                <a:latin typeface="Cambria Math" panose="02040503050406030204" pitchFamily="18" charset="0"/>
-                                <a:cs typeface="Arial" panose="020B0604020202020204" pitchFamily="34" charset="0"/>
-                              </a:rPr>
-                              <m:t>𝑥</m:t>
-                            </m:r>
-                          </m:oMath>
-                        </m:oMathPara>
-                      </a14:m>
-                      <a:endParaRPr lang="en-CA" dirty="0"/>
-                    </a:p>
-                  </p:txBody>
-                </p:sp>
-              </mc:Choice>
-              <mc:Fallback xmlns="">
-                <p:sp>
-                  <p:nvSpPr>
-                    <p:cNvPr id="12" name="Rectangle 11"/>
-                    <p:cNvSpPr>
-                      <a:spLocks noRot="1" noChangeAspect="1" noMove="1" noResize="1" noEditPoints="1" noAdjustHandles="1" noChangeArrowheads="1" noChangeShapeType="1" noTextEdit="1"/>
-                    </p:cNvSpPr>
-                    <p:nvPr/>
-                  </p:nvSpPr>
-                  <p:spPr>
-                    <a:xfrm>
-                      <a:off x="2897675" y="2457728"/>
-                      <a:ext cx="367985" cy="369332"/>
-                    </a:xfrm>
-                    <a:prstGeom prst="rect">
-                      <a:avLst/>
-                    </a:prstGeom>
-                    <a:blipFill rotWithShape="0">
-                      <a:blip r:embed="rId36"/>
-                      <a:stretch>
-                        <a:fillRect/>
-                      </a:stretch>
-                    </a:blipFill>
-                  </p:spPr>
-                  <p:txBody>
-                    <a:bodyPr/>
-                    <a:lstStyle/>
-                    <a:p>
-                      <a:r>
-                        <a:rPr lang="en-CA">
-                          <a:noFill/>
-                        </a:rPr>
-                        <a:t> </a:t>
-                      </a:r>
-                    </a:p>
-                  </p:txBody>
-                </p:sp>
-              </mc:Fallback>
-            </mc:AlternateContent>
-            <mc:AlternateContent xmlns:mc="http://schemas.openxmlformats.org/markup-compatibility/2006" xmlns:a14="http://schemas.microsoft.com/office/drawing/2010/main">
-              <mc:Choice Requires="a14">
-                <p:sp>
-                  <p:nvSpPr>
-                    <p:cNvPr id="69" name="Rectangle 68"/>
-                    <p:cNvSpPr/>
-                    <p:nvPr/>
-                  </p:nvSpPr>
-                  <p:spPr>
-                    <a:xfrm>
-                      <a:off x="1190506" y="790545"/>
-                      <a:ext cx="371384" cy="369332"/>
-                    </a:xfrm>
-                    <a:prstGeom prst="rect">
-                      <a:avLst/>
-                    </a:prstGeom>
-                  </p:spPr>
-                  <p:txBody>
-                    <a:bodyPr wrap="none">
-                      <a:spAutoFit/>
-                    </a:bodyPr>
-                    <a:lstStyle/>
-                    <a:p>
-                      <a:pPr/>
-                      <a14:m>
-                        <m:oMathPara xmlns:m="http://schemas.openxmlformats.org/officeDocument/2006/math">
-                          <m:oMathParaPr>
-                            <m:jc m:val="centerGroup"/>
-                          </m:oMathParaPr>
-                          <m:oMath xmlns:m="http://schemas.openxmlformats.org/officeDocument/2006/math">
-                            <m:r>
-                              <a:rPr lang="en-US" b="0" i="1" smtClean="0">
-                                <a:latin typeface="Cambria Math" panose="02040503050406030204" pitchFamily="18" charset="0"/>
-                              </a:rPr>
-                              <m:t>𝑦</m:t>
-                            </m:r>
-                          </m:oMath>
-                        </m:oMathPara>
-                      </a14:m>
-                      <a:endParaRPr lang="en-CA" dirty="0"/>
-                    </a:p>
-                  </p:txBody>
-                </p:sp>
-              </mc:Choice>
-              <mc:Fallback xmlns="">
-                <p:sp>
-                  <p:nvSpPr>
-                    <p:cNvPr id="13" name="Rectangle 12"/>
-                    <p:cNvSpPr>
-                      <a:spLocks noRot="1" noChangeAspect="1" noMove="1" noResize="1" noEditPoints="1" noAdjustHandles="1" noChangeArrowheads="1" noChangeShapeType="1" noTextEdit="1"/>
-                    </p:cNvSpPr>
-                    <p:nvPr/>
-                  </p:nvSpPr>
-                  <p:spPr>
-                    <a:xfrm>
-                      <a:off x="1190506" y="790545"/>
-                      <a:ext cx="371384" cy="369332"/>
-                    </a:xfrm>
-                    <a:prstGeom prst="rect">
-                      <a:avLst/>
-                    </a:prstGeom>
-                    <a:blipFill rotWithShape="0">
-                      <a:blip r:embed="rId37"/>
-                      <a:stretch>
-                        <a:fillRect b="-6557"/>
-                      </a:stretch>
-                    </a:blipFill>
-                  </p:spPr>
-                  <p:txBody>
-                    <a:bodyPr/>
-                    <a:lstStyle/>
-                    <a:p>
-                      <a:r>
-                        <a:rPr lang="en-CA">
-                          <a:noFill/>
-                        </a:rPr>
-                        <a:t> </a:t>
-                      </a:r>
-                    </a:p>
-                  </p:txBody>
-                </p:sp>
-              </mc:Fallback>
-            </mc:AlternateContent>
-            <mc:AlternateContent xmlns:mc="http://schemas.openxmlformats.org/markup-compatibility/2006" xmlns:a14="http://schemas.microsoft.com/office/drawing/2010/main">
-              <mc:Choice Requires="a14">
-                <p:sp>
-                  <p:nvSpPr>
-                    <p:cNvPr id="70" name="Rectangle 69"/>
-                    <p:cNvSpPr/>
-                    <p:nvPr/>
-                  </p:nvSpPr>
-                  <p:spPr>
-                    <a:xfrm>
-                      <a:off x="1205483" y="2447020"/>
-                      <a:ext cx="367985" cy="369332"/>
-                    </a:xfrm>
-                    <a:prstGeom prst="rect">
-                      <a:avLst/>
-                    </a:prstGeom>
-                  </p:spPr>
-                  <p:txBody>
-                    <a:bodyPr wrap="none">
-                      <a:spAutoFit/>
-                    </a:bodyPr>
-                    <a:lstStyle/>
-                    <a:p>
-                      <a:pPr/>
-                      <a14:m>
-                        <m:oMathPara xmlns:m="http://schemas.openxmlformats.org/officeDocument/2006/math">
-                          <m:oMathParaPr>
-                            <m:jc m:val="centerGroup"/>
-                          </m:oMathParaPr>
-                          <m:oMath xmlns:m="http://schemas.openxmlformats.org/officeDocument/2006/math">
-                            <m:r>
-                              <a:rPr lang="en-US" b="0" i="1" smtClean="0">
-                                <a:latin typeface="Cambria Math" panose="02040503050406030204" pitchFamily="18" charset="0"/>
-                                <a:cs typeface="Arial" panose="020B0604020202020204" pitchFamily="34" charset="0"/>
-                              </a:rPr>
-                              <m:t>0</m:t>
-                            </m:r>
-                          </m:oMath>
-                        </m:oMathPara>
-                      </a14:m>
-                      <a:endParaRPr lang="en-CA" dirty="0"/>
-                    </a:p>
-                  </p:txBody>
-                </p:sp>
-              </mc:Choice>
-              <mc:Fallback xmlns="">
-                <p:sp>
-                  <p:nvSpPr>
-                    <p:cNvPr id="14" name="Rectangle 13"/>
-                    <p:cNvSpPr>
-                      <a:spLocks noRot="1" noChangeAspect="1" noMove="1" noResize="1" noEditPoints="1" noAdjustHandles="1" noChangeArrowheads="1" noChangeShapeType="1" noTextEdit="1"/>
-                    </p:cNvSpPr>
-                    <p:nvPr/>
-                  </p:nvSpPr>
-                  <p:spPr>
-                    <a:xfrm>
-                      <a:off x="1205483" y="2447020"/>
-                      <a:ext cx="367985" cy="369332"/>
-                    </a:xfrm>
-                    <a:prstGeom prst="rect">
-                      <a:avLst/>
-                    </a:prstGeom>
-                    <a:blipFill rotWithShape="0">
-                      <a:blip r:embed="rId38"/>
-                      <a:stretch>
-                        <a:fillRect/>
-                      </a:stretch>
-                    </a:blipFill>
-                  </p:spPr>
-                  <p:txBody>
-                    <a:bodyPr/>
-                    <a:lstStyle/>
-                    <a:p>
-                      <a:r>
-                        <a:rPr lang="en-CA">
-                          <a:noFill/>
-                        </a:rPr>
-                        <a:t> </a:t>
-                      </a:r>
-                    </a:p>
-                  </p:txBody>
-                </p:sp>
-              </mc:Fallback>
-            </mc:AlternateContent>
+              <p:txBody>
+                <a:bodyPr wrap="none">
+                  <a:spAutoFit/>
+                </a:bodyPr>
+                <a:lstStyle/>
+                <a:p>
+                  <a:endParaRPr lang="en-CA" dirty="0"/>
+                </a:p>
+              </p:txBody>
+            </p:sp>
           </p:grpSp>
           <p:sp>
             <p:nvSpPr>
-              <p:cNvPr id="54" name="Rectangle 53"/>
+              <p:cNvPr id="42" name="Oval 41"/>
               <p:cNvSpPr/>
               <p:nvPr/>
             </p:nvSpPr>
             <p:spPr>
               <a:xfrm>
-                <a:off x="1129904" y="1614682"/>
-                <a:ext cx="184731" cy="369332"/>
+                <a:off x="1224682" y="5655603"/>
+                <a:ext cx="120943" cy="119766"/>
               </a:xfrm>
-              <a:prstGeom prst="rect">
+              <a:prstGeom prst="ellipse">
                 <a:avLst/>
               </a:prstGeom>
+              <a:solidFill>
+                <a:schemeClr val="tx1"/>
+              </a:solidFill>
+              <a:ln w="38100">
+                <a:solidFill>
+                  <a:schemeClr val="tx1"/>
+                </a:solidFill>
+              </a:ln>
             </p:spPr>
+            <p:style>
+              <a:lnRef idx="2">
+                <a:schemeClr val="accent1">
+                  <a:shade val="50000"/>
+                </a:schemeClr>
+              </a:lnRef>
+              <a:fillRef idx="1">
+                <a:schemeClr val="accent1"/>
+              </a:fillRef>
+              <a:effectRef idx="0">
+                <a:schemeClr val="accent1"/>
+              </a:effectRef>
+              <a:fontRef idx="minor">
+                <a:schemeClr val="lt1"/>
+              </a:fontRef>
+            </p:style>
             <p:txBody>
-              <a:bodyPr wrap="none">
-                <a:spAutoFit/>
-              </a:bodyPr>
+              <a:bodyPr rtlCol="0" anchor="ctr"/>
               <a:lstStyle/>
               <a:p>
-                <a:endParaRPr lang="en-CA" dirty="0"/>
+                <a:pPr algn="ctr"/>
+                <a:endParaRPr lang="en-US"/>
               </a:p>
             </p:txBody>
           </p:sp>
+          <p:sp>
+            <p:nvSpPr>
+              <p:cNvPr id="44" name="Oval 43"/>
+              <p:cNvSpPr/>
+              <p:nvPr/>
+            </p:nvSpPr>
+            <p:spPr>
+              <a:xfrm>
+                <a:off x="3105847" y="4278957"/>
+                <a:ext cx="120943" cy="119766"/>
+              </a:xfrm>
+              <a:prstGeom prst="ellipse">
+                <a:avLst/>
+              </a:prstGeom>
+              <a:solidFill>
+                <a:schemeClr val="tx1"/>
+              </a:solidFill>
+              <a:ln w="38100">
+                <a:solidFill>
+                  <a:schemeClr val="tx1"/>
+                </a:solidFill>
+              </a:ln>
+            </p:spPr>
+            <p:style>
+              <a:lnRef idx="2">
+                <a:schemeClr val="accent1">
+                  <a:shade val="50000"/>
+                </a:schemeClr>
+              </a:lnRef>
+              <a:fillRef idx="1">
+                <a:schemeClr val="accent1"/>
+              </a:fillRef>
+              <a:effectRef idx="0">
+                <a:schemeClr val="accent1"/>
+              </a:effectRef>
+              <a:fontRef idx="minor">
+                <a:schemeClr val="lt1"/>
+              </a:fontRef>
+            </p:style>
+            <p:txBody>
+              <a:bodyPr rtlCol="0" anchor="ctr"/>
+              <a:lstStyle/>
+              <a:p>
+                <a:pPr algn="ctr"/>
+                <a:endParaRPr lang="en-US"/>
+              </a:p>
+            </p:txBody>
+          </p:sp>
+          <mc:AlternateContent xmlns:mc="http://schemas.openxmlformats.org/markup-compatibility/2006" xmlns:a14="http://schemas.microsoft.com/office/drawing/2010/main">
+            <mc:Choice Requires="a14">
+              <p:sp>
+                <p:nvSpPr>
+                  <p:cNvPr id="46" name="TextBox 45"/>
+                  <p:cNvSpPr txBox="1"/>
+                  <p:nvPr/>
+                </p:nvSpPr>
+                <p:spPr>
+                  <a:xfrm>
+                    <a:off x="1345506" y="5762027"/>
+                    <a:ext cx="234936" cy="307777"/>
+                  </a:xfrm>
+                  <a:prstGeom prst="rect">
+                    <a:avLst/>
+                  </a:prstGeom>
+                  <a:noFill/>
+                </p:spPr>
+                <p:txBody>
+                  <a:bodyPr wrap="none" lIns="0" tIns="0" rIns="0" bIns="0" rtlCol="0">
+                    <a:spAutoFit/>
+                  </a:bodyPr>
+                  <a:lstStyle/>
+                  <a:p>
+                    <a:pPr/>
+                    <a14:m>
+                      <m:oMathPara xmlns:m="http://schemas.openxmlformats.org/officeDocument/2006/math">
+                        <m:oMathParaPr>
+                          <m:jc m:val="centerGroup"/>
+                        </m:oMathParaPr>
+                        <m:oMath xmlns:m="http://schemas.openxmlformats.org/officeDocument/2006/math">
+                          <m:r>
+                            <a:rPr lang="en-US" sz="2000" b="0" i="1" smtClean="0">
+                              <a:latin typeface="Cambria Math" panose="02040503050406030204" pitchFamily="18" charset="0"/>
+                              <a:cs typeface="Arial" panose="020B0604020202020204" pitchFamily="34" charset="0"/>
+                            </a:rPr>
+                            <m:t>𝐴</m:t>
+                          </m:r>
+                        </m:oMath>
+                      </m:oMathPara>
+                    </a14:m>
+                    <a:endParaRPr lang="en-US" sz="2000" dirty="0" smtClean="0">
+                      <a:latin typeface="Arial" panose="020B0604020202020204" pitchFamily="34" charset="0"/>
+                      <a:cs typeface="Arial" panose="020B0604020202020204" pitchFamily="34" charset="0"/>
+                    </a:endParaRPr>
+                  </a:p>
+                </p:txBody>
+              </p:sp>
+            </mc:Choice>
+            <mc:Fallback xmlns="">
+              <p:sp>
+                <p:nvSpPr>
+                  <p:cNvPr id="46" name="TextBox 45"/>
+                  <p:cNvSpPr txBox="1">
+                    <a:spLocks noRot="1" noChangeAspect="1" noMove="1" noResize="1" noEditPoints="1" noAdjustHandles="1" noChangeArrowheads="1" noChangeShapeType="1" noTextEdit="1"/>
+                  </p:cNvSpPr>
+                  <p:nvPr/>
+                </p:nvSpPr>
+                <p:spPr>
+                  <a:xfrm>
+                    <a:off x="1345506" y="5762027"/>
+                    <a:ext cx="234936" cy="307777"/>
+                  </a:xfrm>
+                  <a:prstGeom prst="rect">
+                    <a:avLst/>
+                  </a:prstGeom>
+                  <a:blipFill>
+                    <a:blip r:embed="rId39"/>
+                    <a:stretch>
+                      <a:fillRect l="-23684" r="-23684" b="-9804"/>
+                    </a:stretch>
+                  </a:blipFill>
+                </p:spPr>
+                <p:txBody>
+                  <a:bodyPr/>
+                  <a:lstStyle/>
+                  <a:p>
+                    <a:r>
+                      <a:rPr lang="en-US">
+                        <a:noFill/>
+                      </a:rPr>
+                      <a:t> </a:t>
+                    </a:r>
+                  </a:p>
+                </p:txBody>
+              </p:sp>
+            </mc:Fallback>
+          </mc:AlternateContent>
+          <mc:AlternateContent xmlns:mc="http://schemas.openxmlformats.org/markup-compatibility/2006" xmlns:a14="http://schemas.microsoft.com/office/drawing/2010/main">
+            <mc:Choice Requires="a14">
+              <p:sp>
+                <p:nvSpPr>
+                  <p:cNvPr id="47" name="TextBox 46"/>
+                  <p:cNvSpPr txBox="1"/>
+                  <p:nvPr/>
+                </p:nvSpPr>
+                <p:spPr>
+                  <a:xfrm>
+                    <a:off x="3226790" y="3935497"/>
+                    <a:ext cx="245708" cy="307777"/>
+                  </a:xfrm>
+                  <a:prstGeom prst="rect">
+                    <a:avLst/>
+                  </a:prstGeom>
+                  <a:noFill/>
+                </p:spPr>
+                <p:txBody>
+                  <a:bodyPr wrap="none" lIns="0" tIns="0" rIns="0" bIns="0" rtlCol="0">
+                    <a:spAutoFit/>
+                  </a:bodyPr>
+                  <a:lstStyle/>
+                  <a:p>
+                    <a:pPr/>
+                    <a14:m>
+                      <m:oMathPara xmlns:m="http://schemas.openxmlformats.org/officeDocument/2006/math">
+                        <m:oMathParaPr>
+                          <m:jc m:val="centerGroup"/>
+                        </m:oMathParaPr>
+                        <m:oMath xmlns:m="http://schemas.openxmlformats.org/officeDocument/2006/math">
+                          <m:r>
+                            <a:rPr lang="en-US" sz="2000" b="0" i="1" smtClean="0">
+                              <a:latin typeface="Cambria Math" panose="02040503050406030204" pitchFamily="18" charset="0"/>
+                              <a:cs typeface="Arial" panose="020B0604020202020204" pitchFamily="34" charset="0"/>
+                            </a:rPr>
+                            <m:t>𝐵</m:t>
+                          </m:r>
+                        </m:oMath>
+                      </m:oMathPara>
+                    </a14:m>
+                    <a:endParaRPr lang="en-US" sz="2000" dirty="0" smtClean="0">
+                      <a:latin typeface="Arial" panose="020B0604020202020204" pitchFamily="34" charset="0"/>
+                      <a:cs typeface="Arial" panose="020B0604020202020204" pitchFamily="34" charset="0"/>
+                    </a:endParaRPr>
+                  </a:p>
+                </p:txBody>
+              </p:sp>
+            </mc:Choice>
+            <mc:Fallback xmlns="">
+              <p:sp>
+                <p:nvSpPr>
+                  <p:cNvPr id="47" name="TextBox 46"/>
+                  <p:cNvSpPr txBox="1">
+                    <a:spLocks noRot="1" noChangeAspect="1" noMove="1" noResize="1" noEditPoints="1" noAdjustHandles="1" noChangeArrowheads="1" noChangeShapeType="1" noTextEdit="1"/>
+                  </p:cNvSpPr>
+                  <p:nvPr/>
+                </p:nvSpPr>
+                <p:spPr>
+                  <a:xfrm>
+                    <a:off x="3226790" y="3935497"/>
+                    <a:ext cx="245708" cy="307777"/>
+                  </a:xfrm>
+                  <a:prstGeom prst="rect">
+                    <a:avLst/>
+                  </a:prstGeom>
+                  <a:blipFill>
+                    <a:blip r:embed="rId40"/>
+                    <a:stretch>
+                      <a:fillRect l="-19512" r="-19512" b="-10000"/>
+                    </a:stretch>
+                  </a:blipFill>
+                </p:spPr>
+                <p:txBody>
+                  <a:bodyPr/>
+                  <a:lstStyle/>
+                  <a:p>
+                    <a:r>
+                      <a:rPr lang="en-US">
+                        <a:noFill/>
+                      </a:rPr>
+                      <a:t> </a:t>
+                    </a:r>
+                  </a:p>
+                </p:txBody>
+              </p:sp>
+            </mc:Fallback>
+          </mc:AlternateContent>
+          <mc:AlternateContent xmlns:mc="http://schemas.openxmlformats.org/markup-compatibility/2006" xmlns:a14="http://schemas.microsoft.com/office/drawing/2010/main">
+            <mc:Choice Requires="a14">
+              <p:sp>
+                <p:nvSpPr>
+                  <p:cNvPr id="52" name="TextBox 51"/>
+                  <p:cNvSpPr txBox="1"/>
+                  <p:nvPr/>
+                </p:nvSpPr>
+                <p:spPr>
+                  <a:xfrm>
+                    <a:off x="2189829" y="4157475"/>
+                    <a:ext cx="896912" cy="345159"/>
+                  </a:xfrm>
+                  <a:prstGeom prst="rect">
+                    <a:avLst/>
+                  </a:prstGeom>
+                  <a:noFill/>
+                </p:spPr>
+                <p:txBody>
+                  <a:bodyPr wrap="none" lIns="0" tIns="0" rIns="0" bIns="0" rtlCol="0">
+                    <a:spAutoFit/>
+                  </a:bodyPr>
+                  <a:lstStyle/>
+                  <a:p>
+                    <a:pPr/>
+                    <a14:m>
+                      <m:oMathPara xmlns:m="http://schemas.openxmlformats.org/officeDocument/2006/math">
+                        <m:oMathParaPr>
+                          <m:jc m:val="centerGroup"/>
+                        </m:oMathParaPr>
+                        <m:oMath xmlns:m="http://schemas.openxmlformats.org/officeDocument/2006/math">
+                          <m:sSup>
+                            <m:sSupPr>
+                              <m:ctrlPr>
+                                <a:rPr lang="en-US" sz="2000" b="0" i="1" smtClean="0">
+                                  <a:latin typeface="Cambria Math" charset="0"/>
+                                  <a:cs typeface="Arial" panose="020B0604020202020204" pitchFamily="34" charset="0"/>
+                                </a:rPr>
+                              </m:ctrlPr>
+                            </m:sSupPr>
+                            <m:e>
+                              <m:acc>
+                                <m:accPr>
+                                  <m:chr m:val="⃗"/>
+                                  <m:ctrlPr>
+                                    <a:rPr lang="en-US" sz="2000" b="0" i="1" smtClean="0">
+                                      <a:latin typeface="Cambria Math" charset="0"/>
+                                      <a:cs typeface="Arial" panose="020B0604020202020204" pitchFamily="34" charset="0"/>
+                                    </a:rPr>
+                                  </m:ctrlPr>
+                                </m:accPr>
+                                <m:e>
+                                  <m:r>
+                                    <a:rPr lang="en-US" sz="2000" b="0" i="1" smtClean="0">
+                                      <a:latin typeface="Cambria Math" panose="02040503050406030204" pitchFamily="18" charset="0"/>
+                                      <a:cs typeface="Arial" panose="020B0604020202020204" pitchFamily="34" charset="0"/>
+                                    </a:rPr>
+                                    <m:t>𝐹</m:t>
+                                  </m:r>
+                                </m:e>
+                              </m:acc>
+                            </m:e>
+                            <m:sup>
+                              <m:r>
+                                <a:rPr lang="en-US" sz="2000" b="0" i="1" smtClean="0">
+                                  <a:latin typeface="Cambria Math" panose="02040503050406030204" pitchFamily="18" charset="0"/>
+                                  <a:cs typeface="Arial" panose="020B0604020202020204" pitchFamily="34" charset="0"/>
+                                </a:rPr>
+                                <m:t>𝑛𝑒𝑡</m:t>
+                              </m:r>
+                            </m:sup>
+                          </m:sSup>
+                          <m:r>
+                            <a:rPr lang="en-US" sz="2000" b="0" i="1" smtClean="0">
+                              <a:latin typeface="Cambria Math" panose="02040503050406030204" pitchFamily="18" charset="0"/>
+                              <a:cs typeface="Arial" panose="020B0604020202020204" pitchFamily="34" charset="0"/>
+                            </a:rPr>
+                            <m:t>(</m:t>
+                          </m:r>
+                          <m:acc>
+                            <m:accPr>
+                              <m:chr m:val="⃗"/>
+                              <m:ctrlPr>
+                                <a:rPr lang="en-US" sz="2000" b="0" i="1" smtClean="0">
+                                  <a:latin typeface="Cambria Math" charset="0"/>
+                                  <a:cs typeface="Arial" panose="020B0604020202020204" pitchFamily="34" charset="0"/>
+                                </a:rPr>
+                              </m:ctrlPr>
+                            </m:accPr>
+                            <m:e>
+                              <m:r>
+                                <a:rPr lang="en-US" sz="2000" b="0" i="1" smtClean="0">
+                                  <a:latin typeface="Cambria Math" panose="02040503050406030204" pitchFamily="18" charset="0"/>
+                                  <a:cs typeface="Arial" panose="020B0604020202020204" pitchFamily="34" charset="0"/>
+                                </a:rPr>
+                                <m:t>𝑟</m:t>
+                              </m:r>
+                            </m:e>
+                          </m:acc>
+                          <m:r>
+                            <a:rPr lang="en-US" sz="2000" b="0" i="1" smtClean="0">
+                              <a:latin typeface="Cambria Math" panose="02040503050406030204" pitchFamily="18" charset="0"/>
+                              <a:cs typeface="Arial" panose="020B0604020202020204" pitchFamily="34" charset="0"/>
+                            </a:rPr>
+                            <m:t>)</m:t>
+                          </m:r>
+                        </m:oMath>
+                      </m:oMathPara>
+                    </a14:m>
+                    <a:endParaRPr lang="en-US" sz="2000" dirty="0" smtClean="0">
+                      <a:latin typeface="Arial" panose="020B0604020202020204" pitchFamily="34" charset="0"/>
+                      <a:cs typeface="Arial" panose="020B0604020202020204" pitchFamily="34" charset="0"/>
+                    </a:endParaRPr>
+                  </a:p>
+                </p:txBody>
+              </p:sp>
+            </mc:Choice>
+            <mc:Fallback xmlns="">
+              <p:sp>
+                <p:nvSpPr>
+                  <p:cNvPr id="52" name="TextBox 51"/>
+                  <p:cNvSpPr txBox="1">
+                    <a:spLocks noRot="1" noChangeAspect="1" noMove="1" noResize="1" noEditPoints="1" noAdjustHandles="1" noChangeArrowheads="1" noChangeShapeType="1" noTextEdit="1"/>
+                  </p:cNvSpPr>
+                  <p:nvPr/>
+                </p:nvSpPr>
+                <p:spPr>
+                  <a:xfrm>
+                    <a:off x="2189829" y="4157475"/>
+                    <a:ext cx="896912" cy="345159"/>
+                  </a:xfrm>
+                  <a:prstGeom prst="rect">
+                    <a:avLst/>
+                  </a:prstGeom>
+                  <a:blipFill>
+                    <a:blip r:embed="rId41"/>
+                    <a:stretch>
+                      <a:fillRect l="-5442" t="-33333" r="-31293" b="-33333"/>
+                    </a:stretch>
+                  </a:blipFill>
+                </p:spPr>
+                <p:txBody>
+                  <a:bodyPr/>
+                  <a:lstStyle/>
+                  <a:p>
+                    <a:r>
+                      <a:rPr lang="en-US">
+                        <a:noFill/>
+                      </a:rPr>
+                      <a:t> </a:t>
+                    </a:r>
+                  </a:p>
+                </p:txBody>
+              </p:sp>
+            </mc:Fallback>
+          </mc:AlternateContent>
+          <p:sp>
+            <p:nvSpPr>
+              <p:cNvPr id="10" name="Freeform 9"/>
+              <p:cNvSpPr/>
+              <p:nvPr/>
+            </p:nvSpPr>
+            <p:spPr>
+              <a:xfrm>
+                <a:off x="1326995" y="4363194"/>
+                <a:ext cx="1847372" cy="1301626"/>
+              </a:xfrm>
+              <a:custGeom>
+                <a:avLst/>
+                <a:gdLst>
+                  <a:gd name="connsiteX0" fmla="*/ 0 w 1862254"/>
+                  <a:gd name="connsiteY0" fmla="*/ 1293542 h 1293542"/>
+                  <a:gd name="connsiteX1" fmla="*/ 412595 w 1862254"/>
+                  <a:gd name="connsiteY1" fmla="*/ 680224 h 1293542"/>
+                  <a:gd name="connsiteX2" fmla="*/ 1237785 w 1862254"/>
+                  <a:gd name="connsiteY2" fmla="*/ 802888 h 1293542"/>
+                  <a:gd name="connsiteX3" fmla="*/ 1862254 w 1862254"/>
+                  <a:gd name="connsiteY3" fmla="*/ 0 h 1293542"/>
+                  <a:gd name="connsiteX4" fmla="*/ 1862254 w 1862254"/>
+                  <a:gd name="connsiteY4" fmla="*/ 0 h 1293542"/>
+                </a:gdLst>
+                <a:ahLst/>
+                <a:cxnLst>
+                  <a:cxn ang="0">
+                    <a:pos x="connsiteX0" y="connsiteY0"/>
+                  </a:cxn>
+                  <a:cxn ang="0">
+                    <a:pos x="connsiteX1" y="connsiteY1"/>
+                  </a:cxn>
+                  <a:cxn ang="0">
+                    <a:pos x="connsiteX2" y="connsiteY2"/>
+                  </a:cxn>
+                  <a:cxn ang="0">
+                    <a:pos x="connsiteX3" y="connsiteY3"/>
+                  </a:cxn>
+                  <a:cxn ang="0">
+                    <a:pos x="connsiteX4" y="connsiteY4"/>
+                  </a:cxn>
+                </a:cxnLst>
+                <a:rect l="l" t="t" r="r" b="b"/>
+                <a:pathLst>
+                  <a:path w="1862254" h="1293542">
+                    <a:moveTo>
+                      <a:pt x="0" y="1293542"/>
+                    </a:moveTo>
+                    <a:cubicBezTo>
+                      <a:pt x="103149" y="1027771"/>
+                      <a:pt x="206298" y="762000"/>
+                      <a:pt x="412595" y="680224"/>
+                    </a:cubicBezTo>
+                    <a:cubicBezTo>
+                      <a:pt x="618892" y="598448"/>
+                      <a:pt x="996175" y="916259"/>
+                      <a:pt x="1237785" y="802888"/>
+                    </a:cubicBezTo>
+                    <a:cubicBezTo>
+                      <a:pt x="1479395" y="689517"/>
+                      <a:pt x="1862254" y="0"/>
+                      <a:pt x="1862254" y="0"/>
+                    </a:cubicBezTo>
+                    <a:lnTo>
+                      <a:pt x="1862254" y="0"/>
+                    </a:lnTo>
+                  </a:path>
+                </a:pathLst>
+              </a:custGeom>
+              <a:noFill/>
+              <a:ln w="38100">
+                <a:solidFill>
+                  <a:schemeClr val="tx1"/>
+                </a:solidFill>
+              </a:ln>
+            </p:spPr>
+            <p:style>
+              <a:lnRef idx="2">
+                <a:schemeClr val="accent1">
+                  <a:shade val="50000"/>
+                </a:schemeClr>
+              </a:lnRef>
+              <a:fillRef idx="1">
+                <a:schemeClr val="accent1"/>
+              </a:fillRef>
+              <a:effectRef idx="0">
+                <a:schemeClr val="accent1"/>
+              </a:effectRef>
+              <a:fontRef idx="minor">
+                <a:schemeClr val="lt1"/>
+              </a:fontRef>
+            </p:style>
+            <p:txBody>
+              <a:bodyPr rtlCol="0" anchor="ctr"/>
+              <a:lstStyle/>
+              <a:p>
+                <a:pPr algn="ctr"/>
+                <a:endParaRPr lang="en-US"/>
+              </a:p>
+            </p:txBody>
+          </p:sp>
+          <p:cxnSp>
+            <p:nvCxnSpPr>
+              <p:cNvPr id="12" name="Straight Arrow Connector 11"/>
+              <p:cNvCxnSpPr/>
+              <p:nvPr/>
+            </p:nvCxnSpPr>
+            <p:spPr>
+              <a:xfrm flipV="1">
+                <a:off x="2446801" y="4572238"/>
+                <a:ext cx="264820" cy="623696"/>
+              </a:xfrm>
+              <a:prstGeom prst="straightConnector1">
+                <a:avLst/>
+              </a:prstGeom>
+              <a:ln w="38100">
+                <a:solidFill>
+                  <a:schemeClr val="tx1"/>
+                </a:solidFill>
+                <a:tailEnd type="triangle"/>
+              </a:ln>
+            </p:spPr>
+            <p:style>
+              <a:lnRef idx="1">
+                <a:schemeClr val="accent1"/>
+              </a:lnRef>
+              <a:fillRef idx="0">
+                <a:schemeClr val="accent1"/>
+              </a:fillRef>
+              <a:effectRef idx="0">
+                <a:schemeClr val="accent1"/>
+              </a:effectRef>
+              <a:fontRef idx="minor">
+                <a:schemeClr val="tx1"/>
+              </a:fontRef>
+            </p:style>
+          </p:cxnSp>
+          <p:cxnSp>
+            <p:nvCxnSpPr>
+              <p:cNvPr id="14" name="Straight Arrow Connector 13"/>
+              <p:cNvCxnSpPr/>
+              <p:nvPr/>
+            </p:nvCxnSpPr>
+            <p:spPr>
+              <a:xfrm flipV="1">
+                <a:off x="2446801" y="5190073"/>
+                <a:ext cx="440121" cy="20450"/>
+              </a:xfrm>
+              <a:prstGeom prst="straightConnector1">
+                <a:avLst/>
+              </a:prstGeom>
+              <a:ln w="57150">
+                <a:solidFill>
+                  <a:srgbClr val="0070C0"/>
+                </a:solidFill>
+                <a:tailEnd type="triangle"/>
+              </a:ln>
+            </p:spPr>
+            <p:style>
+              <a:lnRef idx="1">
+                <a:schemeClr val="accent1"/>
+              </a:lnRef>
+              <a:fillRef idx="0">
+                <a:schemeClr val="accent1"/>
+              </a:fillRef>
+              <a:effectRef idx="0">
+                <a:schemeClr val="accent1"/>
+              </a:effectRef>
+              <a:fontRef idx="minor">
+                <a:schemeClr val="tx1"/>
+              </a:fontRef>
+            </p:style>
+          </p:cxnSp>
+          <p:sp>
+            <p:nvSpPr>
+              <p:cNvPr id="20" name="Right Arrow 19"/>
+              <p:cNvSpPr/>
+              <p:nvPr/>
+            </p:nvSpPr>
+            <p:spPr>
+              <a:xfrm rot="17580640">
+                <a:off x="3145967" y="4795779"/>
+                <a:ext cx="951311" cy="133815"/>
+              </a:xfrm>
+              <a:prstGeom prst="rightArrow">
+                <a:avLst/>
+              </a:prstGeom>
+              <a:solidFill>
+                <a:schemeClr val="tx1"/>
+              </a:solidFill>
+              <a:ln w="38100">
+                <a:solidFill>
+                  <a:schemeClr val="tx1"/>
+                </a:solidFill>
+              </a:ln>
+            </p:spPr>
+            <p:style>
+              <a:lnRef idx="2">
+                <a:schemeClr val="accent1">
+                  <a:shade val="50000"/>
+                </a:schemeClr>
+              </a:lnRef>
+              <a:fillRef idx="1">
+                <a:schemeClr val="accent1"/>
+              </a:fillRef>
+              <a:effectRef idx="0">
+                <a:schemeClr val="accent1"/>
+              </a:effectRef>
+              <a:fontRef idx="minor">
+                <a:schemeClr val="lt1"/>
+              </a:fontRef>
+            </p:style>
+            <p:txBody>
+              <a:bodyPr rtlCol="0" anchor="ctr"/>
+              <a:lstStyle/>
+              <a:p>
+                <a:pPr algn="ctr"/>
+                <a:endParaRPr lang="en-US"/>
+              </a:p>
+            </p:txBody>
+          </p:sp>
+          <mc:AlternateContent xmlns:mc="http://schemas.openxmlformats.org/markup-compatibility/2006" xmlns:a14="http://schemas.microsoft.com/office/drawing/2010/main">
+            <mc:Choice Requires="a14">
+              <p:sp>
+                <p:nvSpPr>
+                  <p:cNvPr id="21" name="TextBox 20"/>
+                  <p:cNvSpPr txBox="1"/>
+                  <p:nvPr/>
+                </p:nvSpPr>
+                <p:spPr>
+                  <a:xfrm>
+                    <a:off x="3269731" y="4739207"/>
+                    <a:ext cx="219483" cy="307777"/>
+                  </a:xfrm>
+                  <a:prstGeom prst="rect">
+                    <a:avLst/>
+                  </a:prstGeom>
+                  <a:noFill/>
+                </p:spPr>
+                <p:txBody>
+                  <a:bodyPr wrap="none" lIns="0" tIns="0" rIns="0" bIns="0" rtlCol="0">
+                    <a:spAutoFit/>
+                  </a:bodyPr>
+                  <a:lstStyle/>
+                  <a:p>
+                    <a:pPr/>
+                    <a14:m>
+                      <m:oMathPara xmlns:m="http://schemas.openxmlformats.org/officeDocument/2006/math">
+                        <m:oMathParaPr>
+                          <m:jc m:val="centerGroup"/>
+                        </m:oMathParaPr>
+                        <m:oMath xmlns:m="http://schemas.openxmlformats.org/officeDocument/2006/math">
+                          <m:acc>
+                            <m:accPr>
+                              <m:chr m:val="⃗"/>
+                              <m:ctrlPr>
+                                <a:rPr lang="en-US" sz="2000" b="0" i="1" smtClean="0">
+                                  <a:latin typeface="Cambria Math" charset="0"/>
+                                  <a:cs typeface="Arial" panose="020B0604020202020204" pitchFamily="34" charset="0"/>
+                                </a:rPr>
+                              </m:ctrlPr>
+                            </m:accPr>
+                            <m:e>
+                              <m:r>
+                                <a:rPr lang="en-US" sz="2000" b="0" i="1" smtClean="0">
+                                  <a:latin typeface="Cambria Math" panose="02040503050406030204" pitchFamily="18" charset="0"/>
+                                  <a:cs typeface="Arial" panose="020B0604020202020204" pitchFamily="34" charset="0"/>
+                                </a:rPr>
+                                <m:t>𝑎</m:t>
+                              </m:r>
+                            </m:e>
+                          </m:acc>
+                        </m:oMath>
+                      </m:oMathPara>
+                    </a14:m>
+                    <a:endParaRPr lang="en-US" sz="2000" dirty="0" smtClean="0">
+                      <a:latin typeface="Arial" panose="020B0604020202020204" pitchFamily="34" charset="0"/>
+                      <a:cs typeface="Arial" panose="020B0604020202020204" pitchFamily="34" charset="0"/>
+                    </a:endParaRPr>
+                  </a:p>
+                </p:txBody>
+              </p:sp>
+            </mc:Choice>
+            <mc:Fallback xmlns="">
+              <p:sp>
+                <p:nvSpPr>
+                  <p:cNvPr id="21" name="TextBox 20"/>
+                  <p:cNvSpPr txBox="1">
+                    <a:spLocks noRot="1" noChangeAspect="1" noMove="1" noResize="1" noEditPoints="1" noAdjustHandles="1" noChangeArrowheads="1" noChangeShapeType="1" noTextEdit="1"/>
+                  </p:cNvSpPr>
+                  <p:nvPr/>
+                </p:nvSpPr>
+                <p:spPr>
+                  <a:xfrm>
+                    <a:off x="3269731" y="4739207"/>
+                    <a:ext cx="219483" cy="307777"/>
+                  </a:xfrm>
+                  <a:prstGeom prst="rect">
+                    <a:avLst/>
+                  </a:prstGeom>
+                  <a:blipFill>
+                    <a:blip r:embed="rId42"/>
+                    <a:stretch>
+                      <a:fillRect l="-19444" t="-33333" r="-94444" b="-5882"/>
+                    </a:stretch>
+                  </a:blipFill>
+                </p:spPr>
+                <p:txBody>
+                  <a:bodyPr/>
+                  <a:lstStyle/>
+                  <a:p>
+                    <a:r>
+                      <a:rPr lang="en-US">
+                        <a:noFill/>
+                      </a:rPr>
+                      <a:t> </a:t>
+                    </a:r>
+                  </a:p>
+                </p:txBody>
+              </p:sp>
+            </mc:Fallback>
+          </mc:AlternateContent>
+          <mc:AlternateContent xmlns:mc="http://schemas.openxmlformats.org/markup-compatibility/2006">
+            <mc:Choice xmlns:a14="http://schemas.microsoft.com/office/drawing/2010/main" Requires="a14">
+              <p:sp>
+                <p:nvSpPr>
+                  <p:cNvPr id="22" name="TextBox 21"/>
+                  <p:cNvSpPr txBox="1"/>
+                  <p:nvPr/>
+                </p:nvSpPr>
+                <p:spPr>
+                  <a:xfrm>
+                    <a:off x="2557536" y="5298762"/>
+                    <a:ext cx="317651" cy="353302"/>
+                  </a:xfrm>
+                  <a:prstGeom prst="rect">
+                    <a:avLst/>
+                  </a:prstGeom>
+                  <a:noFill/>
+                </p:spPr>
+                <p:txBody>
+                  <a:bodyPr wrap="none" lIns="0" tIns="0" rIns="0" bIns="0" rtlCol="0">
+                    <a:spAutoFit/>
+                  </a:bodyPr>
+                  <a:lstStyle/>
+                  <a:p>
+                    <a:pPr/>
+                    <a14:m>
+                      <m:oMathPara xmlns:m="http://schemas.openxmlformats.org/officeDocument/2006/math">
+                        <m:oMathParaPr>
+                          <m:jc m:val="centerGroup"/>
+                        </m:oMathParaPr>
+                        <m:oMath xmlns:m="http://schemas.openxmlformats.org/officeDocument/2006/math">
+                          <m:r>
+                            <a:rPr lang="en-US" sz="2000" b="0" i="1" smtClean="0">
+                              <a:solidFill>
+                                <a:srgbClr val="0070C0"/>
+                              </a:solidFill>
+                              <a:latin typeface="Cambria Math" panose="02040503050406030204" pitchFamily="18" charset="0"/>
+                              <a:cs typeface="Arial" panose="020B0604020202020204" pitchFamily="34" charset="0"/>
+                            </a:rPr>
+                            <m:t>𝑑</m:t>
+                          </m:r>
+                          <m:acc>
+                            <m:accPr>
+                              <m:chr m:val="⃗"/>
+                              <m:ctrlPr>
+                                <a:rPr lang="en-US" sz="2000" b="0" i="1" smtClean="0">
+                                  <a:solidFill>
+                                    <a:srgbClr val="0070C0"/>
+                                  </a:solidFill>
+                                  <a:latin typeface="Cambria Math" charset="0"/>
+                                  <a:cs typeface="Arial" panose="020B0604020202020204" pitchFamily="34" charset="0"/>
+                                </a:rPr>
+                              </m:ctrlPr>
+                            </m:accPr>
+                            <m:e>
+                              <m:r>
+                                <a:rPr lang="en-US" sz="2000" b="0" i="1" smtClean="0">
+                                  <a:solidFill>
+                                    <a:srgbClr val="0070C0"/>
+                                  </a:solidFill>
+                                  <a:latin typeface="Cambria Math" panose="02040503050406030204" pitchFamily="18" charset="0"/>
+                                  <a:cs typeface="Arial" panose="020B0604020202020204" pitchFamily="34" charset="0"/>
+                                </a:rPr>
+                                <m:t>𝑙</m:t>
+                              </m:r>
+                            </m:e>
+                          </m:acc>
+                        </m:oMath>
+                      </m:oMathPara>
+                    </a14:m>
+                    <a:endParaRPr lang="en-US" sz="2000" dirty="0" smtClean="0">
+                      <a:solidFill>
+                        <a:srgbClr val="0070C0"/>
+                      </a:solidFill>
+                      <a:latin typeface="Arial" panose="020B0604020202020204" pitchFamily="34" charset="0"/>
+                      <a:cs typeface="Arial" panose="020B0604020202020204" pitchFamily="34" charset="0"/>
+                    </a:endParaRPr>
+                  </a:p>
+                </p:txBody>
+              </p:sp>
+            </mc:Choice>
+            <mc:Fallback>
+              <p:sp>
+                <p:nvSpPr>
+                  <p:cNvPr id="22" name="TextBox 21"/>
+                  <p:cNvSpPr txBox="1">
+                    <a:spLocks noRot="1" noChangeAspect="1" noMove="1" noResize="1" noEditPoints="1" noAdjustHandles="1" noChangeArrowheads="1" noChangeShapeType="1" noTextEdit="1"/>
+                  </p:cNvSpPr>
+                  <p:nvPr/>
+                </p:nvSpPr>
+                <p:spPr>
+                  <a:xfrm>
+                    <a:off x="2557536" y="5298762"/>
+                    <a:ext cx="317651" cy="353302"/>
+                  </a:xfrm>
+                  <a:prstGeom prst="rect">
+                    <a:avLst/>
+                  </a:prstGeom>
+                  <a:blipFill rotWithShape="0">
+                    <a:blip r:embed="rId43"/>
+                    <a:stretch>
+                      <a:fillRect l="-19231" t="-32759" r="-103846" b="-12069"/>
+                    </a:stretch>
+                  </a:blipFill>
+                </p:spPr>
+                <p:txBody>
+                  <a:bodyPr/>
+                  <a:lstStyle/>
+                  <a:p>
+                    <a:r>
+                      <a:rPr lang="en-US">
+                        <a:noFill/>
+                      </a:rPr>
+                      <a:t> </a:t>
+                    </a:r>
+                  </a:p>
+                </p:txBody>
+              </p:sp>
+            </mc:Fallback>
+          </mc:AlternateContent>
         </p:grpSp>
         <p:sp>
           <p:nvSpPr>
-            <p:cNvPr id="42" name="Oval 41"/>
+            <p:cNvPr id="71" name="Oval 70"/>
             <p:cNvSpPr/>
             <p:nvPr/>
           </p:nvSpPr>
           <p:spPr>
-            <a:xfrm>
-              <a:off x="1224682" y="5655603"/>
-              <a:ext cx="120943" cy="119766"/>
+            <a:xfrm flipH="1">
+              <a:off x="2403478" y="5157044"/>
+              <a:ext cx="72000" cy="72000"/>
             </a:xfrm>
             <a:prstGeom prst="ellipse">
               <a:avLst/>
             </a:prstGeom>
             <a:solidFill>
-              <a:schemeClr val="tx1"/>
+              <a:srgbClr val="0070C0"/>
             </a:solidFill>
             <a:ln w="38100">
               <a:solidFill>
-                <a:schemeClr val="tx1"/>
+                <a:srgbClr val="0070C0"/>
               </a:solidFill>
             </a:ln>
           </p:spPr>
@@ -19577,829 +21437,6 @@
             </a:p>
           </p:txBody>
         </p:sp>
-        <p:sp>
-          <p:nvSpPr>
-            <p:cNvPr id="44" name="Oval 43"/>
-            <p:cNvSpPr/>
-            <p:nvPr/>
-          </p:nvSpPr>
-          <p:spPr>
-            <a:xfrm>
-              <a:off x="3105847" y="4278957"/>
-              <a:ext cx="120943" cy="119766"/>
-            </a:xfrm>
-            <a:prstGeom prst="ellipse">
-              <a:avLst/>
-            </a:prstGeom>
-            <a:solidFill>
-              <a:schemeClr val="tx1"/>
-            </a:solidFill>
-            <a:ln w="38100">
-              <a:solidFill>
-                <a:schemeClr val="tx1"/>
-              </a:solidFill>
-            </a:ln>
-          </p:spPr>
-          <p:style>
-            <a:lnRef idx="2">
-              <a:schemeClr val="accent1">
-                <a:shade val="50000"/>
-              </a:schemeClr>
-            </a:lnRef>
-            <a:fillRef idx="1">
-              <a:schemeClr val="accent1"/>
-            </a:fillRef>
-            <a:effectRef idx="0">
-              <a:schemeClr val="accent1"/>
-            </a:effectRef>
-            <a:fontRef idx="minor">
-              <a:schemeClr val="lt1"/>
-            </a:fontRef>
-          </p:style>
-          <p:txBody>
-            <a:bodyPr rtlCol="0" anchor="ctr"/>
-            <a:lstStyle/>
-            <a:p>
-              <a:pPr algn="ctr"/>
-              <a:endParaRPr lang="en-US"/>
-            </a:p>
-          </p:txBody>
-        </p:sp>
-        <mc:AlternateContent xmlns:mc="http://schemas.openxmlformats.org/markup-compatibility/2006" xmlns:a14="http://schemas.microsoft.com/office/drawing/2010/main">
-          <mc:Choice Requires="a14">
-            <p:sp>
-              <p:nvSpPr>
-                <p:cNvPr id="46" name="TextBox 45"/>
-                <p:cNvSpPr txBox="1"/>
-                <p:nvPr/>
-              </p:nvSpPr>
-              <p:spPr>
-                <a:xfrm>
-                  <a:off x="1345506" y="5762027"/>
-                  <a:ext cx="234936" cy="307777"/>
-                </a:xfrm>
-                <a:prstGeom prst="rect">
-                  <a:avLst/>
-                </a:prstGeom>
-                <a:noFill/>
-              </p:spPr>
-              <p:txBody>
-                <a:bodyPr wrap="none" lIns="0" tIns="0" rIns="0" bIns="0" rtlCol="0">
-                  <a:spAutoFit/>
-                </a:bodyPr>
-                <a:lstStyle/>
-                <a:p>
-                  <a:pPr/>
-                  <a14:m>
-                    <m:oMathPara xmlns:m="http://schemas.openxmlformats.org/officeDocument/2006/math">
-                      <m:oMathParaPr>
-                        <m:jc m:val="centerGroup"/>
-                      </m:oMathParaPr>
-                      <m:oMath xmlns:m="http://schemas.openxmlformats.org/officeDocument/2006/math">
-                        <m:r>
-                          <a:rPr lang="en-US" sz="2000" b="0" i="1" smtClean="0">
-                            <a:latin typeface="Cambria Math" panose="02040503050406030204" pitchFamily="18" charset="0"/>
-                            <a:cs typeface="Arial" panose="020B0604020202020204" pitchFamily="34" charset="0"/>
-                          </a:rPr>
-                          <m:t>𝐴</m:t>
-                        </m:r>
-                      </m:oMath>
-                    </m:oMathPara>
-                  </a14:m>
-                  <a:endParaRPr lang="en-US" sz="2000" dirty="0" smtClean="0">
-                    <a:latin typeface="Arial" panose="020B0604020202020204" pitchFamily="34" charset="0"/>
-                    <a:cs typeface="Arial" panose="020B0604020202020204" pitchFamily="34" charset="0"/>
-                  </a:endParaRPr>
-                </a:p>
-              </p:txBody>
-            </p:sp>
-          </mc:Choice>
-          <mc:Fallback xmlns="">
-            <p:sp>
-              <p:nvSpPr>
-                <p:cNvPr id="46" name="TextBox 45"/>
-                <p:cNvSpPr txBox="1">
-                  <a:spLocks noRot="1" noChangeAspect="1" noMove="1" noResize="1" noEditPoints="1" noAdjustHandles="1" noChangeArrowheads="1" noChangeShapeType="1" noTextEdit="1"/>
-                </p:cNvSpPr>
-                <p:nvPr/>
-              </p:nvSpPr>
-              <p:spPr>
-                <a:xfrm>
-                  <a:off x="1345506" y="5762027"/>
-                  <a:ext cx="234936" cy="307777"/>
-                </a:xfrm>
-                <a:prstGeom prst="rect">
-                  <a:avLst/>
-                </a:prstGeom>
-                <a:blipFill>
-                  <a:blip r:embed="rId39"/>
-                  <a:stretch>
-                    <a:fillRect l="-23684" r="-23684" b="-9804"/>
-                  </a:stretch>
-                </a:blipFill>
-              </p:spPr>
-              <p:txBody>
-                <a:bodyPr/>
-                <a:lstStyle/>
-                <a:p>
-                  <a:r>
-                    <a:rPr lang="en-US">
-                      <a:noFill/>
-                    </a:rPr>
-                    <a:t> </a:t>
-                  </a:r>
-                </a:p>
-              </p:txBody>
-            </p:sp>
-          </mc:Fallback>
-        </mc:AlternateContent>
-        <mc:AlternateContent xmlns:mc="http://schemas.openxmlformats.org/markup-compatibility/2006" xmlns:a14="http://schemas.microsoft.com/office/drawing/2010/main">
-          <mc:Choice Requires="a14">
-            <p:sp>
-              <p:nvSpPr>
-                <p:cNvPr id="47" name="TextBox 46"/>
-                <p:cNvSpPr txBox="1"/>
-                <p:nvPr/>
-              </p:nvSpPr>
-              <p:spPr>
-                <a:xfrm>
-                  <a:off x="3226790" y="3935497"/>
-                  <a:ext cx="245708" cy="307777"/>
-                </a:xfrm>
-                <a:prstGeom prst="rect">
-                  <a:avLst/>
-                </a:prstGeom>
-                <a:noFill/>
-              </p:spPr>
-              <p:txBody>
-                <a:bodyPr wrap="none" lIns="0" tIns="0" rIns="0" bIns="0" rtlCol="0">
-                  <a:spAutoFit/>
-                </a:bodyPr>
-                <a:lstStyle/>
-                <a:p>
-                  <a:pPr/>
-                  <a14:m>
-                    <m:oMathPara xmlns:m="http://schemas.openxmlformats.org/officeDocument/2006/math">
-                      <m:oMathParaPr>
-                        <m:jc m:val="centerGroup"/>
-                      </m:oMathParaPr>
-                      <m:oMath xmlns:m="http://schemas.openxmlformats.org/officeDocument/2006/math">
-                        <m:r>
-                          <a:rPr lang="en-US" sz="2000" b="0" i="1" smtClean="0">
-                            <a:latin typeface="Cambria Math" panose="02040503050406030204" pitchFamily="18" charset="0"/>
-                            <a:cs typeface="Arial" panose="020B0604020202020204" pitchFamily="34" charset="0"/>
-                          </a:rPr>
-                          <m:t>𝐵</m:t>
-                        </m:r>
-                      </m:oMath>
-                    </m:oMathPara>
-                  </a14:m>
-                  <a:endParaRPr lang="en-US" sz="2000" dirty="0" smtClean="0">
-                    <a:latin typeface="Arial" panose="020B0604020202020204" pitchFamily="34" charset="0"/>
-                    <a:cs typeface="Arial" panose="020B0604020202020204" pitchFamily="34" charset="0"/>
-                  </a:endParaRPr>
-                </a:p>
-              </p:txBody>
-            </p:sp>
-          </mc:Choice>
-          <mc:Fallback xmlns="">
-            <p:sp>
-              <p:nvSpPr>
-                <p:cNvPr id="47" name="TextBox 46"/>
-                <p:cNvSpPr txBox="1">
-                  <a:spLocks noRot="1" noChangeAspect="1" noMove="1" noResize="1" noEditPoints="1" noAdjustHandles="1" noChangeArrowheads="1" noChangeShapeType="1" noTextEdit="1"/>
-                </p:cNvSpPr>
-                <p:nvPr/>
-              </p:nvSpPr>
-              <p:spPr>
-                <a:xfrm>
-                  <a:off x="3226790" y="3935497"/>
-                  <a:ext cx="245708" cy="307777"/>
-                </a:xfrm>
-                <a:prstGeom prst="rect">
-                  <a:avLst/>
-                </a:prstGeom>
-                <a:blipFill>
-                  <a:blip r:embed="rId40"/>
-                  <a:stretch>
-                    <a:fillRect l="-19512" r="-19512" b="-10000"/>
-                  </a:stretch>
-                </a:blipFill>
-              </p:spPr>
-              <p:txBody>
-                <a:bodyPr/>
-                <a:lstStyle/>
-                <a:p>
-                  <a:r>
-                    <a:rPr lang="en-US">
-                      <a:noFill/>
-                    </a:rPr>
-                    <a:t> </a:t>
-                  </a:r>
-                </a:p>
-              </p:txBody>
-            </p:sp>
-          </mc:Fallback>
-        </mc:AlternateContent>
-        <mc:AlternateContent xmlns:mc="http://schemas.openxmlformats.org/markup-compatibility/2006" xmlns:a14="http://schemas.microsoft.com/office/drawing/2010/main">
-          <mc:Choice Requires="a14">
-            <p:sp>
-              <p:nvSpPr>
-                <p:cNvPr id="52" name="TextBox 51"/>
-                <p:cNvSpPr txBox="1"/>
-                <p:nvPr/>
-              </p:nvSpPr>
-              <p:spPr>
-                <a:xfrm>
-                  <a:off x="2189829" y="4157475"/>
-                  <a:ext cx="896912" cy="345159"/>
-                </a:xfrm>
-                <a:prstGeom prst="rect">
-                  <a:avLst/>
-                </a:prstGeom>
-                <a:noFill/>
-              </p:spPr>
-              <p:txBody>
-                <a:bodyPr wrap="none" lIns="0" tIns="0" rIns="0" bIns="0" rtlCol="0">
-                  <a:spAutoFit/>
-                </a:bodyPr>
-                <a:lstStyle/>
-                <a:p>
-                  <a:pPr/>
-                  <a14:m>
-                    <m:oMathPara xmlns:m="http://schemas.openxmlformats.org/officeDocument/2006/math">
-                      <m:oMathParaPr>
-                        <m:jc m:val="centerGroup"/>
-                      </m:oMathParaPr>
-                      <m:oMath xmlns:m="http://schemas.openxmlformats.org/officeDocument/2006/math">
-                        <m:sSup>
-                          <m:sSupPr>
-                            <m:ctrlPr>
-                              <a:rPr lang="en-US" sz="2000" b="0" i="1" smtClean="0">
-                                <a:latin typeface="Cambria Math" panose="02040503050406030204" pitchFamily="18" charset="0"/>
-                                <a:cs typeface="Arial" panose="020B0604020202020204" pitchFamily="34" charset="0"/>
-                              </a:rPr>
-                            </m:ctrlPr>
-                          </m:sSupPr>
-                          <m:e>
-                            <m:acc>
-                              <m:accPr>
-                                <m:chr m:val="⃗"/>
-                                <m:ctrlPr>
-                                  <a:rPr lang="en-US" sz="2000" b="0" i="1" smtClean="0">
-                                    <a:latin typeface="Cambria Math" panose="02040503050406030204" pitchFamily="18" charset="0"/>
-                                    <a:cs typeface="Arial" panose="020B0604020202020204" pitchFamily="34" charset="0"/>
-                                  </a:rPr>
-                                </m:ctrlPr>
-                              </m:accPr>
-                              <m:e>
-                                <m:r>
-                                  <a:rPr lang="en-US" sz="2000" b="0" i="1" smtClean="0">
-                                    <a:latin typeface="Cambria Math" panose="02040503050406030204" pitchFamily="18" charset="0"/>
-                                    <a:cs typeface="Arial" panose="020B0604020202020204" pitchFamily="34" charset="0"/>
-                                  </a:rPr>
-                                  <m:t>𝐹</m:t>
-                                </m:r>
-                              </m:e>
-                            </m:acc>
-                          </m:e>
-                          <m:sup>
-                            <m:r>
-                              <a:rPr lang="en-US" sz="2000" b="0" i="1" smtClean="0">
-                                <a:latin typeface="Cambria Math" panose="02040503050406030204" pitchFamily="18" charset="0"/>
-                                <a:cs typeface="Arial" panose="020B0604020202020204" pitchFamily="34" charset="0"/>
-                              </a:rPr>
-                              <m:t>𝑛𝑒𝑡</m:t>
-                            </m:r>
-                          </m:sup>
-                        </m:sSup>
-                        <m:r>
-                          <a:rPr lang="en-US" sz="2000" b="0" i="1" smtClean="0">
-                            <a:latin typeface="Cambria Math" panose="02040503050406030204" pitchFamily="18" charset="0"/>
-                            <a:cs typeface="Arial" panose="020B0604020202020204" pitchFamily="34" charset="0"/>
-                          </a:rPr>
-                          <m:t>(</m:t>
-                        </m:r>
-                        <m:acc>
-                          <m:accPr>
-                            <m:chr m:val="⃗"/>
-                            <m:ctrlPr>
-                              <a:rPr lang="en-US" sz="2000" b="0" i="1" smtClean="0">
-                                <a:latin typeface="Cambria Math" panose="02040503050406030204" pitchFamily="18" charset="0"/>
-                                <a:cs typeface="Arial" panose="020B0604020202020204" pitchFamily="34" charset="0"/>
-                              </a:rPr>
-                            </m:ctrlPr>
-                          </m:accPr>
-                          <m:e>
-                            <m:r>
-                              <a:rPr lang="en-US" sz="2000" b="0" i="1" smtClean="0">
-                                <a:latin typeface="Cambria Math" panose="02040503050406030204" pitchFamily="18" charset="0"/>
-                                <a:cs typeface="Arial" panose="020B0604020202020204" pitchFamily="34" charset="0"/>
-                              </a:rPr>
-                              <m:t>𝑟</m:t>
-                            </m:r>
-                          </m:e>
-                        </m:acc>
-                        <m:r>
-                          <a:rPr lang="en-US" sz="2000" b="0" i="1" smtClean="0">
-                            <a:latin typeface="Cambria Math" panose="02040503050406030204" pitchFamily="18" charset="0"/>
-                            <a:cs typeface="Arial" panose="020B0604020202020204" pitchFamily="34" charset="0"/>
-                          </a:rPr>
-                          <m:t>)</m:t>
-                        </m:r>
-                      </m:oMath>
-                    </m:oMathPara>
-                  </a14:m>
-                  <a:endParaRPr lang="en-US" sz="2000" dirty="0" smtClean="0">
-                    <a:latin typeface="Arial" panose="020B0604020202020204" pitchFamily="34" charset="0"/>
-                    <a:cs typeface="Arial" panose="020B0604020202020204" pitchFamily="34" charset="0"/>
-                  </a:endParaRPr>
-                </a:p>
-              </p:txBody>
-            </p:sp>
-          </mc:Choice>
-          <mc:Fallback xmlns="">
-            <p:sp>
-              <p:nvSpPr>
-                <p:cNvPr id="52" name="TextBox 51"/>
-                <p:cNvSpPr txBox="1">
-                  <a:spLocks noRot="1" noChangeAspect="1" noMove="1" noResize="1" noEditPoints="1" noAdjustHandles="1" noChangeArrowheads="1" noChangeShapeType="1" noTextEdit="1"/>
-                </p:cNvSpPr>
-                <p:nvPr/>
-              </p:nvSpPr>
-              <p:spPr>
-                <a:xfrm>
-                  <a:off x="2189829" y="4157475"/>
-                  <a:ext cx="896912" cy="345159"/>
-                </a:xfrm>
-                <a:prstGeom prst="rect">
-                  <a:avLst/>
-                </a:prstGeom>
-                <a:blipFill>
-                  <a:blip r:embed="rId41"/>
-                  <a:stretch>
-                    <a:fillRect l="-5442" t="-33333" r="-31293" b="-33333"/>
-                  </a:stretch>
-                </a:blipFill>
-              </p:spPr>
-              <p:txBody>
-                <a:bodyPr/>
-                <a:lstStyle/>
-                <a:p>
-                  <a:r>
-                    <a:rPr lang="en-US">
-                      <a:noFill/>
-                    </a:rPr>
-                    <a:t> </a:t>
-                  </a:r>
-                </a:p>
-              </p:txBody>
-            </p:sp>
-          </mc:Fallback>
-        </mc:AlternateContent>
-        <p:sp>
-          <p:nvSpPr>
-            <p:cNvPr id="10" name="Freeform 9"/>
-            <p:cNvSpPr/>
-            <p:nvPr/>
-          </p:nvSpPr>
-          <p:spPr>
-            <a:xfrm>
-              <a:off x="1326995" y="4363194"/>
-              <a:ext cx="1847372" cy="1301626"/>
-            </a:xfrm>
-            <a:custGeom>
-              <a:avLst/>
-              <a:gdLst>
-                <a:gd name="connsiteX0" fmla="*/ 0 w 1862254"/>
-                <a:gd name="connsiteY0" fmla="*/ 1293542 h 1293542"/>
-                <a:gd name="connsiteX1" fmla="*/ 412595 w 1862254"/>
-                <a:gd name="connsiteY1" fmla="*/ 680224 h 1293542"/>
-                <a:gd name="connsiteX2" fmla="*/ 1237785 w 1862254"/>
-                <a:gd name="connsiteY2" fmla="*/ 802888 h 1293542"/>
-                <a:gd name="connsiteX3" fmla="*/ 1862254 w 1862254"/>
-                <a:gd name="connsiteY3" fmla="*/ 0 h 1293542"/>
-                <a:gd name="connsiteX4" fmla="*/ 1862254 w 1862254"/>
-                <a:gd name="connsiteY4" fmla="*/ 0 h 1293542"/>
-              </a:gdLst>
-              <a:ahLst/>
-              <a:cxnLst>
-                <a:cxn ang="0">
-                  <a:pos x="connsiteX0" y="connsiteY0"/>
-                </a:cxn>
-                <a:cxn ang="0">
-                  <a:pos x="connsiteX1" y="connsiteY1"/>
-                </a:cxn>
-                <a:cxn ang="0">
-                  <a:pos x="connsiteX2" y="connsiteY2"/>
-                </a:cxn>
-                <a:cxn ang="0">
-                  <a:pos x="connsiteX3" y="connsiteY3"/>
-                </a:cxn>
-                <a:cxn ang="0">
-                  <a:pos x="connsiteX4" y="connsiteY4"/>
-                </a:cxn>
-              </a:cxnLst>
-              <a:rect l="l" t="t" r="r" b="b"/>
-              <a:pathLst>
-                <a:path w="1862254" h="1293542">
-                  <a:moveTo>
-                    <a:pt x="0" y="1293542"/>
-                  </a:moveTo>
-                  <a:cubicBezTo>
-                    <a:pt x="103149" y="1027771"/>
-                    <a:pt x="206298" y="762000"/>
-                    <a:pt x="412595" y="680224"/>
-                  </a:cubicBezTo>
-                  <a:cubicBezTo>
-                    <a:pt x="618892" y="598448"/>
-                    <a:pt x="996175" y="916259"/>
-                    <a:pt x="1237785" y="802888"/>
-                  </a:cubicBezTo>
-                  <a:cubicBezTo>
-                    <a:pt x="1479395" y="689517"/>
-                    <a:pt x="1862254" y="0"/>
-                    <a:pt x="1862254" y="0"/>
-                  </a:cubicBezTo>
-                  <a:lnTo>
-                    <a:pt x="1862254" y="0"/>
-                  </a:lnTo>
-                </a:path>
-              </a:pathLst>
-            </a:custGeom>
-            <a:noFill/>
-            <a:ln w="38100">
-              <a:solidFill>
-                <a:schemeClr val="tx1"/>
-              </a:solidFill>
-            </a:ln>
-          </p:spPr>
-          <p:style>
-            <a:lnRef idx="2">
-              <a:schemeClr val="accent1">
-                <a:shade val="50000"/>
-              </a:schemeClr>
-            </a:lnRef>
-            <a:fillRef idx="1">
-              <a:schemeClr val="accent1"/>
-            </a:fillRef>
-            <a:effectRef idx="0">
-              <a:schemeClr val="accent1"/>
-            </a:effectRef>
-            <a:fontRef idx="minor">
-              <a:schemeClr val="lt1"/>
-            </a:fontRef>
-          </p:style>
-          <p:txBody>
-            <a:bodyPr rtlCol="0" anchor="ctr"/>
-            <a:lstStyle/>
-            <a:p>
-              <a:pPr algn="ctr"/>
-              <a:endParaRPr lang="en-US"/>
-            </a:p>
-          </p:txBody>
-        </p:sp>
-        <p:cxnSp>
-          <p:nvCxnSpPr>
-            <p:cNvPr id="12" name="Straight Arrow Connector 11"/>
-            <p:cNvCxnSpPr/>
-            <p:nvPr/>
-          </p:nvCxnSpPr>
-          <p:spPr>
-            <a:xfrm flipV="1">
-              <a:off x="2446801" y="4572238"/>
-              <a:ext cx="264820" cy="623696"/>
-            </a:xfrm>
-            <a:prstGeom prst="straightConnector1">
-              <a:avLst/>
-            </a:prstGeom>
-            <a:ln w="38100">
-              <a:solidFill>
-                <a:schemeClr val="tx1"/>
-              </a:solidFill>
-              <a:tailEnd type="triangle"/>
-            </a:ln>
-          </p:spPr>
-          <p:style>
-            <a:lnRef idx="1">
-              <a:schemeClr val="accent1"/>
-            </a:lnRef>
-            <a:fillRef idx="0">
-              <a:schemeClr val="accent1"/>
-            </a:fillRef>
-            <a:effectRef idx="0">
-              <a:schemeClr val="accent1"/>
-            </a:effectRef>
-            <a:fontRef idx="minor">
-              <a:schemeClr val="tx1"/>
-            </a:fontRef>
-          </p:style>
-        </p:cxnSp>
-        <p:cxnSp>
-          <p:nvCxnSpPr>
-            <p:cNvPr id="14" name="Straight Arrow Connector 13"/>
-            <p:cNvCxnSpPr/>
-            <p:nvPr/>
-          </p:nvCxnSpPr>
-          <p:spPr>
-            <a:xfrm flipV="1">
-              <a:off x="2446801" y="5190073"/>
-              <a:ext cx="440121" cy="20450"/>
-            </a:xfrm>
-            <a:prstGeom prst="straightConnector1">
-              <a:avLst/>
-            </a:prstGeom>
-            <a:ln w="57150">
-              <a:solidFill>
-                <a:srgbClr val="FF0000"/>
-              </a:solidFill>
-              <a:tailEnd type="triangle"/>
-            </a:ln>
-          </p:spPr>
-          <p:style>
-            <a:lnRef idx="1">
-              <a:schemeClr val="accent1"/>
-            </a:lnRef>
-            <a:fillRef idx="0">
-              <a:schemeClr val="accent1"/>
-            </a:fillRef>
-            <a:effectRef idx="0">
-              <a:schemeClr val="accent1"/>
-            </a:effectRef>
-            <a:fontRef idx="minor">
-              <a:schemeClr val="tx1"/>
-            </a:fontRef>
-          </p:style>
-        </p:cxnSp>
-        <p:sp>
-          <p:nvSpPr>
-            <p:cNvPr id="20" name="Right Arrow 19"/>
-            <p:cNvSpPr/>
-            <p:nvPr/>
-          </p:nvSpPr>
-          <p:spPr>
-            <a:xfrm rot="17580640">
-              <a:off x="3145967" y="4795779"/>
-              <a:ext cx="951311" cy="133815"/>
-            </a:xfrm>
-            <a:prstGeom prst="rightArrow">
-              <a:avLst/>
-            </a:prstGeom>
-            <a:solidFill>
-              <a:schemeClr val="tx1"/>
-            </a:solidFill>
-            <a:ln w="38100">
-              <a:solidFill>
-                <a:schemeClr val="tx1"/>
-              </a:solidFill>
-            </a:ln>
-          </p:spPr>
-          <p:style>
-            <a:lnRef idx="2">
-              <a:schemeClr val="accent1">
-                <a:shade val="50000"/>
-              </a:schemeClr>
-            </a:lnRef>
-            <a:fillRef idx="1">
-              <a:schemeClr val="accent1"/>
-            </a:fillRef>
-            <a:effectRef idx="0">
-              <a:schemeClr val="accent1"/>
-            </a:effectRef>
-            <a:fontRef idx="minor">
-              <a:schemeClr val="lt1"/>
-            </a:fontRef>
-          </p:style>
-          <p:txBody>
-            <a:bodyPr rtlCol="0" anchor="ctr"/>
-            <a:lstStyle/>
-            <a:p>
-              <a:pPr algn="ctr"/>
-              <a:endParaRPr lang="en-US"/>
-            </a:p>
-          </p:txBody>
-        </p:sp>
-        <mc:AlternateContent xmlns:mc="http://schemas.openxmlformats.org/markup-compatibility/2006" xmlns:a14="http://schemas.microsoft.com/office/drawing/2010/main">
-          <mc:Choice Requires="a14">
-            <p:sp>
-              <p:nvSpPr>
-                <p:cNvPr id="21" name="TextBox 20"/>
-                <p:cNvSpPr txBox="1"/>
-                <p:nvPr/>
-              </p:nvSpPr>
-              <p:spPr>
-                <a:xfrm>
-                  <a:off x="3269731" y="4739207"/>
-                  <a:ext cx="219483" cy="307777"/>
-                </a:xfrm>
-                <a:prstGeom prst="rect">
-                  <a:avLst/>
-                </a:prstGeom>
-                <a:noFill/>
-              </p:spPr>
-              <p:txBody>
-                <a:bodyPr wrap="none" lIns="0" tIns="0" rIns="0" bIns="0" rtlCol="0">
-                  <a:spAutoFit/>
-                </a:bodyPr>
-                <a:lstStyle/>
-                <a:p>
-                  <a:pPr/>
-                  <a14:m>
-                    <m:oMathPara xmlns:m="http://schemas.openxmlformats.org/officeDocument/2006/math">
-                      <m:oMathParaPr>
-                        <m:jc m:val="centerGroup"/>
-                      </m:oMathParaPr>
-                      <m:oMath xmlns:m="http://schemas.openxmlformats.org/officeDocument/2006/math">
-                        <m:acc>
-                          <m:accPr>
-                            <m:chr m:val="⃗"/>
-                            <m:ctrlPr>
-                              <a:rPr lang="en-US" sz="2000" b="0" i="1" smtClean="0">
-                                <a:latin typeface="Cambria Math" panose="02040503050406030204" pitchFamily="18" charset="0"/>
-                                <a:cs typeface="Arial" panose="020B0604020202020204" pitchFamily="34" charset="0"/>
-                              </a:rPr>
-                            </m:ctrlPr>
-                          </m:accPr>
-                          <m:e>
-                            <m:r>
-                              <a:rPr lang="en-US" sz="2000" b="0" i="1" smtClean="0">
-                                <a:latin typeface="Cambria Math" panose="02040503050406030204" pitchFamily="18" charset="0"/>
-                                <a:cs typeface="Arial" panose="020B0604020202020204" pitchFamily="34" charset="0"/>
-                              </a:rPr>
-                              <m:t>𝑎</m:t>
-                            </m:r>
-                          </m:e>
-                        </m:acc>
-                      </m:oMath>
-                    </m:oMathPara>
-                  </a14:m>
-                  <a:endParaRPr lang="en-US" sz="2000" dirty="0" smtClean="0">
-                    <a:latin typeface="Arial" panose="020B0604020202020204" pitchFamily="34" charset="0"/>
-                    <a:cs typeface="Arial" panose="020B0604020202020204" pitchFamily="34" charset="0"/>
-                  </a:endParaRPr>
-                </a:p>
-              </p:txBody>
-            </p:sp>
-          </mc:Choice>
-          <mc:Fallback xmlns="">
-            <p:sp>
-              <p:nvSpPr>
-                <p:cNvPr id="21" name="TextBox 20"/>
-                <p:cNvSpPr txBox="1">
-                  <a:spLocks noRot="1" noChangeAspect="1" noMove="1" noResize="1" noEditPoints="1" noAdjustHandles="1" noChangeArrowheads="1" noChangeShapeType="1" noTextEdit="1"/>
-                </p:cNvSpPr>
-                <p:nvPr/>
-              </p:nvSpPr>
-              <p:spPr>
-                <a:xfrm>
-                  <a:off x="3269731" y="4739207"/>
-                  <a:ext cx="219483" cy="307777"/>
-                </a:xfrm>
-                <a:prstGeom prst="rect">
-                  <a:avLst/>
-                </a:prstGeom>
-                <a:blipFill>
-                  <a:blip r:embed="rId42"/>
-                  <a:stretch>
-                    <a:fillRect l="-19444" t="-33333" r="-94444" b="-5882"/>
-                  </a:stretch>
-                </a:blipFill>
-              </p:spPr>
-              <p:txBody>
-                <a:bodyPr/>
-                <a:lstStyle/>
-                <a:p>
-                  <a:r>
-                    <a:rPr lang="en-US">
-                      <a:noFill/>
-                    </a:rPr>
-                    <a:t> </a:t>
-                  </a:r>
-                </a:p>
-              </p:txBody>
-            </p:sp>
-          </mc:Fallback>
-        </mc:AlternateContent>
-        <mc:AlternateContent xmlns:mc="http://schemas.openxmlformats.org/markup-compatibility/2006">
-          <mc:Choice xmlns:a14="http://schemas.microsoft.com/office/drawing/2010/main" Requires="a14">
-            <p:sp>
-              <p:nvSpPr>
-                <p:cNvPr id="22" name="TextBox 21"/>
-                <p:cNvSpPr txBox="1"/>
-                <p:nvPr/>
-              </p:nvSpPr>
-              <p:spPr>
-                <a:xfrm>
-                  <a:off x="2557536" y="5298762"/>
-                  <a:ext cx="317651" cy="353302"/>
-                </a:xfrm>
-                <a:prstGeom prst="rect">
-                  <a:avLst/>
-                </a:prstGeom>
-                <a:noFill/>
-              </p:spPr>
-              <p:txBody>
-                <a:bodyPr wrap="none" lIns="0" tIns="0" rIns="0" bIns="0" rtlCol="0">
-                  <a:spAutoFit/>
-                </a:bodyPr>
-                <a:lstStyle/>
-                <a:p>
-                  <a:pPr/>
-                  <a14:m>
-                    <m:oMathPara xmlns:m="http://schemas.openxmlformats.org/officeDocument/2006/math">
-                      <m:oMathParaPr>
-                        <m:jc m:val="centerGroup"/>
-                      </m:oMathParaPr>
-                      <m:oMath xmlns:m="http://schemas.openxmlformats.org/officeDocument/2006/math">
-                        <m:r>
-                          <a:rPr lang="en-US" sz="2000" b="0" i="1" smtClean="0">
-                            <a:solidFill>
-                              <a:srgbClr val="FF0000"/>
-                            </a:solidFill>
-                            <a:latin typeface="Cambria Math" panose="02040503050406030204" pitchFamily="18" charset="0"/>
-                            <a:cs typeface="Arial" panose="020B0604020202020204" pitchFamily="34" charset="0"/>
-                          </a:rPr>
-                          <m:t>𝑑</m:t>
-                        </m:r>
-                        <m:acc>
-                          <m:accPr>
-                            <m:chr m:val="⃗"/>
-                            <m:ctrlPr>
-                              <a:rPr lang="en-US" sz="2000" b="0" i="1" smtClean="0">
-                                <a:solidFill>
-                                  <a:srgbClr val="FF0000"/>
-                                </a:solidFill>
-                                <a:latin typeface="Cambria Math" panose="02040503050406030204" pitchFamily="18" charset="0"/>
-                                <a:cs typeface="Arial" panose="020B0604020202020204" pitchFamily="34" charset="0"/>
-                              </a:rPr>
-                            </m:ctrlPr>
-                          </m:accPr>
-                          <m:e>
-                            <m:r>
-                              <a:rPr lang="en-US" sz="2000" b="0" i="1" smtClean="0">
-                                <a:solidFill>
-                                  <a:srgbClr val="FF0000"/>
-                                </a:solidFill>
-                                <a:latin typeface="Cambria Math" panose="02040503050406030204" pitchFamily="18" charset="0"/>
-                                <a:cs typeface="Arial" panose="020B0604020202020204" pitchFamily="34" charset="0"/>
-                              </a:rPr>
-                              <m:t>𝑙</m:t>
-                            </m:r>
-                          </m:e>
-                        </m:acc>
-                      </m:oMath>
-                    </m:oMathPara>
-                  </a14:m>
-                  <a:endParaRPr lang="en-US" sz="2000" dirty="0" smtClean="0">
-                    <a:solidFill>
-                      <a:srgbClr val="FF0000"/>
-                    </a:solidFill>
-                    <a:latin typeface="Arial" panose="020B0604020202020204" pitchFamily="34" charset="0"/>
-                    <a:cs typeface="Arial" panose="020B0604020202020204" pitchFamily="34" charset="0"/>
-                  </a:endParaRPr>
-                </a:p>
-              </p:txBody>
-            </p:sp>
-          </mc:Choice>
-          <mc:Fallback>
-            <p:sp>
-              <p:nvSpPr>
-                <p:cNvPr id="22" name="TextBox 21"/>
-                <p:cNvSpPr txBox="1">
-                  <a:spLocks noRot="1" noChangeAspect="1" noMove="1" noResize="1" noEditPoints="1" noAdjustHandles="1" noChangeArrowheads="1" noChangeShapeType="1" noTextEdit="1"/>
-                </p:cNvSpPr>
-                <p:nvPr/>
-              </p:nvSpPr>
-              <p:spPr>
-                <a:xfrm>
-                  <a:off x="2557536" y="5298762"/>
-                  <a:ext cx="317651" cy="353302"/>
-                </a:xfrm>
-                <a:prstGeom prst="rect">
-                  <a:avLst/>
-                </a:prstGeom>
-                <a:blipFill>
-                  <a:blip r:embed="rId43"/>
-                  <a:stretch>
-                    <a:fillRect l="-17308" t="-32759" r="-103846" b="-8621"/>
-                  </a:stretch>
-                </a:blipFill>
-              </p:spPr>
-              <p:txBody>
-                <a:bodyPr/>
-                <a:lstStyle/>
-                <a:p>
-                  <a:r>
-                    <a:rPr lang="en-US">
-                      <a:noFill/>
-                    </a:rPr>
-                    <a:t> </a:t>
-                  </a:r>
-                </a:p>
-              </p:txBody>
-            </p:sp>
-          </mc:Fallback>
-        </mc:AlternateContent>
       </p:grpSp>
     </p:spTree>
     <p:extLst>

</xml_diff>